<commit_message>
Changed the last " Thanks! Any questions?" slide.
</commit_message>
<xml_diff>
--- a/Presentations/SOLID/SOLID.pptx
+++ b/Presentations/SOLID/SOLID.pptx
@@ -62,7 +62,7 @@
     <p:sldId id="333" r:id="rId53"/>
     <p:sldId id="334" r:id="rId54"/>
     <p:sldId id="295" r:id="rId55"/>
-    <p:sldId id="279" r:id="rId56"/>
+    <p:sldId id="336" r:id="rId56"/>
   </p:sldIdLst>
   <p:sldSz cx="9144000" cy="5143500" type="screen16x9"/>
   <p:notesSz cx="6858000" cy="9144000"/>
@@ -1988,7 +1988,11 @@
               </a:spcBef>
               <a:buNone/>
             </a:pPr>
-            <a:endParaRPr/>
+            <a:r>
+              <a:rPr lang="en-US" dirty="0" smtClean="0"/>
+              <a:t>Talk about the domain./</a:t>
+            </a:r>
+            <a:endParaRPr dirty="0"/>
           </a:p>
         </p:txBody>
       </p:sp>
@@ -2972,31 +2976,7 @@
                 <a:ea typeface="+mn-ea"/>
                 <a:cs typeface="+mn-cs"/>
               </a:rPr>
-              <a:t>No new </a:t>
-            </a:r>
-            <a:r>
-              <a:rPr lang="en-US" sz="1100" b="0" i="0" kern="1200" dirty="0" smtClean="0">
-                <a:solidFill>
-                  <a:schemeClr val="tx1"/>
-                </a:solidFill>
-                <a:effectLst/>
-                <a:latin typeface="+mn-lt"/>
-                <a:ea typeface="+mn-ea"/>
-                <a:cs typeface="+mn-cs"/>
-              </a:rPr>
-              <a:t>exception </a:t>
-            </a:r>
-            <a:r>
-              <a:rPr lang="en-US" sz="1100" b="0" i="0" kern="1200" dirty="0" smtClean="0">
-                <a:solidFill>
-                  <a:schemeClr val="tx1"/>
-                </a:solidFill>
-                <a:effectLst/>
-                <a:latin typeface="+mn-lt"/>
-                <a:ea typeface="+mn-ea"/>
-                <a:cs typeface="+mn-cs"/>
-              </a:rPr>
-              <a:t>types are allowed to be thrown, unless they are sub classes of previously used ones.</a:t>
+              <a:t>No new exception types are allowed to be thrown, unless they are sub classes of previously used ones.</a:t>
             </a:r>
           </a:p>
           <a:p>
@@ -4002,11 +3982,6 @@
               </a:rPr>
               <a:t>No new exception types are allowed to be thrown, unless they are sub classes of previously used ones.</a:t>
             </a:r>
-            <a:endParaRPr lang="en-US" sz="1100" kern="1200" dirty="0" smtClean="0">
-              <a:solidFill>
-                <a:schemeClr val="tx1"/>
-              </a:solidFill>
-            </a:endParaRPr>
           </a:p>
         </p:txBody>
       </p:sp>
@@ -6850,11 +6825,16 @@
               </a:spcBef>
               <a:buNone/>
             </a:pPr>
-            <a:endParaRPr/>
+            <a:endParaRPr dirty="0"/>
           </a:p>
         </p:txBody>
       </p:sp>
     </p:spTree>
+    <p:extLst>
+      <p:ext uri="{BB962C8B-B14F-4D97-AF65-F5344CB8AC3E}">
+        <p14:creationId xmlns:p14="http://schemas.microsoft.com/office/powerpoint/2010/main" val="754762236"/>
+      </p:ext>
+    </p:extLst>
   </p:cSld>
   <p:clrMapOvr>
     <a:masterClrMapping/>
@@ -9299,6 +9279,11 @@
         </a:xfrm>
       </p:grpSpPr>
     </p:spTree>
+    <p:extLst>
+      <p:ext uri="{BB962C8B-B14F-4D97-AF65-F5344CB8AC3E}">
+        <p14:creationId xmlns:p14="http://schemas.microsoft.com/office/powerpoint/2010/main" val="2988394611"/>
+      </p:ext>
+    </p:extLst>
   </p:cSld>
   <p:clrMapOvr>
     <a:masterClrMapping/>
@@ -9774,7 +9759,7 @@
     <p:sldLayoutId id="2147483648" r:id="rId1"/>
     <p:sldLayoutId id="2147483650" r:id="rId2"/>
     <p:sldLayoutId id="2147483652" r:id="rId3"/>
-    <p:sldLayoutId id="2147483656" r:id="rId4"/>
+    <p:sldLayoutId id="2147483658" r:id="rId4"/>
   </p:sldLayoutIdLst>
   <p:hf sldNum="0" hdr="0" ftr="0" dt="0"/>
   <p:txStyles>
@@ -19346,11 +19331,6 @@
               </a:rPr>
               <a:t>superclass.</a:t>
             </a:r>
-            <a:endParaRPr lang="en-US" dirty="0" smtClean="0">
-              <a:solidFill>
-                <a:schemeClr val="tx1"/>
-              </a:solidFill>
-            </a:endParaRPr>
           </a:p>
           <a:p>
             <a:pPr algn="r">
@@ -31013,7 +30993,7 @@
 </file>
 
 <file path=ppt/slides/slide55.xml><?xml version="1.0" encoding="utf-8"?>
-<p:sld xmlns:a="http://schemas.openxmlformats.org/drawingml/2006/main" xmlns:r="http://schemas.openxmlformats.org/officeDocument/2006/relationships" xmlns:p="http://schemas.openxmlformats.org/presentationml/2006/main" showMasterSp="0">
+<p:sld xmlns:a="http://schemas.openxmlformats.org/drawingml/2006/main" xmlns:r="http://schemas.openxmlformats.org/officeDocument/2006/relationships" xmlns:p="http://schemas.openxmlformats.org/presentationml/2006/main">
   <p:cSld>
     <p:spTree>
       <p:nvGrpSpPr>
@@ -31036,7 +31016,7 @@
             <a:spLocks noGrp="1"/>
           </p:cNvSpPr>
           <p:nvPr>
-            <p:ph type="ctrTitle"/>
+            <p:ph type="ctrTitle" idx="4294967295"/>
           </p:nvPr>
         </p:nvSpPr>
         <p:spPr>
@@ -31058,20 +31038,29 @@
           </a:bodyPr>
           <a:lstStyle/>
           <a:p>
-            <a:pPr lvl="0" rtl="0">
+            <a:pPr lvl="0" algn="ctr" rtl="0">
               <a:spcBef>
                 <a:spcPts val="0"/>
               </a:spcBef>
               <a:buNone/>
             </a:pPr>
             <a:r>
-              <a:rPr lang="en" sz="4800">
+              <a:rPr lang="en" sz="4800" dirty="0" smtClean="0">
                 <a:solidFill>
                   <a:schemeClr val="tx1"/>
                 </a:solidFill>
+                <a:latin typeface="Walter Turncoat" panose="020B0604020202020204" charset="0"/>
+                <a:ea typeface="Walter Turncoat" panose="020B0604020202020204" charset="0"/>
               </a:rPr>
-              <a:t>thanks!</a:t>
+              <a:t>THANKS!</a:t>
             </a:r>
+            <a:endParaRPr lang="en" sz="4800" dirty="0">
+              <a:solidFill>
+                <a:schemeClr val="tx1"/>
+              </a:solidFill>
+              <a:latin typeface="Walter Turncoat" panose="020B0604020202020204" charset="0"/>
+              <a:ea typeface="Walter Turncoat" panose="020B0604020202020204" charset="0"/>
+            </a:endParaRPr>
           </a:p>
         </p:txBody>
       </p:sp>
@@ -31082,7 +31071,7 @@
             <a:spLocks noGrp="1"/>
           </p:cNvSpPr>
           <p:nvPr>
-            <p:ph type="subTitle" idx="1"/>
+            <p:ph type="subTitle" idx="4294967295"/>
           </p:nvPr>
         </p:nvSpPr>
         <p:spPr>
@@ -31132,2120 +31121,6 @@
               </a:solidFill>
             </a:endParaRPr>
           </a:p>
-          <a:p>
-            <a:pPr lvl="0" algn="ctr" rtl="0">
-              <a:spcBef>
-                <a:spcPts val="0"/>
-              </a:spcBef>
-              <a:buNone/>
-            </a:pPr>
-            <a:r>
-              <a:rPr lang="en" dirty="0">
-                <a:solidFill>
-                  <a:schemeClr val="tx1"/>
-                </a:solidFill>
-              </a:rPr>
-              <a:t>You can find me </a:t>
-            </a:r>
-            <a:r>
-              <a:rPr lang="en" dirty="0" smtClean="0">
-                <a:solidFill>
-                  <a:schemeClr val="tx1"/>
-                </a:solidFill>
-              </a:rPr>
-              <a:t>at</a:t>
-            </a:r>
-          </a:p>
-          <a:p>
-            <a:pPr lvl="0" algn="ctr" rtl="0">
-              <a:spcBef>
-                <a:spcPts val="0"/>
-              </a:spcBef>
-              <a:buNone/>
-            </a:pPr>
-            <a:r>
-              <a:rPr lang="en" dirty="0" smtClean="0">
-                <a:solidFill>
-                  <a:schemeClr val="tx1"/>
-                </a:solidFill>
-              </a:rPr>
-              <a:t>blagovest.vp@gmail.com</a:t>
-            </a:r>
-            <a:endParaRPr lang="en" dirty="0">
-              <a:solidFill>
-                <a:schemeClr val="tx1"/>
-              </a:solidFill>
-            </a:endParaRPr>
-          </a:p>
-        </p:txBody>
-      </p:sp>
-      <p:sp>
-        <p:nvSpPr>
-          <p:cNvPr id="265" name="Shape 265"/>
-          <p:cNvSpPr/>
-          <p:nvPr/>
-        </p:nvSpPr>
-        <p:spPr>
-          <a:xfrm>
-            <a:off x="4207273" y="603475"/>
-            <a:ext cx="687463" cy="691589"/>
-          </a:xfrm>
-          <a:custGeom>
-            <a:avLst/>
-            <a:gdLst/>
-            <a:ahLst/>
-            <a:cxnLst/>
-            <a:rect l="0" t="0" r="0" b="0"/>
-            <a:pathLst>
-              <a:path w="15842" h="15938" extrusionOk="0">
-                <a:moveTo>
-                  <a:pt x="4794" y="7470"/>
-                </a:moveTo>
-                <a:lnTo>
-                  <a:pt x="4867" y="7495"/>
-                </a:lnTo>
-                <a:lnTo>
-                  <a:pt x="4940" y="7543"/>
-                </a:lnTo>
-                <a:lnTo>
-                  <a:pt x="4989" y="7616"/>
-                </a:lnTo>
-                <a:lnTo>
-                  <a:pt x="5013" y="7714"/>
-                </a:lnTo>
-                <a:lnTo>
-                  <a:pt x="5013" y="7787"/>
-                </a:lnTo>
-                <a:lnTo>
-                  <a:pt x="4989" y="7908"/>
-                </a:lnTo>
-                <a:lnTo>
-                  <a:pt x="4916" y="7981"/>
-                </a:lnTo>
-                <a:lnTo>
-                  <a:pt x="4843" y="8054"/>
-                </a:lnTo>
-                <a:lnTo>
-                  <a:pt x="4721" y="8079"/>
-                </a:lnTo>
-                <a:lnTo>
-                  <a:pt x="4600" y="8054"/>
-                </a:lnTo>
-                <a:lnTo>
-                  <a:pt x="4527" y="7981"/>
-                </a:lnTo>
-                <a:lnTo>
-                  <a:pt x="4454" y="7908"/>
-                </a:lnTo>
-                <a:lnTo>
-                  <a:pt x="4429" y="7787"/>
-                </a:lnTo>
-                <a:lnTo>
-                  <a:pt x="4454" y="7665"/>
-                </a:lnTo>
-                <a:lnTo>
-                  <a:pt x="4527" y="7543"/>
-                </a:lnTo>
-                <a:lnTo>
-                  <a:pt x="4600" y="7495"/>
-                </a:lnTo>
-                <a:lnTo>
-                  <a:pt x="4697" y="7470"/>
-                </a:lnTo>
-                <a:close/>
-                <a:moveTo>
-                  <a:pt x="11169" y="7470"/>
-                </a:moveTo>
-                <a:lnTo>
-                  <a:pt x="11242" y="7495"/>
-                </a:lnTo>
-                <a:lnTo>
-                  <a:pt x="11315" y="7543"/>
-                </a:lnTo>
-                <a:lnTo>
-                  <a:pt x="11364" y="7616"/>
-                </a:lnTo>
-                <a:lnTo>
-                  <a:pt x="11388" y="7714"/>
-                </a:lnTo>
-                <a:lnTo>
-                  <a:pt x="11388" y="7787"/>
-                </a:lnTo>
-                <a:lnTo>
-                  <a:pt x="11364" y="7908"/>
-                </a:lnTo>
-                <a:lnTo>
-                  <a:pt x="11291" y="7981"/>
-                </a:lnTo>
-                <a:lnTo>
-                  <a:pt x="11218" y="8054"/>
-                </a:lnTo>
-                <a:lnTo>
-                  <a:pt x="11096" y="8079"/>
-                </a:lnTo>
-                <a:lnTo>
-                  <a:pt x="10975" y="8054"/>
-                </a:lnTo>
-                <a:lnTo>
-                  <a:pt x="10902" y="7981"/>
-                </a:lnTo>
-                <a:lnTo>
-                  <a:pt x="10829" y="7908"/>
-                </a:lnTo>
-                <a:lnTo>
-                  <a:pt x="10804" y="7787"/>
-                </a:lnTo>
-                <a:lnTo>
-                  <a:pt x="10829" y="7665"/>
-                </a:lnTo>
-                <a:lnTo>
-                  <a:pt x="10902" y="7543"/>
-                </a:lnTo>
-                <a:lnTo>
-                  <a:pt x="10975" y="7495"/>
-                </a:lnTo>
-                <a:lnTo>
-                  <a:pt x="11072" y="7470"/>
-                </a:lnTo>
-                <a:close/>
-                <a:moveTo>
-                  <a:pt x="4770" y="7081"/>
-                </a:moveTo>
-                <a:lnTo>
-                  <a:pt x="4600" y="7105"/>
-                </a:lnTo>
-                <a:lnTo>
-                  <a:pt x="4429" y="7178"/>
-                </a:lnTo>
-                <a:lnTo>
-                  <a:pt x="4308" y="7300"/>
-                </a:lnTo>
-                <a:lnTo>
-                  <a:pt x="4186" y="7446"/>
-                </a:lnTo>
-                <a:lnTo>
-                  <a:pt x="4113" y="7568"/>
-                </a:lnTo>
-                <a:lnTo>
-                  <a:pt x="4064" y="7714"/>
-                </a:lnTo>
-                <a:lnTo>
-                  <a:pt x="4016" y="7835"/>
-                </a:lnTo>
-                <a:lnTo>
-                  <a:pt x="4016" y="7981"/>
-                </a:lnTo>
-                <a:lnTo>
-                  <a:pt x="3967" y="8225"/>
-                </a:lnTo>
-                <a:lnTo>
-                  <a:pt x="3967" y="8395"/>
-                </a:lnTo>
-                <a:lnTo>
-                  <a:pt x="4016" y="8565"/>
-                </a:lnTo>
-                <a:lnTo>
-                  <a:pt x="4064" y="8711"/>
-                </a:lnTo>
-                <a:lnTo>
-                  <a:pt x="4162" y="8833"/>
-                </a:lnTo>
-                <a:lnTo>
-                  <a:pt x="4259" y="8955"/>
-                </a:lnTo>
-                <a:lnTo>
-                  <a:pt x="4381" y="9028"/>
-                </a:lnTo>
-                <a:lnTo>
-                  <a:pt x="4527" y="9101"/>
-                </a:lnTo>
-                <a:lnTo>
-                  <a:pt x="4697" y="9149"/>
-                </a:lnTo>
-                <a:lnTo>
-                  <a:pt x="4892" y="9174"/>
-                </a:lnTo>
-                <a:lnTo>
-                  <a:pt x="5062" y="9149"/>
-                </a:lnTo>
-                <a:lnTo>
-                  <a:pt x="5232" y="9101"/>
-                </a:lnTo>
-                <a:lnTo>
-                  <a:pt x="5378" y="9028"/>
-                </a:lnTo>
-                <a:lnTo>
-                  <a:pt x="5500" y="8930"/>
-                </a:lnTo>
-                <a:lnTo>
-                  <a:pt x="5622" y="8809"/>
-                </a:lnTo>
-                <a:lnTo>
-                  <a:pt x="5719" y="8663"/>
-                </a:lnTo>
-                <a:lnTo>
-                  <a:pt x="5792" y="8517"/>
-                </a:lnTo>
-                <a:lnTo>
-                  <a:pt x="5841" y="8346"/>
-                </a:lnTo>
-                <a:lnTo>
-                  <a:pt x="5865" y="8176"/>
-                </a:lnTo>
-                <a:lnTo>
-                  <a:pt x="5841" y="8006"/>
-                </a:lnTo>
-                <a:lnTo>
-                  <a:pt x="5816" y="7835"/>
-                </a:lnTo>
-                <a:lnTo>
-                  <a:pt x="5768" y="7689"/>
-                </a:lnTo>
-                <a:lnTo>
-                  <a:pt x="5695" y="7519"/>
-                </a:lnTo>
-                <a:lnTo>
-                  <a:pt x="5573" y="7397"/>
-                </a:lnTo>
-                <a:lnTo>
-                  <a:pt x="5427" y="7251"/>
-                </a:lnTo>
-                <a:lnTo>
-                  <a:pt x="5281" y="7154"/>
-                </a:lnTo>
-                <a:lnTo>
-                  <a:pt x="5111" y="7105"/>
-                </a:lnTo>
-                <a:lnTo>
-                  <a:pt x="4940" y="7081"/>
-                </a:lnTo>
-                <a:close/>
-                <a:moveTo>
-                  <a:pt x="11145" y="7081"/>
-                </a:moveTo>
-                <a:lnTo>
-                  <a:pt x="10975" y="7105"/>
-                </a:lnTo>
-                <a:lnTo>
-                  <a:pt x="10804" y="7178"/>
-                </a:lnTo>
-                <a:lnTo>
-                  <a:pt x="10683" y="7300"/>
-                </a:lnTo>
-                <a:lnTo>
-                  <a:pt x="10561" y="7446"/>
-                </a:lnTo>
-                <a:lnTo>
-                  <a:pt x="10488" y="7568"/>
-                </a:lnTo>
-                <a:lnTo>
-                  <a:pt x="10439" y="7714"/>
-                </a:lnTo>
-                <a:lnTo>
-                  <a:pt x="10391" y="7835"/>
-                </a:lnTo>
-                <a:lnTo>
-                  <a:pt x="10391" y="7981"/>
-                </a:lnTo>
-                <a:lnTo>
-                  <a:pt x="10342" y="8225"/>
-                </a:lnTo>
-                <a:lnTo>
-                  <a:pt x="10342" y="8395"/>
-                </a:lnTo>
-                <a:lnTo>
-                  <a:pt x="10391" y="8565"/>
-                </a:lnTo>
-                <a:lnTo>
-                  <a:pt x="10439" y="8711"/>
-                </a:lnTo>
-                <a:lnTo>
-                  <a:pt x="10537" y="8833"/>
-                </a:lnTo>
-                <a:lnTo>
-                  <a:pt x="10634" y="8955"/>
-                </a:lnTo>
-                <a:lnTo>
-                  <a:pt x="10756" y="9028"/>
-                </a:lnTo>
-                <a:lnTo>
-                  <a:pt x="10902" y="9101"/>
-                </a:lnTo>
-                <a:lnTo>
-                  <a:pt x="11072" y="9149"/>
-                </a:lnTo>
-                <a:lnTo>
-                  <a:pt x="11267" y="9174"/>
-                </a:lnTo>
-                <a:lnTo>
-                  <a:pt x="11437" y="9149"/>
-                </a:lnTo>
-                <a:lnTo>
-                  <a:pt x="11607" y="9101"/>
-                </a:lnTo>
-                <a:lnTo>
-                  <a:pt x="11753" y="9028"/>
-                </a:lnTo>
-                <a:lnTo>
-                  <a:pt x="11875" y="8930"/>
-                </a:lnTo>
-                <a:lnTo>
-                  <a:pt x="11997" y="8809"/>
-                </a:lnTo>
-                <a:lnTo>
-                  <a:pt x="12094" y="8663"/>
-                </a:lnTo>
-                <a:lnTo>
-                  <a:pt x="12167" y="8517"/>
-                </a:lnTo>
-                <a:lnTo>
-                  <a:pt x="12216" y="8346"/>
-                </a:lnTo>
-                <a:lnTo>
-                  <a:pt x="12240" y="8176"/>
-                </a:lnTo>
-                <a:lnTo>
-                  <a:pt x="12216" y="8006"/>
-                </a:lnTo>
-                <a:lnTo>
-                  <a:pt x="12191" y="7835"/>
-                </a:lnTo>
-                <a:lnTo>
-                  <a:pt x="12143" y="7689"/>
-                </a:lnTo>
-                <a:lnTo>
-                  <a:pt x="12070" y="7519"/>
-                </a:lnTo>
-                <a:lnTo>
-                  <a:pt x="11948" y="7397"/>
-                </a:lnTo>
-                <a:lnTo>
-                  <a:pt x="11802" y="7251"/>
-                </a:lnTo>
-                <a:lnTo>
-                  <a:pt x="11656" y="7154"/>
-                </a:lnTo>
-                <a:lnTo>
-                  <a:pt x="11486" y="7105"/>
-                </a:lnTo>
-                <a:lnTo>
-                  <a:pt x="11315" y="7081"/>
-                </a:lnTo>
-                <a:close/>
-                <a:moveTo>
-                  <a:pt x="11972" y="10925"/>
-                </a:moveTo>
-                <a:lnTo>
-                  <a:pt x="11875" y="10974"/>
-                </a:lnTo>
-                <a:lnTo>
-                  <a:pt x="11778" y="11047"/>
-                </a:lnTo>
-                <a:lnTo>
-                  <a:pt x="11607" y="11290"/>
-                </a:lnTo>
-                <a:lnTo>
-                  <a:pt x="11413" y="11485"/>
-                </a:lnTo>
-                <a:lnTo>
-                  <a:pt x="11194" y="11680"/>
-                </a:lnTo>
-                <a:lnTo>
-                  <a:pt x="10950" y="11850"/>
-                </a:lnTo>
-                <a:lnTo>
-                  <a:pt x="10707" y="11996"/>
-                </a:lnTo>
-                <a:lnTo>
-                  <a:pt x="10439" y="12118"/>
-                </a:lnTo>
-                <a:lnTo>
-                  <a:pt x="10172" y="12215"/>
-                </a:lnTo>
-                <a:lnTo>
-                  <a:pt x="9880" y="12312"/>
-                </a:lnTo>
-                <a:lnTo>
-                  <a:pt x="9588" y="12385"/>
-                </a:lnTo>
-                <a:lnTo>
-                  <a:pt x="9296" y="12434"/>
-                </a:lnTo>
-                <a:lnTo>
-                  <a:pt x="8712" y="12507"/>
-                </a:lnTo>
-                <a:lnTo>
-                  <a:pt x="8128" y="12531"/>
-                </a:lnTo>
-                <a:lnTo>
-                  <a:pt x="7568" y="12507"/>
-                </a:lnTo>
-                <a:lnTo>
-                  <a:pt x="7325" y="12483"/>
-                </a:lnTo>
-                <a:lnTo>
-                  <a:pt x="7106" y="12434"/>
-                </a:lnTo>
-                <a:lnTo>
-                  <a:pt x="6668" y="12312"/>
-                </a:lnTo>
-                <a:lnTo>
-                  <a:pt x="6230" y="12166"/>
-                </a:lnTo>
-                <a:lnTo>
-                  <a:pt x="5816" y="11996"/>
-                </a:lnTo>
-                <a:lnTo>
-                  <a:pt x="5427" y="11826"/>
-                </a:lnTo>
-                <a:lnTo>
-                  <a:pt x="5013" y="11631"/>
-                </a:lnTo>
-                <a:lnTo>
-                  <a:pt x="4794" y="11509"/>
-                </a:lnTo>
-                <a:lnTo>
-                  <a:pt x="4600" y="11388"/>
-                </a:lnTo>
-                <a:lnTo>
-                  <a:pt x="4454" y="11242"/>
-                </a:lnTo>
-                <a:lnTo>
-                  <a:pt x="4308" y="11096"/>
-                </a:lnTo>
-                <a:lnTo>
-                  <a:pt x="4259" y="11047"/>
-                </a:lnTo>
-                <a:lnTo>
-                  <a:pt x="4210" y="11023"/>
-                </a:lnTo>
-                <a:lnTo>
-                  <a:pt x="4089" y="11023"/>
-                </a:lnTo>
-                <a:lnTo>
-                  <a:pt x="4040" y="11071"/>
-                </a:lnTo>
-                <a:lnTo>
-                  <a:pt x="3991" y="11096"/>
-                </a:lnTo>
-                <a:lnTo>
-                  <a:pt x="3991" y="11169"/>
-                </a:lnTo>
-                <a:lnTo>
-                  <a:pt x="3991" y="11242"/>
-                </a:lnTo>
-                <a:lnTo>
-                  <a:pt x="4016" y="11339"/>
-                </a:lnTo>
-                <a:lnTo>
-                  <a:pt x="4064" y="11436"/>
-                </a:lnTo>
-                <a:lnTo>
-                  <a:pt x="4210" y="11631"/>
-                </a:lnTo>
-                <a:lnTo>
-                  <a:pt x="4381" y="11801"/>
-                </a:lnTo>
-                <a:lnTo>
-                  <a:pt x="4575" y="11947"/>
-                </a:lnTo>
-                <a:lnTo>
-                  <a:pt x="4794" y="12069"/>
-                </a:lnTo>
-                <a:lnTo>
-                  <a:pt x="5038" y="12191"/>
-                </a:lnTo>
-                <a:lnTo>
-                  <a:pt x="5451" y="12385"/>
-                </a:lnTo>
-                <a:lnTo>
-                  <a:pt x="5938" y="12604"/>
-                </a:lnTo>
-                <a:lnTo>
-                  <a:pt x="6424" y="12799"/>
-                </a:lnTo>
-                <a:lnTo>
-                  <a:pt x="6935" y="12945"/>
-                </a:lnTo>
-                <a:lnTo>
-                  <a:pt x="7446" y="13042"/>
-                </a:lnTo>
-                <a:lnTo>
-                  <a:pt x="7763" y="13067"/>
-                </a:lnTo>
-                <a:lnTo>
-                  <a:pt x="8079" y="13091"/>
-                </a:lnTo>
-                <a:lnTo>
-                  <a:pt x="8420" y="13091"/>
-                </a:lnTo>
-                <a:lnTo>
-                  <a:pt x="8760" y="13067"/>
-                </a:lnTo>
-                <a:lnTo>
-                  <a:pt x="9101" y="13042"/>
-                </a:lnTo>
-                <a:lnTo>
-                  <a:pt x="9442" y="12969"/>
-                </a:lnTo>
-                <a:lnTo>
-                  <a:pt x="9758" y="12896"/>
-                </a:lnTo>
-                <a:lnTo>
-                  <a:pt x="10099" y="12799"/>
-                </a:lnTo>
-                <a:lnTo>
-                  <a:pt x="10415" y="12702"/>
-                </a:lnTo>
-                <a:lnTo>
-                  <a:pt x="10731" y="12556"/>
-                </a:lnTo>
-                <a:lnTo>
-                  <a:pt x="11023" y="12410"/>
-                </a:lnTo>
-                <a:lnTo>
-                  <a:pt x="11315" y="12239"/>
-                </a:lnTo>
-                <a:lnTo>
-                  <a:pt x="11583" y="12045"/>
-                </a:lnTo>
-                <a:lnTo>
-                  <a:pt x="11826" y="11826"/>
-                </a:lnTo>
-                <a:lnTo>
-                  <a:pt x="12045" y="11582"/>
-                </a:lnTo>
-                <a:lnTo>
-                  <a:pt x="12264" y="11339"/>
-                </a:lnTo>
-                <a:lnTo>
-                  <a:pt x="12313" y="11217"/>
-                </a:lnTo>
-                <a:lnTo>
-                  <a:pt x="12289" y="11120"/>
-                </a:lnTo>
-                <a:lnTo>
-                  <a:pt x="12240" y="11047"/>
-                </a:lnTo>
-                <a:lnTo>
-                  <a:pt x="12167" y="10974"/>
-                </a:lnTo>
-                <a:lnTo>
-                  <a:pt x="12070" y="10950"/>
-                </a:lnTo>
-                <a:lnTo>
-                  <a:pt x="11972" y="10925"/>
-                </a:lnTo>
-                <a:close/>
-                <a:moveTo>
-                  <a:pt x="8493" y="682"/>
-                </a:moveTo>
-                <a:lnTo>
-                  <a:pt x="8663" y="706"/>
-                </a:lnTo>
-                <a:lnTo>
-                  <a:pt x="9101" y="755"/>
-                </a:lnTo>
-                <a:lnTo>
-                  <a:pt x="9539" y="803"/>
-                </a:lnTo>
-                <a:lnTo>
-                  <a:pt x="10001" y="901"/>
-                </a:lnTo>
-                <a:lnTo>
-                  <a:pt x="10439" y="1022"/>
-                </a:lnTo>
-                <a:lnTo>
-                  <a:pt x="10780" y="1120"/>
-                </a:lnTo>
-                <a:lnTo>
-                  <a:pt x="11121" y="1241"/>
-                </a:lnTo>
-                <a:lnTo>
-                  <a:pt x="11437" y="1411"/>
-                </a:lnTo>
-                <a:lnTo>
-                  <a:pt x="11753" y="1557"/>
-                </a:lnTo>
-                <a:lnTo>
-                  <a:pt x="11753" y="1582"/>
-                </a:lnTo>
-                <a:lnTo>
-                  <a:pt x="11729" y="1655"/>
-                </a:lnTo>
-                <a:lnTo>
-                  <a:pt x="11729" y="1752"/>
-                </a:lnTo>
-                <a:lnTo>
-                  <a:pt x="11753" y="1801"/>
-                </a:lnTo>
-                <a:lnTo>
-                  <a:pt x="11826" y="1825"/>
-                </a:lnTo>
-                <a:lnTo>
-                  <a:pt x="11899" y="1825"/>
-                </a:lnTo>
-                <a:lnTo>
-                  <a:pt x="11948" y="1776"/>
-                </a:lnTo>
-                <a:lnTo>
-                  <a:pt x="11972" y="1752"/>
-                </a:lnTo>
-                <a:lnTo>
-                  <a:pt x="11997" y="1752"/>
-                </a:lnTo>
-                <a:lnTo>
-                  <a:pt x="11997" y="1728"/>
-                </a:lnTo>
-                <a:lnTo>
-                  <a:pt x="12021" y="1728"/>
-                </a:lnTo>
-                <a:lnTo>
-                  <a:pt x="12143" y="1801"/>
-                </a:lnTo>
-                <a:lnTo>
-                  <a:pt x="12094" y="1874"/>
-                </a:lnTo>
-                <a:lnTo>
-                  <a:pt x="12094" y="1947"/>
-                </a:lnTo>
-                <a:lnTo>
-                  <a:pt x="12094" y="1995"/>
-                </a:lnTo>
-                <a:lnTo>
-                  <a:pt x="12143" y="2020"/>
-                </a:lnTo>
-                <a:lnTo>
-                  <a:pt x="12167" y="2044"/>
-                </a:lnTo>
-                <a:lnTo>
-                  <a:pt x="12216" y="2020"/>
-                </a:lnTo>
-                <a:lnTo>
-                  <a:pt x="12240" y="1995"/>
-                </a:lnTo>
-                <a:lnTo>
-                  <a:pt x="12313" y="1922"/>
-                </a:lnTo>
-                <a:lnTo>
-                  <a:pt x="12337" y="1922"/>
-                </a:lnTo>
-                <a:lnTo>
-                  <a:pt x="12532" y="2068"/>
-                </a:lnTo>
-                <a:lnTo>
-                  <a:pt x="12483" y="2190"/>
-                </a:lnTo>
-                <a:lnTo>
-                  <a:pt x="12483" y="2239"/>
-                </a:lnTo>
-                <a:lnTo>
-                  <a:pt x="12508" y="2336"/>
-                </a:lnTo>
-                <a:lnTo>
-                  <a:pt x="12532" y="2385"/>
-                </a:lnTo>
-                <a:lnTo>
-                  <a:pt x="12556" y="2409"/>
-                </a:lnTo>
-                <a:lnTo>
-                  <a:pt x="12581" y="2409"/>
-                </a:lnTo>
-                <a:lnTo>
-                  <a:pt x="12629" y="2385"/>
-                </a:lnTo>
-                <a:lnTo>
-                  <a:pt x="12678" y="2360"/>
-                </a:lnTo>
-                <a:lnTo>
-                  <a:pt x="12751" y="2287"/>
-                </a:lnTo>
-                <a:lnTo>
-                  <a:pt x="12775" y="2239"/>
-                </a:lnTo>
-                <a:lnTo>
-                  <a:pt x="12970" y="2409"/>
-                </a:lnTo>
-                <a:lnTo>
-                  <a:pt x="12873" y="2531"/>
-                </a:lnTo>
-                <a:lnTo>
-                  <a:pt x="12848" y="2604"/>
-                </a:lnTo>
-                <a:lnTo>
-                  <a:pt x="12824" y="2677"/>
-                </a:lnTo>
-                <a:lnTo>
-                  <a:pt x="12824" y="2725"/>
-                </a:lnTo>
-                <a:lnTo>
-                  <a:pt x="12873" y="2750"/>
-                </a:lnTo>
-                <a:lnTo>
-                  <a:pt x="12921" y="2774"/>
-                </a:lnTo>
-                <a:lnTo>
-                  <a:pt x="12946" y="2774"/>
-                </a:lnTo>
-                <a:lnTo>
-                  <a:pt x="13067" y="2701"/>
-                </a:lnTo>
-                <a:lnTo>
-                  <a:pt x="13189" y="2604"/>
-                </a:lnTo>
-                <a:lnTo>
-                  <a:pt x="13311" y="2725"/>
-                </a:lnTo>
-                <a:lnTo>
-                  <a:pt x="13384" y="2823"/>
-                </a:lnTo>
-                <a:lnTo>
-                  <a:pt x="13262" y="3017"/>
-                </a:lnTo>
-                <a:lnTo>
-                  <a:pt x="13213" y="3066"/>
-                </a:lnTo>
-                <a:lnTo>
-                  <a:pt x="13189" y="3163"/>
-                </a:lnTo>
-                <a:lnTo>
-                  <a:pt x="13165" y="3236"/>
-                </a:lnTo>
-                <a:lnTo>
-                  <a:pt x="13189" y="3285"/>
-                </a:lnTo>
-                <a:lnTo>
-                  <a:pt x="13238" y="3309"/>
-                </a:lnTo>
-                <a:lnTo>
-                  <a:pt x="13335" y="3285"/>
-                </a:lnTo>
-                <a:lnTo>
-                  <a:pt x="13408" y="3236"/>
-                </a:lnTo>
-                <a:lnTo>
-                  <a:pt x="13554" y="3115"/>
-                </a:lnTo>
-                <a:lnTo>
-                  <a:pt x="13578" y="3042"/>
-                </a:lnTo>
-                <a:lnTo>
-                  <a:pt x="13773" y="3309"/>
-                </a:lnTo>
-                <a:lnTo>
-                  <a:pt x="13676" y="3407"/>
-                </a:lnTo>
-                <a:lnTo>
-                  <a:pt x="13554" y="3504"/>
-                </a:lnTo>
-                <a:lnTo>
-                  <a:pt x="13505" y="3577"/>
-                </a:lnTo>
-                <a:lnTo>
-                  <a:pt x="13481" y="3650"/>
-                </a:lnTo>
-                <a:lnTo>
-                  <a:pt x="13481" y="3699"/>
-                </a:lnTo>
-                <a:lnTo>
-                  <a:pt x="13505" y="3723"/>
-                </a:lnTo>
-                <a:lnTo>
-                  <a:pt x="13603" y="3747"/>
-                </a:lnTo>
-                <a:lnTo>
-                  <a:pt x="13700" y="3723"/>
-                </a:lnTo>
-                <a:lnTo>
-                  <a:pt x="13773" y="3674"/>
-                </a:lnTo>
-                <a:lnTo>
-                  <a:pt x="13870" y="3626"/>
-                </a:lnTo>
-                <a:lnTo>
-                  <a:pt x="13968" y="3577"/>
-                </a:lnTo>
-                <a:lnTo>
-                  <a:pt x="14162" y="3918"/>
-                </a:lnTo>
-                <a:lnTo>
-                  <a:pt x="14065" y="3991"/>
-                </a:lnTo>
-                <a:lnTo>
-                  <a:pt x="13870" y="4161"/>
-                </a:lnTo>
-                <a:lnTo>
-                  <a:pt x="13773" y="4234"/>
-                </a:lnTo>
-                <a:lnTo>
-                  <a:pt x="13700" y="4331"/>
-                </a:lnTo>
-                <a:lnTo>
-                  <a:pt x="13700" y="4356"/>
-                </a:lnTo>
-                <a:lnTo>
-                  <a:pt x="13724" y="4380"/>
-                </a:lnTo>
-                <a:lnTo>
-                  <a:pt x="13846" y="4380"/>
-                </a:lnTo>
-                <a:lnTo>
-                  <a:pt x="13943" y="4356"/>
-                </a:lnTo>
-                <a:lnTo>
-                  <a:pt x="14065" y="4307"/>
-                </a:lnTo>
-                <a:lnTo>
-                  <a:pt x="14162" y="4234"/>
-                </a:lnTo>
-                <a:lnTo>
-                  <a:pt x="14284" y="4161"/>
-                </a:lnTo>
-                <a:lnTo>
-                  <a:pt x="14503" y="4696"/>
-                </a:lnTo>
-                <a:lnTo>
-                  <a:pt x="14332" y="4769"/>
-                </a:lnTo>
-                <a:lnTo>
-                  <a:pt x="14211" y="4842"/>
-                </a:lnTo>
-                <a:lnTo>
-                  <a:pt x="14065" y="4940"/>
-                </a:lnTo>
-                <a:lnTo>
-                  <a:pt x="13968" y="5061"/>
-                </a:lnTo>
-                <a:lnTo>
-                  <a:pt x="13919" y="5134"/>
-                </a:lnTo>
-                <a:lnTo>
-                  <a:pt x="13895" y="5207"/>
-                </a:lnTo>
-                <a:lnTo>
-                  <a:pt x="13895" y="5256"/>
-                </a:lnTo>
-                <a:lnTo>
-                  <a:pt x="13919" y="5280"/>
-                </a:lnTo>
-                <a:lnTo>
-                  <a:pt x="13968" y="5305"/>
-                </a:lnTo>
-                <a:lnTo>
-                  <a:pt x="14016" y="5305"/>
-                </a:lnTo>
-                <a:lnTo>
-                  <a:pt x="14114" y="5256"/>
-                </a:lnTo>
-                <a:lnTo>
-                  <a:pt x="14235" y="5183"/>
-                </a:lnTo>
-                <a:lnTo>
-                  <a:pt x="14551" y="5037"/>
-                </a:lnTo>
-                <a:lnTo>
-                  <a:pt x="14600" y="5013"/>
-                </a:lnTo>
-                <a:lnTo>
-                  <a:pt x="14770" y="5524"/>
-                </a:lnTo>
-                <a:lnTo>
-                  <a:pt x="14430" y="5670"/>
-                </a:lnTo>
-                <a:lnTo>
-                  <a:pt x="14162" y="5791"/>
-                </a:lnTo>
-                <a:lnTo>
-                  <a:pt x="13919" y="5937"/>
-                </a:lnTo>
-                <a:lnTo>
-                  <a:pt x="13919" y="5986"/>
-                </a:lnTo>
-                <a:lnTo>
-                  <a:pt x="13943" y="6010"/>
-                </a:lnTo>
-                <a:lnTo>
-                  <a:pt x="14089" y="6035"/>
-                </a:lnTo>
-                <a:lnTo>
-                  <a:pt x="14235" y="6059"/>
-                </a:lnTo>
-                <a:lnTo>
-                  <a:pt x="14381" y="6035"/>
-                </a:lnTo>
-                <a:lnTo>
-                  <a:pt x="14527" y="6010"/>
-                </a:lnTo>
-                <a:lnTo>
-                  <a:pt x="14843" y="5889"/>
-                </a:lnTo>
-                <a:lnTo>
-                  <a:pt x="14965" y="6424"/>
-                </a:lnTo>
-                <a:lnTo>
-                  <a:pt x="14795" y="6497"/>
-                </a:lnTo>
-                <a:lnTo>
-                  <a:pt x="14405" y="6619"/>
-                </a:lnTo>
-                <a:lnTo>
-                  <a:pt x="14041" y="6740"/>
-                </a:lnTo>
-                <a:lnTo>
-                  <a:pt x="13992" y="6789"/>
-                </a:lnTo>
-                <a:lnTo>
-                  <a:pt x="13992" y="6813"/>
-                </a:lnTo>
-                <a:lnTo>
-                  <a:pt x="13992" y="6862"/>
-                </a:lnTo>
-                <a:lnTo>
-                  <a:pt x="14041" y="6886"/>
-                </a:lnTo>
-                <a:lnTo>
-                  <a:pt x="14235" y="6886"/>
-                </a:lnTo>
-                <a:lnTo>
-                  <a:pt x="14430" y="6862"/>
-                </a:lnTo>
-                <a:lnTo>
-                  <a:pt x="14795" y="6813"/>
-                </a:lnTo>
-                <a:lnTo>
-                  <a:pt x="15038" y="6740"/>
-                </a:lnTo>
-                <a:lnTo>
-                  <a:pt x="15111" y="7178"/>
-                </a:lnTo>
-                <a:lnTo>
-                  <a:pt x="14843" y="7227"/>
-                </a:lnTo>
-                <a:lnTo>
-                  <a:pt x="14430" y="7349"/>
-                </a:lnTo>
-                <a:lnTo>
-                  <a:pt x="14235" y="7422"/>
-                </a:lnTo>
-                <a:lnTo>
-                  <a:pt x="14065" y="7543"/>
-                </a:lnTo>
-                <a:lnTo>
-                  <a:pt x="14041" y="7592"/>
-                </a:lnTo>
-                <a:lnTo>
-                  <a:pt x="14041" y="7665"/>
-                </a:lnTo>
-                <a:lnTo>
-                  <a:pt x="14089" y="7714"/>
-                </a:lnTo>
-                <a:lnTo>
-                  <a:pt x="14138" y="7738"/>
-                </a:lnTo>
-                <a:lnTo>
-                  <a:pt x="14357" y="7714"/>
-                </a:lnTo>
-                <a:lnTo>
-                  <a:pt x="14551" y="7665"/>
-                </a:lnTo>
-                <a:lnTo>
-                  <a:pt x="14941" y="7568"/>
-                </a:lnTo>
-                <a:lnTo>
-                  <a:pt x="15135" y="7519"/>
-                </a:lnTo>
-                <a:lnTo>
-                  <a:pt x="15184" y="7981"/>
-                </a:lnTo>
-                <a:lnTo>
-                  <a:pt x="14868" y="8030"/>
-                </a:lnTo>
-                <a:lnTo>
-                  <a:pt x="14624" y="8054"/>
-                </a:lnTo>
-                <a:lnTo>
-                  <a:pt x="14381" y="8079"/>
-                </a:lnTo>
-                <a:lnTo>
-                  <a:pt x="14235" y="8103"/>
-                </a:lnTo>
-                <a:lnTo>
-                  <a:pt x="14138" y="8152"/>
-                </a:lnTo>
-                <a:lnTo>
-                  <a:pt x="14016" y="8200"/>
-                </a:lnTo>
-                <a:lnTo>
-                  <a:pt x="13943" y="8298"/>
-                </a:lnTo>
-                <a:lnTo>
-                  <a:pt x="13919" y="8322"/>
-                </a:lnTo>
-                <a:lnTo>
-                  <a:pt x="13919" y="8346"/>
-                </a:lnTo>
-                <a:lnTo>
-                  <a:pt x="13943" y="8395"/>
-                </a:lnTo>
-                <a:lnTo>
-                  <a:pt x="13968" y="8395"/>
-                </a:lnTo>
-                <a:lnTo>
-                  <a:pt x="14089" y="8419"/>
-                </a:lnTo>
-                <a:lnTo>
-                  <a:pt x="14211" y="8444"/>
-                </a:lnTo>
-                <a:lnTo>
-                  <a:pt x="14478" y="8444"/>
-                </a:lnTo>
-                <a:lnTo>
-                  <a:pt x="14989" y="8395"/>
-                </a:lnTo>
-                <a:lnTo>
-                  <a:pt x="15208" y="8395"/>
-                </a:lnTo>
-                <a:lnTo>
-                  <a:pt x="15208" y="8857"/>
-                </a:lnTo>
-                <a:lnTo>
-                  <a:pt x="14722" y="8882"/>
-                </a:lnTo>
-                <a:lnTo>
-                  <a:pt x="14503" y="8882"/>
-                </a:lnTo>
-                <a:lnTo>
-                  <a:pt x="14284" y="8906"/>
-                </a:lnTo>
-                <a:lnTo>
-                  <a:pt x="14065" y="8955"/>
-                </a:lnTo>
-                <a:lnTo>
-                  <a:pt x="13968" y="8979"/>
-                </a:lnTo>
-                <a:lnTo>
-                  <a:pt x="13870" y="9028"/>
-                </a:lnTo>
-                <a:lnTo>
-                  <a:pt x="13870" y="9052"/>
-                </a:lnTo>
-                <a:lnTo>
-                  <a:pt x="13870" y="9076"/>
-                </a:lnTo>
-                <a:lnTo>
-                  <a:pt x="13968" y="9125"/>
-                </a:lnTo>
-                <a:lnTo>
-                  <a:pt x="14065" y="9174"/>
-                </a:lnTo>
-                <a:lnTo>
-                  <a:pt x="14284" y="9222"/>
-                </a:lnTo>
-                <a:lnTo>
-                  <a:pt x="14722" y="9222"/>
-                </a:lnTo>
-                <a:lnTo>
-                  <a:pt x="14941" y="9247"/>
-                </a:lnTo>
-                <a:lnTo>
-                  <a:pt x="15184" y="9247"/>
-                </a:lnTo>
-                <a:lnTo>
-                  <a:pt x="15160" y="9465"/>
-                </a:lnTo>
-                <a:lnTo>
-                  <a:pt x="14965" y="9514"/>
-                </a:lnTo>
-                <a:lnTo>
-                  <a:pt x="14722" y="9563"/>
-                </a:lnTo>
-                <a:lnTo>
-                  <a:pt x="14503" y="9660"/>
-                </a:lnTo>
-                <a:lnTo>
-                  <a:pt x="14260" y="9757"/>
-                </a:lnTo>
-                <a:lnTo>
-                  <a:pt x="14041" y="9879"/>
-                </a:lnTo>
-                <a:lnTo>
-                  <a:pt x="14016" y="9903"/>
-                </a:lnTo>
-                <a:lnTo>
-                  <a:pt x="14016" y="9952"/>
-                </a:lnTo>
-                <a:lnTo>
-                  <a:pt x="14041" y="9976"/>
-                </a:lnTo>
-                <a:lnTo>
-                  <a:pt x="14089" y="9976"/>
-                </a:lnTo>
-                <a:lnTo>
-                  <a:pt x="14308" y="10001"/>
-                </a:lnTo>
-                <a:lnTo>
-                  <a:pt x="14527" y="9976"/>
-                </a:lnTo>
-                <a:lnTo>
-                  <a:pt x="14965" y="9903"/>
-                </a:lnTo>
-                <a:lnTo>
-                  <a:pt x="15087" y="9879"/>
-                </a:lnTo>
-                <a:lnTo>
-                  <a:pt x="14989" y="10390"/>
-                </a:lnTo>
-                <a:lnTo>
-                  <a:pt x="14527" y="10463"/>
-                </a:lnTo>
-                <a:lnTo>
-                  <a:pt x="14357" y="10487"/>
-                </a:lnTo>
-                <a:lnTo>
-                  <a:pt x="14162" y="10512"/>
-                </a:lnTo>
-                <a:lnTo>
-                  <a:pt x="13992" y="10560"/>
-                </a:lnTo>
-                <a:lnTo>
-                  <a:pt x="13919" y="10609"/>
-                </a:lnTo>
-                <a:lnTo>
-                  <a:pt x="13870" y="10682"/>
-                </a:lnTo>
-                <a:lnTo>
-                  <a:pt x="13846" y="10731"/>
-                </a:lnTo>
-                <a:lnTo>
-                  <a:pt x="13846" y="10804"/>
-                </a:lnTo>
-                <a:lnTo>
-                  <a:pt x="13870" y="10852"/>
-                </a:lnTo>
-                <a:lnTo>
-                  <a:pt x="13919" y="10901"/>
-                </a:lnTo>
-                <a:lnTo>
-                  <a:pt x="13992" y="10925"/>
-                </a:lnTo>
-                <a:lnTo>
-                  <a:pt x="14065" y="10950"/>
-                </a:lnTo>
-                <a:lnTo>
-                  <a:pt x="14235" y="10950"/>
-                </a:lnTo>
-                <a:lnTo>
-                  <a:pt x="14600" y="10901"/>
-                </a:lnTo>
-                <a:lnTo>
-                  <a:pt x="14819" y="10877"/>
-                </a:lnTo>
-                <a:lnTo>
-                  <a:pt x="14819" y="10877"/>
-                </a:lnTo>
-                <a:lnTo>
-                  <a:pt x="14624" y="11339"/>
-                </a:lnTo>
-                <a:lnTo>
-                  <a:pt x="14478" y="11339"/>
-                </a:lnTo>
-                <a:lnTo>
-                  <a:pt x="14308" y="11315"/>
-                </a:lnTo>
-                <a:lnTo>
-                  <a:pt x="14114" y="11339"/>
-                </a:lnTo>
-                <a:lnTo>
-                  <a:pt x="13919" y="11363"/>
-                </a:lnTo>
-                <a:lnTo>
-                  <a:pt x="13749" y="11436"/>
-                </a:lnTo>
-                <a:lnTo>
-                  <a:pt x="13724" y="11461"/>
-                </a:lnTo>
-                <a:lnTo>
-                  <a:pt x="13749" y="11485"/>
-                </a:lnTo>
-                <a:lnTo>
-                  <a:pt x="13919" y="11558"/>
-                </a:lnTo>
-                <a:lnTo>
-                  <a:pt x="14089" y="11607"/>
-                </a:lnTo>
-                <a:lnTo>
-                  <a:pt x="14430" y="11655"/>
-                </a:lnTo>
-                <a:lnTo>
-                  <a:pt x="14454" y="11655"/>
-                </a:lnTo>
-                <a:lnTo>
-                  <a:pt x="14211" y="12069"/>
-                </a:lnTo>
-                <a:lnTo>
-                  <a:pt x="13968" y="12069"/>
-                </a:lnTo>
-                <a:lnTo>
-                  <a:pt x="13724" y="12093"/>
-                </a:lnTo>
-                <a:lnTo>
-                  <a:pt x="13603" y="12069"/>
-                </a:lnTo>
-                <a:lnTo>
-                  <a:pt x="13481" y="12045"/>
-                </a:lnTo>
-                <a:lnTo>
-                  <a:pt x="13335" y="12020"/>
-                </a:lnTo>
-                <a:lnTo>
-                  <a:pt x="13213" y="12020"/>
-                </a:lnTo>
-                <a:lnTo>
-                  <a:pt x="13189" y="12045"/>
-                </a:lnTo>
-                <a:lnTo>
-                  <a:pt x="13189" y="12069"/>
-                </a:lnTo>
-                <a:lnTo>
-                  <a:pt x="13189" y="12166"/>
-                </a:lnTo>
-                <a:lnTo>
-                  <a:pt x="13238" y="12239"/>
-                </a:lnTo>
-                <a:lnTo>
-                  <a:pt x="13311" y="12312"/>
-                </a:lnTo>
-                <a:lnTo>
-                  <a:pt x="13408" y="12361"/>
-                </a:lnTo>
-                <a:lnTo>
-                  <a:pt x="13530" y="12385"/>
-                </a:lnTo>
-                <a:lnTo>
-                  <a:pt x="13651" y="12410"/>
-                </a:lnTo>
-                <a:lnTo>
-                  <a:pt x="13943" y="12434"/>
-                </a:lnTo>
-                <a:lnTo>
-                  <a:pt x="13603" y="12823"/>
-                </a:lnTo>
-                <a:lnTo>
-                  <a:pt x="13067" y="12726"/>
-                </a:lnTo>
-                <a:lnTo>
-                  <a:pt x="12848" y="12677"/>
-                </a:lnTo>
-                <a:lnTo>
-                  <a:pt x="12727" y="12677"/>
-                </a:lnTo>
-                <a:lnTo>
-                  <a:pt x="12629" y="12702"/>
-                </a:lnTo>
-                <a:lnTo>
-                  <a:pt x="12605" y="12726"/>
-                </a:lnTo>
-                <a:lnTo>
-                  <a:pt x="12605" y="12775"/>
-                </a:lnTo>
-                <a:lnTo>
-                  <a:pt x="12629" y="12848"/>
-                </a:lnTo>
-                <a:lnTo>
-                  <a:pt x="12678" y="12921"/>
-                </a:lnTo>
-                <a:lnTo>
-                  <a:pt x="12751" y="12969"/>
-                </a:lnTo>
-                <a:lnTo>
-                  <a:pt x="12824" y="13018"/>
-                </a:lnTo>
-                <a:lnTo>
-                  <a:pt x="13043" y="13115"/>
-                </a:lnTo>
-                <a:lnTo>
-                  <a:pt x="13262" y="13164"/>
-                </a:lnTo>
-                <a:lnTo>
-                  <a:pt x="13116" y="13286"/>
-                </a:lnTo>
-                <a:lnTo>
-                  <a:pt x="13067" y="13286"/>
-                </a:lnTo>
-                <a:lnTo>
-                  <a:pt x="12605" y="13261"/>
-                </a:lnTo>
-                <a:lnTo>
-                  <a:pt x="12362" y="13213"/>
-                </a:lnTo>
-                <a:lnTo>
-                  <a:pt x="12240" y="13188"/>
-                </a:lnTo>
-                <a:lnTo>
-                  <a:pt x="12094" y="13188"/>
-                </a:lnTo>
-                <a:lnTo>
-                  <a:pt x="12021" y="13213"/>
-                </a:lnTo>
-                <a:lnTo>
-                  <a:pt x="11997" y="13261"/>
-                </a:lnTo>
-                <a:lnTo>
-                  <a:pt x="11972" y="13334"/>
-                </a:lnTo>
-                <a:lnTo>
-                  <a:pt x="12021" y="13383"/>
-                </a:lnTo>
-                <a:lnTo>
-                  <a:pt x="12143" y="13505"/>
-                </a:lnTo>
-                <a:lnTo>
-                  <a:pt x="12289" y="13578"/>
-                </a:lnTo>
-                <a:lnTo>
-                  <a:pt x="12483" y="13626"/>
-                </a:lnTo>
-                <a:lnTo>
-                  <a:pt x="12654" y="13651"/>
-                </a:lnTo>
-                <a:lnTo>
-                  <a:pt x="12240" y="13943"/>
-                </a:lnTo>
-                <a:lnTo>
-                  <a:pt x="12143" y="13918"/>
-                </a:lnTo>
-                <a:lnTo>
-                  <a:pt x="11680" y="13821"/>
-                </a:lnTo>
-                <a:lnTo>
-                  <a:pt x="11461" y="13772"/>
-                </a:lnTo>
-                <a:lnTo>
-                  <a:pt x="11267" y="13724"/>
-                </a:lnTo>
-                <a:lnTo>
-                  <a:pt x="11218" y="13748"/>
-                </a:lnTo>
-                <a:lnTo>
-                  <a:pt x="11218" y="13821"/>
-                </a:lnTo>
-                <a:lnTo>
-                  <a:pt x="11242" y="13894"/>
-                </a:lnTo>
-                <a:lnTo>
-                  <a:pt x="11315" y="13967"/>
-                </a:lnTo>
-                <a:lnTo>
-                  <a:pt x="11437" y="14064"/>
-                </a:lnTo>
-                <a:lnTo>
-                  <a:pt x="11607" y="14137"/>
-                </a:lnTo>
-                <a:lnTo>
-                  <a:pt x="11802" y="14210"/>
-                </a:lnTo>
-                <a:lnTo>
-                  <a:pt x="11437" y="14381"/>
-                </a:lnTo>
-                <a:lnTo>
-                  <a:pt x="11388" y="14332"/>
-                </a:lnTo>
-                <a:lnTo>
-                  <a:pt x="11315" y="14308"/>
-                </a:lnTo>
-                <a:lnTo>
-                  <a:pt x="11194" y="14259"/>
-                </a:lnTo>
-                <a:lnTo>
-                  <a:pt x="10902" y="14235"/>
-                </a:lnTo>
-                <a:lnTo>
-                  <a:pt x="10634" y="14210"/>
-                </a:lnTo>
-                <a:lnTo>
-                  <a:pt x="10512" y="14210"/>
-                </a:lnTo>
-                <a:lnTo>
-                  <a:pt x="10391" y="14235"/>
-                </a:lnTo>
-                <a:lnTo>
-                  <a:pt x="10366" y="14235"/>
-                </a:lnTo>
-                <a:lnTo>
-                  <a:pt x="10366" y="14283"/>
-                </a:lnTo>
-                <a:lnTo>
-                  <a:pt x="10366" y="14332"/>
-                </a:lnTo>
-                <a:lnTo>
-                  <a:pt x="10391" y="14381"/>
-                </a:lnTo>
-                <a:lnTo>
-                  <a:pt x="10488" y="14478"/>
-                </a:lnTo>
-                <a:lnTo>
-                  <a:pt x="10610" y="14551"/>
-                </a:lnTo>
-                <a:lnTo>
-                  <a:pt x="10731" y="14575"/>
-                </a:lnTo>
-                <a:lnTo>
-                  <a:pt x="10877" y="14624"/>
-                </a:lnTo>
-                <a:lnTo>
-                  <a:pt x="10512" y="14746"/>
-                </a:lnTo>
-                <a:lnTo>
-                  <a:pt x="10318" y="14673"/>
-                </a:lnTo>
-                <a:lnTo>
-                  <a:pt x="10123" y="14624"/>
-                </a:lnTo>
-                <a:lnTo>
-                  <a:pt x="9904" y="14600"/>
-                </a:lnTo>
-                <a:lnTo>
-                  <a:pt x="9807" y="14600"/>
-                </a:lnTo>
-                <a:lnTo>
-                  <a:pt x="9709" y="14648"/>
-                </a:lnTo>
-                <a:lnTo>
-                  <a:pt x="9661" y="14673"/>
-                </a:lnTo>
-                <a:lnTo>
-                  <a:pt x="9685" y="14721"/>
-                </a:lnTo>
-                <a:lnTo>
-                  <a:pt x="9734" y="14794"/>
-                </a:lnTo>
-                <a:lnTo>
-                  <a:pt x="9807" y="14843"/>
-                </a:lnTo>
-                <a:lnTo>
-                  <a:pt x="9928" y="14916"/>
-                </a:lnTo>
-                <a:lnTo>
-                  <a:pt x="9612" y="14989"/>
-                </a:lnTo>
-                <a:lnTo>
-                  <a:pt x="9588" y="14940"/>
-                </a:lnTo>
-                <a:lnTo>
-                  <a:pt x="9539" y="14916"/>
-                </a:lnTo>
-                <a:lnTo>
-                  <a:pt x="9417" y="14867"/>
-                </a:lnTo>
-                <a:lnTo>
-                  <a:pt x="9223" y="14843"/>
-                </a:lnTo>
-                <a:lnTo>
-                  <a:pt x="9150" y="14843"/>
-                </a:lnTo>
-                <a:lnTo>
-                  <a:pt x="9052" y="14867"/>
-                </a:lnTo>
-                <a:lnTo>
-                  <a:pt x="9004" y="14916"/>
-                </a:lnTo>
-                <a:lnTo>
-                  <a:pt x="8979" y="14965"/>
-                </a:lnTo>
-                <a:lnTo>
-                  <a:pt x="8979" y="15013"/>
-                </a:lnTo>
-                <a:lnTo>
-                  <a:pt x="9004" y="15062"/>
-                </a:lnTo>
-                <a:lnTo>
-                  <a:pt x="9004" y="15086"/>
-                </a:lnTo>
-                <a:lnTo>
-                  <a:pt x="8663" y="15135"/>
-                </a:lnTo>
-                <a:lnTo>
-                  <a:pt x="8298" y="15159"/>
-                </a:lnTo>
-                <a:lnTo>
-                  <a:pt x="7227" y="15159"/>
-                </a:lnTo>
-                <a:lnTo>
-                  <a:pt x="6862" y="15111"/>
-                </a:lnTo>
-                <a:lnTo>
-                  <a:pt x="6497" y="15062"/>
-                </a:lnTo>
-                <a:lnTo>
-                  <a:pt x="6157" y="14989"/>
-                </a:lnTo>
-                <a:lnTo>
-                  <a:pt x="5816" y="14916"/>
-                </a:lnTo>
-                <a:lnTo>
-                  <a:pt x="5451" y="14819"/>
-                </a:lnTo>
-                <a:lnTo>
-                  <a:pt x="5135" y="14697"/>
-                </a:lnTo>
-                <a:lnTo>
-                  <a:pt x="4794" y="14575"/>
-                </a:lnTo>
-                <a:lnTo>
-                  <a:pt x="4478" y="14405"/>
-                </a:lnTo>
-                <a:lnTo>
-                  <a:pt x="4162" y="14259"/>
-                </a:lnTo>
-                <a:lnTo>
-                  <a:pt x="3845" y="14064"/>
-                </a:lnTo>
-                <a:lnTo>
-                  <a:pt x="3553" y="13870"/>
-                </a:lnTo>
-                <a:lnTo>
-                  <a:pt x="3286" y="13675"/>
-                </a:lnTo>
-                <a:lnTo>
-                  <a:pt x="3018" y="13456"/>
-                </a:lnTo>
-                <a:lnTo>
-                  <a:pt x="2775" y="13237"/>
-                </a:lnTo>
-                <a:lnTo>
-                  <a:pt x="2531" y="12994"/>
-                </a:lnTo>
-                <a:lnTo>
-                  <a:pt x="2312" y="12775"/>
-                </a:lnTo>
-                <a:lnTo>
-                  <a:pt x="2118" y="12507"/>
-                </a:lnTo>
-                <a:lnTo>
-                  <a:pt x="1899" y="12239"/>
-                </a:lnTo>
-                <a:lnTo>
-                  <a:pt x="1728" y="11972"/>
-                </a:lnTo>
-                <a:lnTo>
-                  <a:pt x="1558" y="11704"/>
-                </a:lnTo>
-                <a:lnTo>
-                  <a:pt x="1412" y="11412"/>
-                </a:lnTo>
-                <a:lnTo>
-                  <a:pt x="1266" y="11120"/>
-                </a:lnTo>
-                <a:lnTo>
-                  <a:pt x="1144" y="10828"/>
-                </a:lnTo>
-                <a:lnTo>
-                  <a:pt x="1047" y="10512"/>
-                </a:lnTo>
-                <a:lnTo>
-                  <a:pt x="950" y="10195"/>
-                </a:lnTo>
-                <a:lnTo>
-                  <a:pt x="877" y="9879"/>
-                </a:lnTo>
-                <a:lnTo>
-                  <a:pt x="828" y="9538"/>
-                </a:lnTo>
-                <a:lnTo>
-                  <a:pt x="779" y="9003"/>
-                </a:lnTo>
-                <a:lnTo>
-                  <a:pt x="755" y="8468"/>
-                </a:lnTo>
-                <a:lnTo>
-                  <a:pt x="755" y="7933"/>
-                </a:lnTo>
-                <a:lnTo>
-                  <a:pt x="779" y="7397"/>
-                </a:lnTo>
-                <a:lnTo>
-                  <a:pt x="852" y="6862"/>
-                </a:lnTo>
-                <a:lnTo>
-                  <a:pt x="950" y="6351"/>
-                </a:lnTo>
-                <a:lnTo>
-                  <a:pt x="1096" y="5840"/>
-                </a:lnTo>
-                <a:lnTo>
-                  <a:pt x="1266" y="5353"/>
-                </a:lnTo>
-                <a:lnTo>
-                  <a:pt x="1388" y="5061"/>
-                </a:lnTo>
-                <a:lnTo>
-                  <a:pt x="1558" y="4745"/>
-                </a:lnTo>
-                <a:lnTo>
-                  <a:pt x="1753" y="4404"/>
-                </a:lnTo>
-                <a:lnTo>
-                  <a:pt x="1996" y="4064"/>
-                </a:lnTo>
-                <a:lnTo>
-                  <a:pt x="2264" y="3699"/>
-                </a:lnTo>
-                <a:lnTo>
-                  <a:pt x="2556" y="3334"/>
-                </a:lnTo>
-                <a:lnTo>
-                  <a:pt x="2896" y="2944"/>
-                </a:lnTo>
-                <a:lnTo>
-                  <a:pt x="3261" y="2604"/>
-                </a:lnTo>
-                <a:lnTo>
-                  <a:pt x="3651" y="2263"/>
-                </a:lnTo>
-                <a:lnTo>
-                  <a:pt x="4089" y="1922"/>
-                </a:lnTo>
-                <a:lnTo>
-                  <a:pt x="4527" y="1630"/>
-                </a:lnTo>
-                <a:lnTo>
-                  <a:pt x="5013" y="1363"/>
-                </a:lnTo>
-                <a:lnTo>
-                  <a:pt x="5524" y="1144"/>
-                </a:lnTo>
-                <a:lnTo>
-                  <a:pt x="6035" y="974"/>
-                </a:lnTo>
-                <a:lnTo>
-                  <a:pt x="6327" y="925"/>
-                </a:lnTo>
-                <a:lnTo>
-                  <a:pt x="6595" y="876"/>
-                </a:lnTo>
-                <a:lnTo>
-                  <a:pt x="6887" y="828"/>
-                </a:lnTo>
-                <a:lnTo>
-                  <a:pt x="7179" y="803"/>
-                </a:lnTo>
-                <a:lnTo>
-                  <a:pt x="7544" y="779"/>
-                </a:lnTo>
-                <a:lnTo>
-                  <a:pt x="7933" y="730"/>
-                </a:lnTo>
-                <a:lnTo>
-                  <a:pt x="8322" y="682"/>
-                </a:lnTo>
-                <a:close/>
-                <a:moveTo>
-                  <a:pt x="8152" y="0"/>
-                </a:moveTo>
-                <a:lnTo>
-                  <a:pt x="7763" y="25"/>
-                </a:lnTo>
-                <a:lnTo>
-                  <a:pt x="7373" y="73"/>
-                </a:lnTo>
-                <a:lnTo>
-                  <a:pt x="7081" y="49"/>
-                </a:lnTo>
-                <a:lnTo>
-                  <a:pt x="6789" y="49"/>
-                </a:lnTo>
-                <a:lnTo>
-                  <a:pt x="6473" y="73"/>
-                </a:lnTo>
-                <a:lnTo>
-                  <a:pt x="6157" y="146"/>
-                </a:lnTo>
-                <a:lnTo>
-                  <a:pt x="5841" y="219"/>
-                </a:lnTo>
-                <a:lnTo>
-                  <a:pt x="5549" y="317"/>
-                </a:lnTo>
-                <a:lnTo>
-                  <a:pt x="5232" y="438"/>
-                </a:lnTo>
-                <a:lnTo>
-                  <a:pt x="4916" y="560"/>
-                </a:lnTo>
-                <a:lnTo>
-                  <a:pt x="4332" y="876"/>
-                </a:lnTo>
-                <a:lnTo>
-                  <a:pt x="3748" y="1217"/>
-                </a:lnTo>
-                <a:lnTo>
-                  <a:pt x="3237" y="1606"/>
-                </a:lnTo>
-                <a:lnTo>
-                  <a:pt x="2775" y="1995"/>
-                </a:lnTo>
-                <a:lnTo>
-                  <a:pt x="2507" y="2239"/>
-                </a:lnTo>
-                <a:lnTo>
-                  <a:pt x="2264" y="2482"/>
-                </a:lnTo>
-                <a:lnTo>
-                  <a:pt x="2045" y="2725"/>
-                </a:lnTo>
-                <a:lnTo>
-                  <a:pt x="1826" y="2993"/>
-                </a:lnTo>
-                <a:lnTo>
-                  <a:pt x="1631" y="3261"/>
-                </a:lnTo>
-                <a:lnTo>
-                  <a:pt x="1461" y="3528"/>
-                </a:lnTo>
-                <a:lnTo>
-                  <a:pt x="1120" y="4088"/>
-                </a:lnTo>
-                <a:lnTo>
-                  <a:pt x="852" y="4696"/>
-                </a:lnTo>
-                <a:lnTo>
-                  <a:pt x="609" y="5305"/>
-                </a:lnTo>
-                <a:lnTo>
-                  <a:pt x="414" y="5962"/>
-                </a:lnTo>
-                <a:lnTo>
-                  <a:pt x="220" y="6643"/>
-                </a:lnTo>
-                <a:lnTo>
-                  <a:pt x="122" y="7008"/>
-                </a:lnTo>
-                <a:lnTo>
-                  <a:pt x="74" y="7373"/>
-                </a:lnTo>
-                <a:lnTo>
-                  <a:pt x="25" y="7738"/>
-                </a:lnTo>
-                <a:lnTo>
-                  <a:pt x="1" y="8103"/>
-                </a:lnTo>
-                <a:lnTo>
-                  <a:pt x="1" y="8468"/>
-                </a:lnTo>
-                <a:lnTo>
-                  <a:pt x="25" y="8809"/>
-                </a:lnTo>
-                <a:lnTo>
-                  <a:pt x="49" y="9174"/>
-                </a:lnTo>
-                <a:lnTo>
-                  <a:pt x="98" y="9514"/>
-                </a:lnTo>
-                <a:lnTo>
-                  <a:pt x="195" y="9879"/>
-                </a:lnTo>
-                <a:lnTo>
-                  <a:pt x="268" y="10220"/>
-                </a:lnTo>
-                <a:lnTo>
-                  <a:pt x="390" y="10560"/>
-                </a:lnTo>
-                <a:lnTo>
-                  <a:pt x="512" y="10901"/>
-                </a:lnTo>
-                <a:lnTo>
-                  <a:pt x="658" y="11242"/>
-                </a:lnTo>
-                <a:lnTo>
-                  <a:pt x="804" y="11582"/>
-                </a:lnTo>
-                <a:lnTo>
-                  <a:pt x="1169" y="12264"/>
-                </a:lnTo>
-                <a:lnTo>
-                  <a:pt x="1388" y="12629"/>
-                </a:lnTo>
-                <a:lnTo>
-                  <a:pt x="1631" y="12994"/>
-                </a:lnTo>
-                <a:lnTo>
-                  <a:pt x="1899" y="13334"/>
-                </a:lnTo>
-                <a:lnTo>
-                  <a:pt x="2166" y="13651"/>
-                </a:lnTo>
-                <a:lnTo>
-                  <a:pt x="2434" y="13943"/>
-                </a:lnTo>
-                <a:lnTo>
-                  <a:pt x="2750" y="14235"/>
-                </a:lnTo>
-                <a:lnTo>
-                  <a:pt x="3042" y="14502"/>
-                </a:lnTo>
-                <a:lnTo>
-                  <a:pt x="3383" y="14746"/>
-                </a:lnTo>
-                <a:lnTo>
-                  <a:pt x="3699" y="14965"/>
-                </a:lnTo>
-                <a:lnTo>
-                  <a:pt x="4064" y="15159"/>
-                </a:lnTo>
-                <a:lnTo>
-                  <a:pt x="4429" y="15354"/>
-                </a:lnTo>
-                <a:lnTo>
-                  <a:pt x="4794" y="15500"/>
-                </a:lnTo>
-                <a:lnTo>
-                  <a:pt x="5184" y="15622"/>
-                </a:lnTo>
-                <a:lnTo>
-                  <a:pt x="5597" y="15743"/>
-                </a:lnTo>
-                <a:lnTo>
-                  <a:pt x="6011" y="15816"/>
-                </a:lnTo>
-                <a:lnTo>
-                  <a:pt x="6424" y="15889"/>
-                </a:lnTo>
-                <a:lnTo>
-                  <a:pt x="6862" y="15914"/>
-                </a:lnTo>
-                <a:lnTo>
-                  <a:pt x="7300" y="15938"/>
-                </a:lnTo>
-                <a:lnTo>
-                  <a:pt x="7738" y="15938"/>
-                </a:lnTo>
-                <a:lnTo>
-                  <a:pt x="8152" y="15914"/>
-                </a:lnTo>
-                <a:lnTo>
-                  <a:pt x="8590" y="15889"/>
-                </a:lnTo>
-                <a:lnTo>
-                  <a:pt x="9004" y="15841"/>
-                </a:lnTo>
-                <a:lnTo>
-                  <a:pt x="9442" y="15768"/>
-                </a:lnTo>
-                <a:lnTo>
-                  <a:pt x="9855" y="15670"/>
-                </a:lnTo>
-                <a:lnTo>
-                  <a:pt x="10245" y="15573"/>
-                </a:lnTo>
-                <a:lnTo>
-                  <a:pt x="10658" y="15451"/>
-                </a:lnTo>
-                <a:lnTo>
-                  <a:pt x="11048" y="15305"/>
-                </a:lnTo>
-                <a:lnTo>
-                  <a:pt x="11461" y="15135"/>
-                </a:lnTo>
-                <a:lnTo>
-                  <a:pt x="11826" y="14940"/>
-                </a:lnTo>
-                <a:lnTo>
-                  <a:pt x="12216" y="14721"/>
-                </a:lnTo>
-                <a:lnTo>
-                  <a:pt x="12581" y="14478"/>
-                </a:lnTo>
-                <a:lnTo>
-                  <a:pt x="12921" y="14235"/>
-                </a:lnTo>
-                <a:lnTo>
-                  <a:pt x="13286" y="13943"/>
-                </a:lnTo>
-                <a:lnTo>
-                  <a:pt x="13603" y="13651"/>
-                </a:lnTo>
-                <a:lnTo>
-                  <a:pt x="13895" y="13334"/>
-                </a:lnTo>
-                <a:lnTo>
-                  <a:pt x="14187" y="13018"/>
-                </a:lnTo>
-                <a:lnTo>
-                  <a:pt x="14454" y="12702"/>
-                </a:lnTo>
-                <a:lnTo>
-                  <a:pt x="14697" y="12361"/>
-                </a:lnTo>
-                <a:lnTo>
-                  <a:pt x="14916" y="11996"/>
-                </a:lnTo>
-                <a:lnTo>
-                  <a:pt x="15111" y="11631"/>
-                </a:lnTo>
-                <a:lnTo>
-                  <a:pt x="15135" y="11631"/>
-                </a:lnTo>
-                <a:lnTo>
-                  <a:pt x="15160" y="11582"/>
-                </a:lnTo>
-                <a:lnTo>
-                  <a:pt x="15160" y="11534"/>
-                </a:lnTo>
-                <a:lnTo>
-                  <a:pt x="15330" y="11096"/>
-                </a:lnTo>
-                <a:lnTo>
-                  <a:pt x="15500" y="10658"/>
-                </a:lnTo>
-                <a:lnTo>
-                  <a:pt x="15622" y="10195"/>
-                </a:lnTo>
-                <a:lnTo>
-                  <a:pt x="15719" y="9733"/>
-                </a:lnTo>
-                <a:lnTo>
-                  <a:pt x="15744" y="9709"/>
-                </a:lnTo>
-                <a:lnTo>
-                  <a:pt x="15768" y="9684"/>
-                </a:lnTo>
-                <a:lnTo>
-                  <a:pt x="15792" y="9636"/>
-                </a:lnTo>
-                <a:lnTo>
-                  <a:pt x="15768" y="9611"/>
-                </a:lnTo>
-                <a:lnTo>
-                  <a:pt x="15744" y="9563"/>
-                </a:lnTo>
-                <a:lnTo>
-                  <a:pt x="15792" y="9174"/>
-                </a:lnTo>
-                <a:lnTo>
-                  <a:pt x="15841" y="8760"/>
-                </a:lnTo>
-                <a:lnTo>
-                  <a:pt x="15841" y="8371"/>
-                </a:lnTo>
-                <a:lnTo>
-                  <a:pt x="15817" y="7957"/>
-                </a:lnTo>
-                <a:lnTo>
-                  <a:pt x="15744" y="7105"/>
-                </a:lnTo>
-                <a:lnTo>
-                  <a:pt x="15671" y="6667"/>
-                </a:lnTo>
-                <a:lnTo>
-                  <a:pt x="15598" y="6254"/>
-                </a:lnTo>
-                <a:lnTo>
-                  <a:pt x="15525" y="5840"/>
-                </a:lnTo>
-                <a:lnTo>
-                  <a:pt x="15403" y="5426"/>
-                </a:lnTo>
-                <a:lnTo>
-                  <a:pt x="15281" y="5013"/>
-                </a:lnTo>
-                <a:lnTo>
-                  <a:pt x="15160" y="4623"/>
-                </a:lnTo>
-                <a:lnTo>
-                  <a:pt x="14989" y="4234"/>
-                </a:lnTo>
-                <a:lnTo>
-                  <a:pt x="14819" y="3845"/>
-                </a:lnTo>
-                <a:lnTo>
-                  <a:pt x="14624" y="3480"/>
-                </a:lnTo>
-                <a:lnTo>
-                  <a:pt x="14405" y="3115"/>
-                </a:lnTo>
-                <a:lnTo>
-                  <a:pt x="14162" y="2774"/>
-                </a:lnTo>
-                <a:lnTo>
-                  <a:pt x="13895" y="2458"/>
-                </a:lnTo>
-                <a:lnTo>
-                  <a:pt x="13603" y="2141"/>
-                </a:lnTo>
-                <a:lnTo>
-                  <a:pt x="13286" y="1849"/>
-                </a:lnTo>
-                <a:lnTo>
-                  <a:pt x="12970" y="1582"/>
-                </a:lnTo>
-                <a:lnTo>
-                  <a:pt x="12654" y="1363"/>
-                </a:lnTo>
-                <a:lnTo>
-                  <a:pt x="12313" y="1144"/>
-                </a:lnTo>
-                <a:lnTo>
-                  <a:pt x="11948" y="949"/>
-                </a:lnTo>
-                <a:lnTo>
-                  <a:pt x="11607" y="779"/>
-                </a:lnTo>
-                <a:lnTo>
-                  <a:pt x="11218" y="609"/>
-                </a:lnTo>
-                <a:lnTo>
-                  <a:pt x="10853" y="487"/>
-                </a:lnTo>
-                <a:lnTo>
-                  <a:pt x="10464" y="365"/>
-                </a:lnTo>
-                <a:lnTo>
-                  <a:pt x="10099" y="268"/>
-                </a:lnTo>
-                <a:lnTo>
-                  <a:pt x="9709" y="171"/>
-                </a:lnTo>
-                <a:lnTo>
-                  <a:pt x="9320" y="98"/>
-                </a:lnTo>
-                <a:lnTo>
-                  <a:pt x="8931" y="49"/>
-                </a:lnTo>
-                <a:lnTo>
-                  <a:pt x="8541" y="25"/>
-                </a:lnTo>
-                <a:lnTo>
-                  <a:pt x="8152" y="0"/>
-                </a:lnTo>
-                <a:close/>
-              </a:path>
-            </a:pathLst>
-          </a:custGeom>
-          <a:solidFill>
-            <a:schemeClr val="tx1"/>
-          </a:solidFill>
-          <a:ln>
-            <a:noFill/>
-          </a:ln>
-        </p:spPr>
-        <p:txBody>
-          <a:bodyPr lIns="91425" tIns="91425" rIns="91425" bIns="91425" anchor="ctr" anchorCtr="0">
-            <a:noAutofit/>
-          </a:bodyPr>
-          <a:lstStyle/>
-          <a:p>
-            <a:pPr>
-              <a:spcBef>
-                <a:spcPts val="0"/>
-              </a:spcBef>
-              <a:buNone/>
-            </a:pPr>
-            <a:endParaRPr>
-              <a:solidFill>
-                <a:schemeClr val="tx1"/>
-              </a:solidFill>
-            </a:endParaRPr>
-          </a:p>
         </p:txBody>
       </p:sp>
       <p:sp>
@@ -33256,8 +31131,8 @@
         </p:nvSpPr>
         <p:spPr>
           <a:xfrm>
-            <a:off x="3799401" y="2051575"/>
-            <a:ext cx="1442480" cy="102977"/>
+            <a:off x="2819400" y="1962150"/>
+            <a:ext cx="4069449" cy="116202"/>
           </a:xfrm>
           <a:custGeom>
             <a:avLst/>
@@ -34530,6 +32405,11 @@
         </p:txBody>
       </p:sp>
     </p:spTree>
+    <p:extLst>
+      <p:ext uri="{BB962C8B-B14F-4D97-AF65-F5344CB8AC3E}">
+        <p14:creationId xmlns:p14="http://schemas.microsoft.com/office/powerpoint/2010/main" val="2038964935"/>
+      </p:ext>
+    </p:extLst>
   </p:cSld>
   <p:clrMapOvr>
     <a:masterClrMapping/>

</xml_diff>

<commit_message>
Dropped the "Is it better ?" and added nots on the previous one
</commit_message>
<xml_diff>
--- a/Presentations/SOLID/SOLID.pptx
+++ b/Presentations/SOLID/SOLID.pptx
@@ -5,7 +5,7 @@
     <p:sldMasterId id="2147483657" r:id="rId1"/>
   </p:sldMasterIdLst>
   <p:notesMasterIdLst>
-    <p:notesMasterId r:id="rId57"/>
+    <p:notesMasterId r:id="rId56"/>
   </p:notesMasterIdLst>
   <p:sldIdLst>
     <p:sldId id="256" r:id="rId2"/>
@@ -14,66 +14,65 @@
     <p:sldId id="308" r:id="rId5"/>
     <p:sldId id="300" r:id="rId6"/>
     <p:sldId id="302" r:id="rId7"/>
-    <p:sldId id="301" r:id="rId8"/>
-    <p:sldId id="257" r:id="rId9"/>
-    <p:sldId id="284" r:id="rId10"/>
-    <p:sldId id="303" r:id="rId11"/>
-    <p:sldId id="304" r:id="rId12"/>
-    <p:sldId id="305" r:id="rId13"/>
-    <p:sldId id="306" r:id="rId14"/>
-    <p:sldId id="307" r:id="rId15"/>
-    <p:sldId id="299" r:id="rId16"/>
-    <p:sldId id="285" r:id="rId17"/>
-    <p:sldId id="287" r:id="rId18"/>
-    <p:sldId id="309" r:id="rId19"/>
-    <p:sldId id="310" r:id="rId20"/>
-    <p:sldId id="311" r:id="rId21"/>
-    <p:sldId id="312" r:id="rId22"/>
-    <p:sldId id="314" r:id="rId23"/>
-    <p:sldId id="315" r:id="rId24"/>
-    <p:sldId id="316" r:id="rId25"/>
-    <p:sldId id="288" r:id="rId26"/>
-    <p:sldId id="289" r:id="rId27"/>
-    <p:sldId id="260" r:id="rId28"/>
-    <p:sldId id="319" r:id="rId29"/>
-    <p:sldId id="313" r:id="rId30"/>
-    <p:sldId id="317" r:id="rId31"/>
-    <p:sldId id="318" r:id="rId32"/>
-    <p:sldId id="320" r:id="rId33"/>
-    <p:sldId id="321" r:id="rId34"/>
-    <p:sldId id="322" r:id="rId35"/>
-    <p:sldId id="323" r:id="rId36"/>
-    <p:sldId id="290" r:id="rId37"/>
-    <p:sldId id="291" r:id="rId38"/>
-    <p:sldId id="292" r:id="rId39"/>
-    <p:sldId id="326" r:id="rId40"/>
-    <p:sldId id="324" r:id="rId41"/>
-    <p:sldId id="325" r:id="rId42"/>
-    <p:sldId id="327" r:id="rId43"/>
-    <p:sldId id="328" r:id="rId44"/>
-    <p:sldId id="329" r:id="rId45"/>
-    <p:sldId id="330" r:id="rId46"/>
-    <p:sldId id="293" r:id="rId47"/>
-    <p:sldId id="294" r:id="rId48"/>
-    <p:sldId id="297" r:id="rId49"/>
-    <p:sldId id="298" r:id="rId50"/>
-    <p:sldId id="332" r:id="rId51"/>
-    <p:sldId id="331" r:id="rId52"/>
-    <p:sldId id="333" r:id="rId53"/>
-    <p:sldId id="334" r:id="rId54"/>
-    <p:sldId id="295" r:id="rId55"/>
-    <p:sldId id="336" r:id="rId56"/>
+    <p:sldId id="257" r:id="rId8"/>
+    <p:sldId id="284" r:id="rId9"/>
+    <p:sldId id="303" r:id="rId10"/>
+    <p:sldId id="304" r:id="rId11"/>
+    <p:sldId id="305" r:id="rId12"/>
+    <p:sldId id="306" r:id="rId13"/>
+    <p:sldId id="307" r:id="rId14"/>
+    <p:sldId id="299" r:id="rId15"/>
+    <p:sldId id="285" r:id="rId16"/>
+    <p:sldId id="287" r:id="rId17"/>
+    <p:sldId id="309" r:id="rId18"/>
+    <p:sldId id="310" r:id="rId19"/>
+    <p:sldId id="311" r:id="rId20"/>
+    <p:sldId id="312" r:id="rId21"/>
+    <p:sldId id="314" r:id="rId22"/>
+    <p:sldId id="315" r:id="rId23"/>
+    <p:sldId id="316" r:id="rId24"/>
+    <p:sldId id="288" r:id="rId25"/>
+    <p:sldId id="289" r:id="rId26"/>
+    <p:sldId id="260" r:id="rId27"/>
+    <p:sldId id="319" r:id="rId28"/>
+    <p:sldId id="313" r:id="rId29"/>
+    <p:sldId id="317" r:id="rId30"/>
+    <p:sldId id="318" r:id="rId31"/>
+    <p:sldId id="320" r:id="rId32"/>
+    <p:sldId id="321" r:id="rId33"/>
+    <p:sldId id="322" r:id="rId34"/>
+    <p:sldId id="323" r:id="rId35"/>
+    <p:sldId id="290" r:id="rId36"/>
+    <p:sldId id="291" r:id="rId37"/>
+    <p:sldId id="292" r:id="rId38"/>
+    <p:sldId id="326" r:id="rId39"/>
+    <p:sldId id="324" r:id="rId40"/>
+    <p:sldId id="325" r:id="rId41"/>
+    <p:sldId id="327" r:id="rId42"/>
+    <p:sldId id="328" r:id="rId43"/>
+    <p:sldId id="329" r:id="rId44"/>
+    <p:sldId id="330" r:id="rId45"/>
+    <p:sldId id="293" r:id="rId46"/>
+    <p:sldId id="294" r:id="rId47"/>
+    <p:sldId id="297" r:id="rId48"/>
+    <p:sldId id="298" r:id="rId49"/>
+    <p:sldId id="332" r:id="rId50"/>
+    <p:sldId id="331" r:id="rId51"/>
+    <p:sldId id="333" r:id="rId52"/>
+    <p:sldId id="334" r:id="rId53"/>
+    <p:sldId id="295" r:id="rId54"/>
+    <p:sldId id="336" r:id="rId55"/>
   </p:sldIdLst>
   <p:sldSz cx="9144000" cy="5143500" type="screen16x9"/>
   <p:notesSz cx="6858000" cy="9144000"/>
   <p:embeddedFontLst>
     <p:embeddedFont>
       <p:font typeface="Walter Turncoat" panose="020B0604020202020204" charset="0"/>
-      <p:regular r:id="rId58"/>
+      <p:regular r:id="rId57"/>
     </p:embeddedFont>
     <p:embeddedFont>
       <p:font typeface="Sniglet" panose="020B0604020202020204" charset="0"/>
-      <p:regular r:id="rId59"/>
+      <p:regular r:id="rId58"/>
     </p:embeddedFont>
   </p:embeddedFontLst>
   <p:defaultTextStyle>
@@ -785,7 +784,7 @@
     </p:spTree>
     <p:extLst>
       <p:ext uri="{BB962C8B-B14F-4D97-AF65-F5344CB8AC3E}">
-        <p14:creationId xmlns:p14="http://schemas.microsoft.com/office/powerpoint/2010/main" val="787562656"/>
+        <p14:creationId xmlns:p14="http://schemas.microsoft.com/office/powerpoint/2010/main" val="1770014100"/>
       </p:ext>
     </p:extLst>
   </p:cSld>
@@ -796,122 +795,6 @@
 </file>
 
 <file path=ppt/notesSlides/notesSlide11.xml><?xml version="1.0" encoding="utf-8"?>
-<p:notes xmlns:a="http://schemas.openxmlformats.org/drawingml/2006/main" xmlns:r="http://schemas.openxmlformats.org/officeDocument/2006/relationships" xmlns:p="http://schemas.openxmlformats.org/presentationml/2006/main" showMasterSp="0" showMasterPhAnim="0">
-  <p:cSld>
-    <p:spTree>
-      <p:nvGrpSpPr>
-        <p:cNvPr id="1" name="Shape 55"/>
-        <p:cNvGrpSpPr/>
-        <p:nvPr/>
-      </p:nvGrpSpPr>
-      <p:grpSpPr>
-        <a:xfrm>
-          <a:off x="0" y="0"/>
-          <a:ext cx="0" cy="0"/>
-          <a:chOff x="0" y="0"/>
-          <a:chExt cx="0" cy="0"/>
-        </a:xfrm>
-      </p:grpSpPr>
-      <p:sp>
-        <p:nvSpPr>
-          <p:cNvPr id="56" name="Shape 56"/>
-          <p:cNvSpPr>
-            <a:spLocks noGrp="1" noRot="1" noChangeAspect="1"/>
-          </p:cNvSpPr>
-          <p:nvPr>
-            <p:ph type="sldImg" idx="2"/>
-          </p:nvPr>
-        </p:nvSpPr>
-        <p:spPr>
-          <a:xfrm>
-            <a:off x="381000" y="685800"/>
-            <a:ext cx="6096000" cy="3429000"/>
-          </a:xfrm>
-          <a:custGeom>
-            <a:avLst/>
-            <a:gdLst/>
-            <a:ahLst/>
-            <a:cxnLst/>
-            <a:rect l="0" t="0" r="0" b="0"/>
-            <a:pathLst>
-              <a:path w="120000" h="120000" extrusionOk="0">
-                <a:moveTo>
-                  <a:pt x="0" y="0"/>
-                </a:moveTo>
-                <a:lnTo>
-                  <a:pt x="120000" y="0"/>
-                </a:lnTo>
-                <a:lnTo>
-                  <a:pt x="120000" y="120000"/>
-                </a:lnTo>
-                <a:lnTo>
-                  <a:pt x="0" y="120000"/>
-                </a:lnTo>
-                <a:close/>
-              </a:path>
-            </a:pathLst>
-          </a:custGeom>
-          <a:noFill/>
-          <a:ln w="9525" cap="flat" cmpd="sng">
-            <a:solidFill>
-              <a:srgbClr val="000000"/>
-            </a:solidFill>
-            <a:prstDash val="solid"/>
-            <a:round/>
-            <a:headEnd type="none" w="med" len="med"/>
-            <a:tailEnd type="none" w="med" len="med"/>
-          </a:ln>
-        </p:spPr>
-      </p:sp>
-      <p:sp>
-        <p:nvSpPr>
-          <p:cNvPr id="57" name="Shape 57"/>
-          <p:cNvSpPr txBox="1">
-            <a:spLocks noGrp="1"/>
-          </p:cNvSpPr>
-          <p:nvPr>
-            <p:ph type="body" idx="1"/>
-          </p:nvPr>
-        </p:nvSpPr>
-        <p:spPr>
-          <a:xfrm>
-            <a:off x="685800" y="4343400"/>
-            <a:ext cx="5486399" cy="4114800"/>
-          </a:xfrm>
-          <a:prstGeom prst="rect">
-            <a:avLst/>
-          </a:prstGeom>
-        </p:spPr>
-        <p:txBody>
-          <a:bodyPr lIns="91425" tIns="91425" rIns="91425" bIns="91425" anchor="t" anchorCtr="0">
-            <a:noAutofit/>
-          </a:bodyPr>
-          <a:lstStyle/>
-          <a:p>
-            <a:pPr>
-              <a:spcBef>
-                <a:spcPts val="0"/>
-              </a:spcBef>
-              <a:buNone/>
-            </a:pPr>
-            <a:endParaRPr dirty="0"/>
-          </a:p>
-        </p:txBody>
-      </p:sp>
-    </p:spTree>
-    <p:extLst>
-      <p:ext uri="{BB962C8B-B14F-4D97-AF65-F5344CB8AC3E}">
-        <p14:creationId xmlns:p14="http://schemas.microsoft.com/office/powerpoint/2010/main" val="1770014100"/>
-      </p:ext>
-    </p:extLst>
-  </p:cSld>
-  <p:clrMapOvr>
-    <a:masterClrMapping/>
-  </p:clrMapOvr>
-</p:notes>
-</file>
-
-<file path=ppt/notesSlides/notesSlide12.xml><?xml version="1.0" encoding="utf-8"?>
 <p:notes xmlns:a="http://schemas.openxmlformats.org/drawingml/2006/main" xmlns:r="http://schemas.openxmlformats.org/officeDocument/2006/relationships" xmlns:p="http://schemas.openxmlformats.org/presentationml/2006/main" showMasterSp="0" showMasterPhAnim="0">
   <p:cSld>
     <p:spTree>
@@ -1027,7 +910,7 @@
 </p:notes>
 </file>
 
-<file path=ppt/notesSlides/notesSlide13.xml><?xml version="1.0" encoding="utf-8"?>
+<file path=ppt/notesSlides/notesSlide12.xml><?xml version="1.0" encoding="utf-8"?>
 <p:notes xmlns:a="http://schemas.openxmlformats.org/drawingml/2006/main" xmlns:r="http://schemas.openxmlformats.org/officeDocument/2006/relationships" xmlns:p="http://schemas.openxmlformats.org/presentationml/2006/main" showMasterSp="0" showMasterPhAnim="0">
   <p:cSld>
     <p:spTree>
@@ -1143,7 +1026,7 @@
 </p:notes>
 </file>
 
-<file path=ppt/notesSlides/notesSlide14.xml><?xml version="1.0" encoding="utf-8"?>
+<file path=ppt/notesSlides/notesSlide13.xml><?xml version="1.0" encoding="utf-8"?>
 <p:notes xmlns:a="http://schemas.openxmlformats.org/drawingml/2006/main" xmlns:r="http://schemas.openxmlformats.org/officeDocument/2006/relationships" xmlns:p="http://schemas.openxmlformats.org/presentationml/2006/main" showMasterSp="0" showMasterPhAnim="0">
   <p:cSld>
     <p:spTree>
@@ -1259,7 +1142,7 @@
 </p:notes>
 </file>
 
-<file path=ppt/notesSlides/notesSlide15.xml><?xml version="1.0" encoding="utf-8"?>
+<file path=ppt/notesSlides/notesSlide14.xml><?xml version="1.0" encoding="utf-8"?>
 <p:notes xmlns:a="http://schemas.openxmlformats.org/drawingml/2006/main" xmlns:r="http://schemas.openxmlformats.org/officeDocument/2006/relationships" xmlns:p="http://schemas.openxmlformats.org/presentationml/2006/main" showMasterSp="0" showMasterPhAnim="0">
   <p:cSld>
     <p:spTree>
@@ -1375,7 +1258,7 @@
 </p:notes>
 </file>
 
-<file path=ppt/notesSlides/notesSlide16.xml><?xml version="1.0" encoding="utf-8"?>
+<file path=ppt/notesSlides/notesSlide15.xml><?xml version="1.0" encoding="utf-8"?>
 <p:notes xmlns:a="http://schemas.openxmlformats.org/drawingml/2006/main" xmlns:r="http://schemas.openxmlformats.org/officeDocument/2006/relationships" xmlns:p="http://schemas.openxmlformats.org/presentationml/2006/main" showMasterSp="0" showMasterPhAnim="0">
   <p:cSld>
     <p:spTree>
@@ -1510,7 +1393,7 @@
 </p:notes>
 </file>
 
-<file path=ppt/notesSlides/notesSlide17.xml><?xml version="1.0" encoding="utf-8"?>
+<file path=ppt/notesSlides/notesSlide16.xml><?xml version="1.0" encoding="utf-8"?>
 <p:notes xmlns:a="http://schemas.openxmlformats.org/drawingml/2006/main" xmlns:r="http://schemas.openxmlformats.org/officeDocument/2006/relationships" xmlns:p="http://schemas.openxmlformats.org/presentationml/2006/main" showMasterSp="0" showMasterPhAnim="0">
   <p:cSld>
     <p:spTree>
@@ -1657,7 +1540,7 @@
 </p:notes>
 </file>
 
-<file path=ppt/notesSlides/notesSlide18.xml><?xml version="1.0" encoding="utf-8"?>
+<file path=ppt/notesSlides/notesSlide17.xml><?xml version="1.0" encoding="utf-8"?>
 <p:notes xmlns:a="http://schemas.openxmlformats.org/drawingml/2006/main" xmlns:r="http://schemas.openxmlformats.org/officeDocument/2006/relationships" xmlns:p="http://schemas.openxmlformats.org/presentationml/2006/main" showMasterSp="0" showMasterPhAnim="0">
   <p:cSld>
     <p:spTree>
@@ -1773,7 +1656,7 @@
 </p:notes>
 </file>
 
-<file path=ppt/notesSlides/notesSlide19.xml><?xml version="1.0" encoding="utf-8"?>
+<file path=ppt/notesSlides/notesSlide18.xml><?xml version="1.0" encoding="utf-8"?>
 <p:notes xmlns:a="http://schemas.openxmlformats.org/drawingml/2006/main" xmlns:r="http://schemas.openxmlformats.org/officeDocument/2006/relationships" xmlns:p="http://schemas.openxmlformats.org/presentationml/2006/main" showMasterSp="0" showMasterPhAnim="0">
   <p:cSld>
     <p:spTree>
@@ -1880,6 +1763,122 @@
     <p:extLst>
       <p:ext uri="{BB962C8B-B14F-4D97-AF65-F5344CB8AC3E}">
         <p14:creationId xmlns:p14="http://schemas.microsoft.com/office/powerpoint/2010/main" val="2751931967"/>
+      </p:ext>
+    </p:extLst>
+  </p:cSld>
+  <p:clrMapOvr>
+    <a:masterClrMapping/>
+  </p:clrMapOvr>
+</p:notes>
+</file>
+
+<file path=ppt/notesSlides/notesSlide19.xml><?xml version="1.0" encoding="utf-8"?>
+<p:notes xmlns:a="http://schemas.openxmlformats.org/drawingml/2006/main" xmlns:r="http://schemas.openxmlformats.org/officeDocument/2006/relationships" xmlns:p="http://schemas.openxmlformats.org/presentationml/2006/main" showMasterSp="0" showMasterPhAnim="0">
+  <p:cSld>
+    <p:spTree>
+      <p:nvGrpSpPr>
+        <p:cNvPr id="1" name="Shape 55"/>
+        <p:cNvGrpSpPr/>
+        <p:nvPr/>
+      </p:nvGrpSpPr>
+      <p:grpSpPr>
+        <a:xfrm>
+          <a:off x="0" y="0"/>
+          <a:ext cx="0" cy="0"/>
+          <a:chOff x="0" y="0"/>
+          <a:chExt cx="0" cy="0"/>
+        </a:xfrm>
+      </p:grpSpPr>
+      <p:sp>
+        <p:nvSpPr>
+          <p:cNvPr id="56" name="Shape 56"/>
+          <p:cNvSpPr>
+            <a:spLocks noGrp="1" noRot="1" noChangeAspect="1"/>
+          </p:cNvSpPr>
+          <p:nvPr>
+            <p:ph type="sldImg" idx="2"/>
+          </p:nvPr>
+        </p:nvSpPr>
+        <p:spPr>
+          <a:xfrm>
+            <a:off x="381000" y="685800"/>
+            <a:ext cx="6096000" cy="3429000"/>
+          </a:xfrm>
+          <a:custGeom>
+            <a:avLst/>
+            <a:gdLst/>
+            <a:ahLst/>
+            <a:cxnLst/>
+            <a:rect l="0" t="0" r="0" b="0"/>
+            <a:pathLst>
+              <a:path w="120000" h="120000" extrusionOk="0">
+                <a:moveTo>
+                  <a:pt x="0" y="0"/>
+                </a:moveTo>
+                <a:lnTo>
+                  <a:pt x="120000" y="0"/>
+                </a:lnTo>
+                <a:lnTo>
+                  <a:pt x="120000" y="120000"/>
+                </a:lnTo>
+                <a:lnTo>
+                  <a:pt x="0" y="120000"/>
+                </a:lnTo>
+                <a:close/>
+              </a:path>
+            </a:pathLst>
+          </a:custGeom>
+          <a:noFill/>
+          <a:ln w="9525" cap="flat" cmpd="sng">
+            <a:solidFill>
+              <a:srgbClr val="000000"/>
+            </a:solidFill>
+            <a:prstDash val="solid"/>
+            <a:round/>
+            <a:headEnd type="none" w="med" len="med"/>
+            <a:tailEnd type="none" w="med" len="med"/>
+          </a:ln>
+        </p:spPr>
+      </p:sp>
+      <p:sp>
+        <p:nvSpPr>
+          <p:cNvPr id="57" name="Shape 57"/>
+          <p:cNvSpPr txBox="1">
+            <a:spLocks noGrp="1"/>
+          </p:cNvSpPr>
+          <p:nvPr>
+            <p:ph type="body" idx="1"/>
+          </p:nvPr>
+        </p:nvSpPr>
+        <p:spPr>
+          <a:xfrm>
+            <a:off x="685800" y="4343400"/>
+            <a:ext cx="5486399" cy="4114800"/>
+          </a:xfrm>
+          <a:prstGeom prst="rect">
+            <a:avLst/>
+          </a:prstGeom>
+        </p:spPr>
+        <p:txBody>
+          <a:bodyPr lIns="91425" tIns="91425" rIns="91425" bIns="91425" anchor="t" anchorCtr="0">
+            <a:noAutofit/>
+          </a:bodyPr>
+          <a:lstStyle/>
+          <a:p>
+            <a:pPr>
+              <a:spcBef>
+                <a:spcPts val="0"/>
+              </a:spcBef>
+              <a:buNone/>
+            </a:pPr>
+            <a:endParaRPr dirty="0"/>
+          </a:p>
+        </p:txBody>
+      </p:sp>
+    </p:spTree>
+    <p:extLst>
+      <p:ext uri="{BB962C8B-B14F-4D97-AF65-F5344CB8AC3E}">
+        <p14:creationId xmlns:p14="http://schemas.microsoft.com/office/powerpoint/2010/main" val="3759172711"/>
       </p:ext>
     </p:extLst>
   </p:cSld>
@@ -2115,7 +2114,7 @@
     </p:spTree>
     <p:extLst>
       <p:ext uri="{BB962C8B-B14F-4D97-AF65-F5344CB8AC3E}">
-        <p14:creationId xmlns:p14="http://schemas.microsoft.com/office/powerpoint/2010/main" val="3759172711"/>
+        <p14:creationId xmlns:p14="http://schemas.microsoft.com/office/powerpoint/2010/main" val="3391680942"/>
       </p:ext>
     </p:extLst>
   </p:cSld>
@@ -2126,122 +2125,6 @@
 </file>
 
 <file path=ppt/notesSlides/notesSlide21.xml><?xml version="1.0" encoding="utf-8"?>
-<p:notes xmlns:a="http://schemas.openxmlformats.org/drawingml/2006/main" xmlns:r="http://schemas.openxmlformats.org/officeDocument/2006/relationships" xmlns:p="http://schemas.openxmlformats.org/presentationml/2006/main" showMasterSp="0" showMasterPhAnim="0">
-  <p:cSld>
-    <p:spTree>
-      <p:nvGrpSpPr>
-        <p:cNvPr id="1" name="Shape 55"/>
-        <p:cNvGrpSpPr/>
-        <p:nvPr/>
-      </p:nvGrpSpPr>
-      <p:grpSpPr>
-        <a:xfrm>
-          <a:off x="0" y="0"/>
-          <a:ext cx="0" cy="0"/>
-          <a:chOff x="0" y="0"/>
-          <a:chExt cx="0" cy="0"/>
-        </a:xfrm>
-      </p:grpSpPr>
-      <p:sp>
-        <p:nvSpPr>
-          <p:cNvPr id="56" name="Shape 56"/>
-          <p:cNvSpPr>
-            <a:spLocks noGrp="1" noRot="1" noChangeAspect="1"/>
-          </p:cNvSpPr>
-          <p:nvPr>
-            <p:ph type="sldImg" idx="2"/>
-          </p:nvPr>
-        </p:nvSpPr>
-        <p:spPr>
-          <a:xfrm>
-            <a:off x="381000" y="685800"/>
-            <a:ext cx="6096000" cy="3429000"/>
-          </a:xfrm>
-          <a:custGeom>
-            <a:avLst/>
-            <a:gdLst/>
-            <a:ahLst/>
-            <a:cxnLst/>
-            <a:rect l="0" t="0" r="0" b="0"/>
-            <a:pathLst>
-              <a:path w="120000" h="120000" extrusionOk="0">
-                <a:moveTo>
-                  <a:pt x="0" y="0"/>
-                </a:moveTo>
-                <a:lnTo>
-                  <a:pt x="120000" y="0"/>
-                </a:lnTo>
-                <a:lnTo>
-                  <a:pt x="120000" y="120000"/>
-                </a:lnTo>
-                <a:lnTo>
-                  <a:pt x="0" y="120000"/>
-                </a:lnTo>
-                <a:close/>
-              </a:path>
-            </a:pathLst>
-          </a:custGeom>
-          <a:noFill/>
-          <a:ln w="9525" cap="flat" cmpd="sng">
-            <a:solidFill>
-              <a:srgbClr val="000000"/>
-            </a:solidFill>
-            <a:prstDash val="solid"/>
-            <a:round/>
-            <a:headEnd type="none" w="med" len="med"/>
-            <a:tailEnd type="none" w="med" len="med"/>
-          </a:ln>
-        </p:spPr>
-      </p:sp>
-      <p:sp>
-        <p:nvSpPr>
-          <p:cNvPr id="57" name="Shape 57"/>
-          <p:cNvSpPr txBox="1">
-            <a:spLocks noGrp="1"/>
-          </p:cNvSpPr>
-          <p:nvPr>
-            <p:ph type="body" idx="1"/>
-          </p:nvPr>
-        </p:nvSpPr>
-        <p:spPr>
-          <a:xfrm>
-            <a:off x="685800" y="4343400"/>
-            <a:ext cx="5486399" cy="4114800"/>
-          </a:xfrm>
-          <a:prstGeom prst="rect">
-            <a:avLst/>
-          </a:prstGeom>
-        </p:spPr>
-        <p:txBody>
-          <a:bodyPr lIns="91425" tIns="91425" rIns="91425" bIns="91425" anchor="t" anchorCtr="0">
-            <a:noAutofit/>
-          </a:bodyPr>
-          <a:lstStyle/>
-          <a:p>
-            <a:pPr>
-              <a:spcBef>
-                <a:spcPts val="0"/>
-              </a:spcBef>
-              <a:buNone/>
-            </a:pPr>
-            <a:endParaRPr dirty="0"/>
-          </a:p>
-        </p:txBody>
-      </p:sp>
-    </p:spTree>
-    <p:extLst>
-      <p:ext uri="{BB962C8B-B14F-4D97-AF65-F5344CB8AC3E}">
-        <p14:creationId xmlns:p14="http://schemas.microsoft.com/office/powerpoint/2010/main" val="3391680942"/>
-      </p:ext>
-    </p:extLst>
-  </p:cSld>
-  <p:clrMapOvr>
-    <a:masterClrMapping/>
-  </p:clrMapOvr>
-</p:notes>
-</file>
-
-<file path=ppt/notesSlides/notesSlide22.xml><?xml version="1.0" encoding="utf-8"?>
 <p:notes xmlns:a="http://schemas.openxmlformats.org/drawingml/2006/main" xmlns:r="http://schemas.openxmlformats.org/officeDocument/2006/relationships" xmlns:p="http://schemas.openxmlformats.org/presentationml/2006/main" showMasterSp="0" showMasterPhAnim="0">
   <p:cSld>
     <p:spTree>
@@ -2357,7 +2240,7 @@
 </p:notes>
 </file>
 
-<file path=ppt/notesSlides/notesSlide23.xml><?xml version="1.0" encoding="utf-8"?>
+<file path=ppt/notesSlides/notesSlide22.xml><?xml version="1.0" encoding="utf-8"?>
 <p:notes xmlns:a="http://schemas.openxmlformats.org/drawingml/2006/main" xmlns:r="http://schemas.openxmlformats.org/officeDocument/2006/relationships" xmlns:p="http://schemas.openxmlformats.org/presentationml/2006/main" showMasterSp="0" showMasterPhAnim="0">
   <p:cSld>
     <p:spTree>
@@ -2473,7 +2356,7 @@
 </p:notes>
 </file>
 
-<file path=ppt/notesSlides/notesSlide24.xml><?xml version="1.0" encoding="utf-8"?>
+<file path=ppt/notesSlides/notesSlide23.xml><?xml version="1.0" encoding="utf-8"?>
 <p:notes xmlns:a="http://schemas.openxmlformats.org/drawingml/2006/main" xmlns:r="http://schemas.openxmlformats.org/officeDocument/2006/relationships" xmlns:p="http://schemas.openxmlformats.org/presentationml/2006/main" showMasterSp="0" showMasterPhAnim="0">
   <p:cSld>
     <p:spTree>
@@ -2589,7 +2472,7 @@
 </p:notes>
 </file>
 
-<file path=ppt/notesSlides/notesSlide25.xml><?xml version="1.0" encoding="utf-8"?>
+<file path=ppt/notesSlides/notesSlide24.xml><?xml version="1.0" encoding="utf-8"?>
 <p:notes xmlns:a="http://schemas.openxmlformats.org/drawingml/2006/main" xmlns:r="http://schemas.openxmlformats.org/officeDocument/2006/relationships" xmlns:p="http://schemas.openxmlformats.org/presentationml/2006/main" showMasterSp="0" showMasterPhAnim="0">
   <p:cSld>
     <p:spTree>
@@ -2705,7 +2588,7 @@
 </p:notes>
 </file>
 
-<file path=ppt/notesSlides/notesSlide26.xml><?xml version="1.0" encoding="utf-8"?>
+<file path=ppt/notesSlides/notesSlide25.xml><?xml version="1.0" encoding="utf-8"?>
 <p:notes xmlns:a="http://schemas.openxmlformats.org/drawingml/2006/main" xmlns:r="http://schemas.openxmlformats.org/officeDocument/2006/relationships" xmlns:p="http://schemas.openxmlformats.org/presentationml/2006/main" showMasterSp="0" showMasterPhAnim="0">
   <p:cSld>
     <p:spTree>
@@ -2821,7 +2704,7 @@
 </p:notes>
 </file>
 
-<file path=ppt/notesSlides/notesSlide27.xml><?xml version="1.0" encoding="utf-8"?>
+<file path=ppt/notesSlides/notesSlide26.xml><?xml version="1.0" encoding="utf-8"?>
 <p:notes xmlns:a="http://schemas.openxmlformats.org/drawingml/2006/main" xmlns:r="http://schemas.openxmlformats.org/officeDocument/2006/relationships" xmlns:p="http://schemas.openxmlformats.org/presentationml/2006/main" showMasterSp="0" showMasterPhAnim="0">
   <p:cSld>
     <p:spTree>
@@ -3049,7 +2932,7 @@
 </p:notes>
 </file>
 
-<file path=ppt/notesSlides/notesSlide28.xml><?xml version="1.0" encoding="utf-8"?>
+<file path=ppt/notesSlides/notesSlide27.xml><?xml version="1.0" encoding="utf-8"?>
 <p:notes xmlns:a="http://schemas.openxmlformats.org/drawingml/2006/main" xmlns:r="http://schemas.openxmlformats.org/officeDocument/2006/relationships" xmlns:p="http://schemas.openxmlformats.org/presentationml/2006/main" showMasterSp="0" showMasterPhAnim="0">
   <p:cSld>
     <p:spTree>
@@ -3171,7 +3054,7 @@
 </p:notes>
 </file>
 
-<file path=ppt/notesSlides/notesSlide29.xml><?xml version="1.0" encoding="utf-8"?>
+<file path=ppt/notesSlides/notesSlide28.xml><?xml version="1.0" encoding="utf-8"?>
 <p:notes xmlns:a="http://schemas.openxmlformats.org/drawingml/2006/main" xmlns:r="http://schemas.openxmlformats.org/officeDocument/2006/relationships" xmlns:p="http://schemas.openxmlformats.org/presentationml/2006/main" showMasterSp="0" showMasterPhAnim="0">
   <p:cSld>
     <p:spTree>
@@ -3278,6 +3161,122 @@
     <p:extLst>
       <p:ext uri="{BB962C8B-B14F-4D97-AF65-F5344CB8AC3E}">
         <p14:creationId xmlns:p14="http://schemas.microsoft.com/office/powerpoint/2010/main" val="3050376806"/>
+      </p:ext>
+    </p:extLst>
+  </p:cSld>
+  <p:clrMapOvr>
+    <a:masterClrMapping/>
+  </p:clrMapOvr>
+</p:notes>
+</file>
+
+<file path=ppt/notesSlides/notesSlide29.xml><?xml version="1.0" encoding="utf-8"?>
+<p:notes xmlns:a="http://schemas.openxmlformats.org/drawingml/2006/main" xmlns:r="http://schemas.openxmlformats.org/officeDocument/2006/relationships" xmlns:p="http://schemas.openxmlformats.org/presentationml/2006/main" showMasterSp="0" showMasterPhAnim="0">
+  <p:cSld>
+    <p:spTree>
+      <p:nvGrpSpPr>
+        <p:cNvPr id="1" name="Shape 55"/>
+        <p:cNvGrpSpPr/>
+        <p:nvPr/>
+      </p:nvGrpSpPr>
+      <p:grpSpPr>
+        <a:xfrm>
+          <a:off x="0" y="0"/>
+          <a:ext cx="0" cy="0"/>
+          <a:chOff x="0" y="0"/>
+          <a:chExt cx="0" cy="0"/>
+        </a:xfrm>
+      </p:grpSpPr>
+      <p:sp>
+        <p:nvSpPr>
+          <p:cNvPr id="56" name="Shape 56"/>
+          <p:cNvSpPr>
+            <a:spLocks noGrp="1" noRot="1" noChangeAspect="1"/>
+          </p:cNvSpPr>
+          <p:nvPr>
+            <p:ph type="sldImg" idx="2"/>
+          </p:nvPr>
+        </p:nvSpPr>
+        <p:spPr>
+          <a:xfrm>
+            <a:off x="381000" y="685800"/>
+            <a:ext cx="6096000" cy="3429000"/>
+          </a:xfrm>
+          <a:custGeom>
+            <a:avLst/>
+            <a:gdLst/>
+            <a:ahLst/>
+            <a:cxnLst/>
+            <a:rect l="0" t="0" r="0" b="0"/>
+            <a:pathLst>
+              <a:path w="120000" h="120000" extrusionOk="0">
+                <a:moveTo>
+                  <a:pt x="0" y="0"/>
+                </a:moveTo>
+                <a:lnTo>
+                  <a:pt x="120000" y="0"/>
+                </a:lnTo>
+                <a:lnTo>
+                  <a:pt x="120000" y="120000"/>
+                </a:lnTo>
+                <a:lnTo>
+                  <a:pt x="0" y="120000"/>
+                </a:lnTo>
+                <a:close/>
+              </a:path>
+            </a:pathLst>
+          </a:custGeom>
+          <a:noFill/>
+          <a:ln w="9525" cap="flat" cmpd="sng">
+            <a:solidFill>
+              <a:srgbClr val="000000"/>
+            </a:solidFill>
+            <a:prstDash val="solid"/>
+            <a:round/>
+            <a:headEnd type="none" w="med" len="med"/>
+            <a:tailEnd type="none" w="med" len="med"/>
+          </a:ln>
+        </p:spPr>
+      </p:sp>
+      <p:sp>
+        <p:nvSpPr>
+          <p:cNvPr id="57" name="Shape 57"/>
+          <p:cNvSpPr txBox="1">
+            <a:spLocks noGrp="1"/>
+          </p:cNvSpPr>
+          <p:nvPr>
+            <p:ph type="body" idx="1"/>
+          </p:nvPr>
+        </p:nvSpPr>
+        <p:spPr>
+          <a:xfrm>
+            <a:off x="685800" y="4343400"/>
+            <a:ext cx="5486399" cy="4114800"/>
+          </a:xfrm>
+          <a:prstGeom prst="rect">
+            <a:avLst/>
+          </a:prstGeom>
+        </p:spPr>
+        <p:txBody>
+          <a:bodyPr lIns="91425" tIns="91425" rIns="91425" bIns="91425" anchor="t" anchorCtr="0">
+            <a:noAutofit/>
+          </a:bodyPr>
+          <a:lstStyle/>
+          <a:p>
+            <a:pPr>
+              <a:spcBef>
+                <a:spcPts val="0"/>
+              </a:spcBef>
+              <a:buNone/>
+            </a:pPr>
+            <a:endParaRPr dirty="0"/>
+          </a:p>
+        </p:txBody>
+      </p:sp>
+    </p:spTree>
+    <p:extLst>
+      <p:ext uri="{BB962C8B-B14F-4D97-AF65-F5344CB8AC3E}">
+        <p14:creationId xmlns:p14="http://schemas.microsoft.com/office/powerpoint/2010/main" val="322059226"/>
       </p:ext>
     </p:extLst>
   </p:cSld>
@@ -3404,122 +3403,6 @@
 </file>
 
 <file path=ppt/notesSlides/notesSlide30.xml><?xml version="1.0" encoding="utf-8"?>
-<p:notes xmlns:a="http://schemas.openxmlformats.org/drawingml/2006/main" xmlns:r="http://schemas.openxmlformats.org/officeDocument/2006/relationships" xmlns:p="http://schemas.openxmlformats.org/presentationml/2006/main" showMasterSp="0" showMasterPhAnim="0">
-  <p:cSld>
-    <p:spTree>
-      <p:nvGrpSpPr>
-        <p:cNvPr id="1" name="Shape 55"/>
-        <p:cNvGrpSpPr/>
-        <p:nvPr/>
-      </p:nvGrpSpPr>
-      <p:grpSpPr>
-        <a:xfrm>
-          <a:off x="0" y="0"/>
-          <a:ext cx="0" cy="0"/>
-          <a:chOff x="0" y="0"/>
-          <a:chExt cx="0" cy="0"/>
-        </a:xfrm>
-      </p:grpSpPr>
-      <p:sp>
-        <p:nvSpPr>
-          <p:cNvPr id="56" name="Shape 56"/>
-          <p:cNvSpPr>
-            <a:spLocks noGrp="1" noRot="1" noChangeAspect="1"/>
-          </p:cNvSpPr>
-          <p:nvPr>
-            <p:ph type="sldImg" idx="2"/>
-          </p:nvPr>
-        </p:nvSpPr>
-        <p:spPr>
-          <a:xfrm>
-            <a:off x="381000" y="685800"/>
-            <a:ext cx="6096000" cy="3429000"/>
-          </a:xfrm>
-          <a:custGeom>
-            <a:avLst/>
-            <a:gdLst/>
-            <a:ahLst/>
-            <a:cxnLst/>
-            <a:rect l="0" t="0" r="0" b="0"/>
-            <a:pathLst>
-              <a:path w="120000" h="120000" extrusionOk="0">
-                <a:moveTo>
-                  <a:pt x="0" y="0"/>
-                </a:moveTo>
-                <a:lnTo>
-                  <a:pt x="120000" y="0"/>
-                </a:lnTo>
-                <a:lnTo>
-                  <a:pt x="120000" y="120000"/>
-                </a:lnTo>
-                <a:lnTo>
-                  <a:pt x="0" y="120000"/>
-                </a:lnTo>
-                <a:close/>
-              </a:path>
-            </a:pathLst>
-          </a:custGeom>
-          <a:noFill/>
-          <a:ln w="9525" cap="flat" cmpd="sng">
-            <a:solidFill>
-              <a:srgbClr val="000000"/>
-            </a:solidFill>
-            <a:prstDash val="solid"/>
-            <a:round/>
-            <a:headEnd type="none" w="med" len="med"/>
-            <a:tailEnd type="none" w="med" len="med"/>
-          </a:ln>
-        </p:spPr>
-      </p:sp>
-      <p:sp>
-        <p:nvSpPr>
-          <p:cNvPr id="57" name="Shape 57"/>
-          <p:cNvSpPr txBox="1">
-            <a:spLocks noGrp="1"/>
-          </p:cNvSpPr>
-          <p:nvPr>
-            <p:ph type="body" idx="1"/>
-          </p:nvPr>
-        </p:nvSpPr>
-        <p:spPr>
-          <a:xfrm>
-            <a:off x="685800" y="4343400"/>
-            <a:ext cx="5486399" cy="4114800"/>
-          </a:xfrm>
-          <a:prstGeom prst="rect">
-            <a:avLst/>
-          </a:prstGeom>
-        </p:spPr>
-        <p:txBody>
-          <a:bodyPr lIns="91425" tIns="91425" rIns="91425" bIns="91425" anchor="t" anchorCtr="0">
-            <a:noAutofit/>
-          </a:bodyPr>
-          <a:lstStyle/>
-          <a:p>
-            <a:pPr>
-              <a:spcBef>
-                <a:spcPts val="0"/>
-              </a:spcBef>
-              <a:buNone/>
-            </a:pPr>
-            <a:endParaRPr dirty="0"/>
-          </a:p>
-        </p:txBody>
-      </p:sp>
-    </p:spTree>
-    <p:extLst>
-      <p:ext uri="{BB962C8B-B14F-4D97-AF65-F5344CB8AC3E}">
-        <p14:creationId xmlns:p14="http://schemas.microsoft.com/office/powerpoint/2010/main" val="322059226"/>
-      </p:ext>
-    </p:extLst>
-  </p:cSld>
-  <p:clrMapOvr>
-    <a:masterClrMapping/>
-  </p:clrMapOvr>
-</p:notes>
-</file>
-
-<file path=ppt/notesSlides/notesSlide31.xml><?xml version="1.0" encoding="utf-8"?>
 <p:notes xmlns:a="http://schemas.openxmlformats.org/drawingml/2006/main" xmlns:r="http://schemas.openxmlformats.org/officeDocument/2006/relationships" xmlns:p="http://schemas.openxmlformats.org/presentationml/2006/main" showMasterSp="0" showMasterPhAnim="0">
   <p:cSld>
     <p:spTree>
@@ -3689,7 +3572,7 @@
 </p:notes>
 </file>
 
-<file path=ppt/notesSlides/notesSlide32.xml><?xml version="1.0" encoding="utf-8"?>
+<file path=ppt/notesSlides/notesSlide31.xml><?xml version="1.0" encoding="utf-8"?>
 <p:notes xmlns:a="http://schemas.openxmlformats.org/drawingml/2006/main" xmlns:r="http://schemas.openxmlformats.org/officeDocument/2006/relationships" xmlns:p="http://schemas.openxmlformats.org/presentationml/2006/main" showMasterSp="0" showMasterPhAnim="0">
   <p:cSld>
     <p:spTree>
@@ -3835,7 +3718,7 @@
 </p:notes>
 </file>
 
-<file path=ppt/notesSlides/notesSlide33.xml><?xml version="1.0" encoding="utf-8"?>
+<file path=ppt/notesSlides/notesSlide32.xml><?xml version="1.0" encoding="utf-8"?>
 <p:notes xmlns:a="http://schemas.openxmlformats.org/drawingml/2006/main" xmlns:r="http://schemas.openxmlformats.org/officeDocument/2006/relationships" xmlns:p="http://schemas.openxmlformats.org/presentationml/2006/main" showMasterSp="0" showMasterPhAnim="0">
   <p:cSld>
     <p:spTree>
@@ -3998,7 +3881,7 @@
 </p:notes>
 </file>
 
-<file path=ppt/notesSlides/notesSlide34.xml><?xml version="1.0" encoding="utf-8"?>
+<file path=ppt/notesSlides/notesSlide33.xml><?xml version="1.0" encoding="utf-8"?>
 <p:notes xmlns:a="http://schemas.openxmlformats.org/drawingml/2006/main" xmlns:r="http://schemas.openxmlformats.org/officeDocument/2006/relationships" xmlns:p="http://schemas.openxmlformats.org/presentationml/2006/main" showMasterSp="0" showMasterPhAnim="0">
   <p:cSld>
     <p:spTree>
@@ -4144,7 +4027,7 @@
 </p:notes>
 </file>
 
-<file path=ppt/notesSlides/notesSlide35.xml><?xml version="1.0" encoding="utf-8"?>
+<file path=ppt/notesSlides/notesSlide34.xml><?xml version="1.0" encoding="utf-8"?>
 <p:notes xmlns:a="http://schemas.openxmlformats.org/drawingml/2006/main" xmlns:r="http://schemas.openxmlformats.org/officeDocument/2006/relationships" xmlns:p="http://schemas.openxmlformats.org/presentationml/2006/main" showMasterSp="0" showMasterPhAnim="0">
   <p:cSld>
     <p:spTree>
@@ -4290,7 +4173,7 @@
 </p:notes>
 </file>
 
-<file path=ppt/notesSlides/notesSlide36.xml><?xml version="1.0" encoding="utf-8"?>
+<file path=ppt/notesSlides/notesSlide35.xml><?xml version="1.0" encoding="utf-8"?>
 <p:notes xmlns:a="http://schemas.openxmlformats.org/drawingml/2006/main" xmlns:r="http://schemas.openxmlformats.org/officeDocument/2006/relationships" xmlns:p="http://schemas.openxmlformats.org/presentationml/2006/main" showMasterSp="0" showMasterPhAnim="0">
   <p:cSld>
     <p:spTree>
@@ -4406,7 +4289,7 @@
 </p:notes>
 </file>
 
-<file path=ppt/notesSlides/notesSlide37.xml><?xml version="1.0" encoding="utf-8"?>
+<file path=ppt/notesSlides/notesSlide36.xml><?xml version="1.0" encoding="utf-8"?>
 <p:notes xmlns:a="http://schemas.openxmlformats.org/drawingml/2006/main" xmlns:r="http://schemas.openxmlformats.org/officeDocument/2006/relationships" xmlns:p="http://schemas.openxmlformats.org/presentationml/2006/main" showMasterSp="0" showMasterPhAnim="0">
   <p:cSld>
     <p:spTree>
@@ -4522,7 +4405,7 @@
 </p:notes>
 </file>
 
-<file path=ppt/notesSlides/notesSlide38.xml><?xml version="1.0" encoding="utf-8"?>
+<file path=ppt/notesSlides/notesSlide37.xml><?xml version="1.0" encoding="utf-8"?>
 <p:notes xmlns:a="http://schemas.openxmlformats.org/drawingml/2006/main" xmlns:r="http://schemas.openxmlformats.org/officeDocument/2006/relationships" xmlns:p="http://schemas.openxmlformats.org/presentationml/2006/main" showMasterSp="0" showMasterPhAnim="0">
   <p:cSld>
     <p:spTree>
@@ -4638,7 +4521,7 @@
 </p:notes>
 </file>
 
-<file path=ppt/notesSlides/notesSlide39.xml><?xml version="1.0" encoding="utf-8"?>
+<file path=ppt/notesSlides/notesSlide38.xml><?xml version="1.0" encoding="utf-8"?>
 <p:notes xmlns:a="http://schemas.openxmlformats.org/drawingml/2006/main" xmlns:r="http://schemas.openxmlformats.org/officeDocument/2006/relationships" xmlns:p="http://schemas.openxmlformats.org/presentationml/2006/main" showMasterSp="0" showMasterPhAnim="0">
   <p:cSld>
     <p:spTree>
@@ -4745,6 +4628,122 @@
     <p:extLst>
       <p:ext uri="{BB962C8B-B14F-4D97-AF65-F5344CB8AC3E}">
         <p14:creationId xmlns:p14="http://schemas.microsoft.com/office/powerpoint/2010/main" val="2267278333"/>
+      </p:ext>
+    </p:extLst>
+  </p:cSld>
+  <p:clrMapOvr>
+    <a:masterClrMapping/>
+  </p:clrMapOvr>
+</p:notes>
+</file>
+
+<file path=ppt/notesSlides/notesSlide39.xml><?xml version="1.0" encoding="utf-8"?>
+<p:notes xmlns:a="http://schemas.openxmlformats.org/drawingml/2006/main" xmlns:r="http://schemas.openxmlformats.org/officeDocument/2006/relationships" xmlns:p="http://schemas.openxmlformats.org/presentationml/2006/main" showMasterSp="0" showMasterPhAnim="0">
+  <p:cSld>
+    <p:spTree>
+      <p:nvGrpSpPr>
+        <p:cNvPr id="1" name="Shape 55"/>
+        <p:cNvGrpSpPr/>
+        <p:nvPr/>
+      </p:nvGrpSpPr>
+      <p:grpSpPr>
+        <a:xfrm>
+          <a:off x="0" y="0"/>
+          <a:ext cx="0" cy="0"/>
+          <a:chOff x="0" y="0"/>
+          <a:chExt cx="0" cy="0"/>
+        </a:xfrm>
+      </p:grpSpPr>
+      <p:sp>
+        <p:nvSpPr>
+          <p:cNvPr id="56" name="Shape 56"/>
+          <p:cNvSpPr>
+            <a:spLocks noGrp="1" noRot="1" noChangeAspect="1"/>
+          </p:cNvSpPr>
+          <p:nvPr>
+            <p:ph type="sldImg" idx="2"/>
+          </p:nvPr>
+        </p:nvSpPr>
+        <p:spPr>
+          <a:xfrm>
+            <a:off x="381000" y="685800"/>
+            <a:ext cx="6096000" cy="3429000"/>
+          </a:xfrm>
+          <a:custGeom>
+            <a:avLst/>
+            <a:gdLst/>
+            <a:ahLst/>
+            <a:cxnLst/>
+            <a:rect l="0" t="0" r="0" b="0"/>
+            <a:pathLst>
+              <a:path w="120000" h="120000" extrusionOk="0">
+                <a:moveTo>
+                  <a:pt x="0" y="0"/>
+                </a:moveTo>
+                <a:lnTo>
+                  <a:pt x="120000" y="0"/>
+                </a:lnTo>
+                <a:lnTo>
+                  <a:pt x="120000" y="120000"/>
+                </a:lnTo>
+                <a:lnTo>
+                  <a:pt x="0" y="120000"/>
+                </a:lnTo>
+                <a:close/>
+              </a:path>
+            </a:pathLst>
+          </a:custGeom>
+          <a:noFill/>
+          <a:ln w="9525" cap="flat" cmpd="sng">
+            <a:solidFill>
+              <a:srgbClr val="000000"/>
+            </a:solidFill>
+            <a:prstDash val="solid"/>
+            <a:round/>
+            <a:headEnd type="none" w="med" len="med"/>
+            <a:tailEnd type="none" w="med" len="med"/>
+          </a:ln>
+        </p:spPr>
+      </p:sp>
+      <p:sp>
+        <p:nvSpPr>
+          <p:cNvPr id="57" name="Shape 57"/>
+          <p:cNvSpPr txBox="1">
+            <a:spLocks noGrp="1"/>
+          </p:cNvSpPr>
+          <p:nvPr>
+            <p:ph type="body" idx="1"/>
+          </p:nvPr>
+        </p:nvSpPr>
+        <p:spPr>
+          <a:xfrm>
+            <a:off x="685800" y="4343400"/>
+            <a:ext cx="5486399" cy="4114800"/>
+          </a:xfrm>
+          <a:prstGeom prst="rect">
+            <a:avLst/>
+          </a:prstGeom>
+        </p:spPr>
+        <p:txBody>
+          <a:bodyPr lIns="91425" tIns="91425" rIns="91425" bIns="91425" anchor="t" anchorCtr="0">
+            <a:noAutofit/>
+          </a:bodyPr>
+          <a:lstStyle/>
+          <a:p>
+            <a:pPr>
+              <a:spcBef>
+                <a:spcPts val="0"/>
+              </a:spcBef>
+              <a:buNone/>
+            </a:pPr>
+            <a:endParaRPr dirty="0"/>
+          </a:p>
+        </p:txBody>
+      </p:sp>
+    </p:spTree>
+    <p:extLst>
+      <p:ext uri="{BB962C8B-B14F-4D97-AF65-F5344CB8AC3E}">
+        <p14:creationId xmlns:p14="http://schemas.microsoft.com/office/powerpoint/2010/main" val="3747608710"/>
       </p:ext>
     </p:extLst>
   </p:cSld>
@@ -4976,7 +4975,7 @@
     </p:spTree>
     <p:extLst>
       <p:ext uri="{BB962C8B-B14F-4D97-AF65-F5344CB8AC3E}">
-        <p14:creationId xmlns:p14="http://schemas.microsoft.com/office/powerpoint/2010/main" val="3747608710"/>
+        <p14:creationId xmlns:p14="http://schemas.microsoft.com/office/powerpoint/2010/main" val="901973347"/>
       </p:ext>
     </p:extLst>
   </p:cSld>
@@ -4987,122 +4986,6 @@
 </file>
 
 <file path=ppt/notesSlides/notesSlide41.xml><?xml version="1.0" encoding="utf-8"?>
-<p:notes xmlns:a="http://schemas.openxmlformats.org/drawingml/2006/main" xmlns:r="http://schemas.openxmlformats.org/officeDocument/2006/relationships" xmlns:p="http://schemas.openxmlformats.org/presentationml/2006/main" showMasterSp="0" showMasterPhAnim="0">
-  <p:cSld>
-    <p:spTree>
-      <p:nvGrpSpPr>
-        <p:cNvPr id="1" name="Shape 55"/>
-        <p:cNvGrpSpPr/>
-        <p:nvPr/>
-      </p:nvGrpSpPr>
-      <p:grpSpPr>
-        <a:xfrm>
-          <a:off x="0" y="0"/>
-          <a:ext cx="0" cy="0"/>
-          <a:chOff x="0" y="0"/>
-          <a:chExt cx="0" cy="0"/>
-        </a:xfrm>
-      </p:grpSpPr>
-      <p:sp>
-        <p:nvSpPr>
-          <p:cNvPr id="56" name="Shape 56"/>
-          <p:cNvSpPr>
-            <a:spLocks noGrp="1" noRot="1" noChangeAspect="1"/>
-          </p:cNvSpPr>
-          <p:nvPr>
-            <p:ph type="sldImg" idx="2"/>
-          </p:nvPr>
-        </p:nvSpPr>
-        <p:spPr>
-          <a:xfrm>
-            <a:off x="381000" y="685800"/>
-            <a:ext cx="6096000" cy="3429000"/>
-          </a:xfrm>
-          <a:custGeom>
-            <a:avLst/>
-            <a:gdLst/>
-            <a:ahLst/>
-            <a:cxnLst/>
-            <a:rect l="0" t="0" r="0" b="0"/>
-            <a:pathLst>
-              <a:path w="120000" h="120000" extrusionOk="0">
-                <a:moveTo>
-                  <a:pt x="0" y="0"/>
-                </a:moveTo>
-                <a:lnTo>
-                  <a:pt x="120000" y="0"/>
-                </a:lnTo>
-                <a:lnTo>
-                  <a:pt x="120000" y="120000"/>
-                </a:lnTo>
-                <a:lnTo>
-                  <a:pt x="0" y="120000"/>
-                </a:lnTo>
-                <a:close/>
-              </a:path>
-            </a:pathLst>
-          </a:custGeom>
-          <a:noFill/>
-          <a:ln w="9525" cap="flat" cmpd="sng">
-            <a:solidFill>
-              <a:srgbClr val="000000"/>
-            </a:solidFill>
-            <a:prstDash val="solid"/>
-            <a:round/>
-            <a:headEnd type="none" w="med" len="med"/>
-            <a:tailEnd type="none" w="med" len="med"/>
-          </a:ln>
-        </p:spPr>
-      </p:sp>
-      <p:sp>
-        <p:nvSpPr>
-          <p:cNvPr id="57" name="Shape 57"/>
-          <p:cNvSpPr txBox="1">
-            <a:spLocks noGrp="1"/>
-          </p:cNvSpPr>
-          <p:nvPr>
-            <p:ph type="body" idx="1"/>
-          </p:nvPr>
-        </p:nvSpPr>
-        <p:spPr>
-          <a:xfrm>
-            <a:off x="685800" y="4343400"/>
-            <a:ext cx="5486399" cy="4114800"/>
-          </a:xfrm>
-          <a:prstGeom prst="rect">
-            <a:avLst/>
-          </a:prstGeom>
-        </p:spPr>
-        <p:txBody>
-          <a:bodyPr lIns="91425" tIns="91425" rIns="91425" bIns="91425" anchor="t" anchorCtr="0">
-            <a:noAutofit/>
-          </a:bodyPr>
-          <a:lstStyle/>
-          <a:p>
-            <a:pPr>
-              <a:spcBef>
-                <a:spcPts val="0"/>
-              </a:spcBef>
-              <a:buNone/>
-            </a:pPr>
-            <a:endParaRPr dirty="0"/>
-          </a:p>
-        </p:txBody>
-      </p:sp>
-    </p:spTree>
-    <p:extLst>
-      <p:ext uri="{BB962C8B-B14F-4D97-AF65-F5344CB8AC3E}">
-        <p14:creationId xmlns:p14="http://schemas.microsoft.com/office/powerpoint/2010/main" val="901973347"/>
-      </p:ext>
-    </p:extLst>
-  </p:cSld>
-  <p:clrMapOvr>
-    <a:masterClrMapping/>
-  </p:clrMapOvr>
-</p:notes>
-</file>
-
-<file path=ppt/notesSlides/notesSlide42.xml><?xml version="1.0" encoding="utf-8"?>
 <p:notes xmlns:a="http://schemas.openxmlformats.org/drawingml/2006/main" xmlns:r="http://schemas.openxmlformats.org/officeDocument/2006/relationships" xmlns:p="http://schemas.openxmlformats.org/presentationml/2006/main" showMasterSp="0" showMasterPhAnim="0">
   <p:cSld>
     <p:spTree>
@@ -5218,7 +5101,7 @@
 </p:notes>
 </file>
 
-<file path=ppt/notesSlides/notesSlide43.xml><?xml version="1.0" encoding="utf-8"?>
+<file path=ppt/notesSlides/notesSlide42.xml><?xml version="1.0" encoding="utf-8"?>
 <p:notes xmlns:a="http://schemas.openxmlformats.org/drawingml/2006/main" xmlns:r="http://schemas.openxmlformats.org/officeDocument/2006/relationships" xmlns:p="http://schemas.openxmlformats.org/presentationml/2006/main" showMasterSp="0" showMasterPhAnim="0">
   <p:cSld>
     <p:spTree>
@@ -5334,7 +5217,7 @@
 </p:notes>
 </file>
 
-<file path=ppt/notesSlides/notesSlide44.xml><?xml version="1.0" encoding="utf-8"?>
+<file path=ppt/notesSlides/notesSlide43.xml><?xml version="1.0" encoding="utf-8"?>
 <p:notes xmlns:a="http://schemas.openxmlformats.org/drawingml/2006/main" xmlns:r="http://schemas.openxmlformats.org/officeDocument/2006/relationships" xmlns:p="http://schemas.openxmlformats.org/presentationml/2006/main" showMasterSp="0" showMasterPhAnim="0">
   <p:cSld>
     <p:spTree>
@@ -5450,7 +5333,7 @@
 </p:notes>
 </file>
 
-<file path=ppt/notesSlides/notesSlide45.xml><?xml version="1.0" encoding="utf-8"?>
+<file path=ppt/notesSlides/notesSlide44.xml><?xml version="1.0" encoding="utf-8"?>
 <p:notes xmlns:a="http://schemas.openxmlformats.org/drawingml/2006/main" xmlns:r="http://schemas.openxmlformats.org/officeDocument/2006/relationships" xmlns:p="http://schemas.openxmlformats.org/presentationml/2006/main" showMasterSp="0" showMasterPhAnim="0">
   <p:cSld>
     <p:spTree>
@@ -5566,7 +5449,7 @@
 </p:notes>
 </file>
 
-<file path=ppt/notesSlides/notesSlide46.xml><?xml version="1.0" encoding="utf-8"?>
+<file path=ppt/notesSlides/notesSlide45.xml><?xml version="1.0" encoding="utf-8"?>
 <p:notes xmlns:a="http://schemas.openxmlformats.org/drawingml/2006/main" xmlns:r="http://schemas.openxmlformats.org/officeDocument/2006/relationships" xmlns:p="http://schemas.openxmlformats.org/presentationml/2006/main" showMasterSp="0" showMasterPhAnim="0">
   <p:cSld>
     <p:spTree>
@@ -5682,7 +5565,7 @@
 </p:notes>
 </file>
 
-<file path=ppt/notesSlides/notesSlide47.xml><?xml version="1.0" encoding="utf-8"?>
+<file path=ppt/notesSlides/notesSlide46.xml><?xml version="1.0" encoding="utf-8"?>
 <p:notes xmlns:a="http://schemas.openxmlformats.org/drawingml/2006/main" xmlns:r="http://schemas.openxmlformats.org/officeDocument/2006/relationships" xmlns:p="http://schemas.openxmlformats.org/presentationml/2006/main" showMasterSp="0" showMasterPhAnim="0">
   <p:cSld>
     <p:spTree>
@@ -5798,7 +5681,7 @@
 </p:notes>
 </file>
 
-<file path=ppt/notesSlides/notesSlide48.xml><?xml version="1.0" encoding="utf-8"?>
+<file path=ppt/notesSlides/notesSlide47.xml><?xml version="1.0" encoding="utf-8"?>
 <p:notes xmlns:a="http://schemas.openxmlformats.org/drawingml/2006/main" xmlns:r="http://schemas.openxmlformats.org/officeDocument/2006/relationships" xmlns:p="http://schemas.openxmlformats.org/presentationml/2006/main" showMasterSp="0" showMasterPhAnim="0">
   <p:cSld>
     <p:spTree>
@@ -5914,7 +5797,7 @@
 </p:notes>
 </file>
 
-<file path=ppt/notesSlides/notesSlide49.xml><?xml version="1.0" encoding="utf-8"?>
+<file path=ppt/notesSlides/notesSlide48.xml><?xml version="1.0" encoding="utf-8"?>
 <p:notes xmlns:a="http://schemas.openxmlformats.org/drawingml/2006/main" xmlns:r="http://schemas.openxmlformats.org/officeDocument/2006/relationships" xmlns:p="http://schemas.openxmlformats.org/presentationml/2006/main" showMasterSp="0" showMasterPhAnim="0">
   <p:cSld>
     <p:spTree>
@@ -6021,6 +5904,122 @@
     <p:extLst>
       <p:ext uri="{BB962C8B-B14F-4D97-AF65-F5344CB8AC3E}">
         <p14:creationId xmlns:p14="http://schemas.microsoft.com/office/powerpoint/2010/main" val="3433693195"/>
+      </p:ext>
+    </p:extLst>
+  </p:cSld>
+  <p:clrMapOvr>
+    <a:masterClrMapping/>
+  </p:clrMapOvr>
+</p:notes>
+</file>
+
+<file path=ppt/notesSlides/notesSlide49.xml><?xml version="1.0" encoding="utf-8"?>
+<p:notes xmlns:a="http://schemas.openxmlformats.org/drawingml/2006/main" xmlns:r="http://schemas.openxmlformats.org/officeDocument/2006/relationships" xmlns:p="http://schemas.openxmlformats.org/presentationml/2006/main" showMasterSp="0" showMasterPhAnim="0">
+  <p:cSld>
+    <p:spTree>
+      <p:nvGrpSpPr>
+        <p:cNvPr id="1" name="Shape 55"/>
+        <p:cNvGrpSpPr/>
+        <p:nvPr/>
+      </p:nvGrpSpPr>
+      <p:grpSpPr>
+        <a:xfrm>
+          <a:off x="0" y="0"/>
+          <a:ext cx="0" cy="0"/>
+          <a:chOff x="0" y="0"/>
+          <a:chExt cx="0" cy="0"/>
+        </a:xfrm>
+      </p:grpSpPr>
+      <p:sp>
+        <p:nvSpPr>
+          <p:cNvPr id="56" name="Shape 56"/>
+          <p:cNvSpPr>
+            <a:spLocks noGrp="1" noRot="1" noChangeAspect="1"/>
+          </p:cNvSpPr>
+          <p:nvPr>
+            <p:ph type="sldImg" idx="2"/>
+          </p:nvPr>
+        </p:nvSpPr>
+        <p:spPr>
+          <a:xfrm>
+            <a:off x="381000" y="685800"/>
+            <a:ext cx="6096000" cy="3429000"/>
+          </a:xfrm>
+          <a:custGeom>
+            <a:avLst/>
+            <a:gdLst/>
+            <a:ahLst/>
+            <a:cxnLst/>
+            <a:rect l="0" t="0" r="0" b="0"/>
+            <a:pathLst>
+              <a:path w="120000" h="120000" extrusionOk="0">
+                <a:moveTo>
+                  <a:pt x="0" y="0"/>
+                </a:moveTo>
+                <a:lnTo>
+                  <a:pt x="120000" y="0"/>
+                </a:lnTo>
+                <a:lnTo>
+                  <a:pt x="120000" y="120000"/>
+                </a:lnTo>
+                <a:lnTo>
+                  <a:pt x="0" y="120000"/>
+                </a:lnTo>
+                <a:close/>
+              </a:path>
+            </a:pathLst>
+          </a:custGeom>
+          <a:noFill/>
+          <a:ln w="9525" cap="flat" cmpd="sng">
+            <a:solidFill>
+              <a:srgbClr val="000000"/>
+            </a:solidFill>
+            <a:prstDash val="solid"/>
+            <a:round/>
+            <a:headEnd type="none" w="med" len="med"/>
+            <a:tailEnd type="none" w="med" len="med"/>
+          </a:ln>
+        </p:spPr>
+      </p:sp>
+      <p:sp>
+        <p:nvSpPr>
+          <p:cNvPr id="57" name="Shape 57"/>
+          <p:cNvSpPr txBox="1">
+            <a:spLocks noGrp="1"/>
+          </p:cNvSpPr>
+          <p:nvPr>
+            <p:ph type="body" idx="1"/>
+          </p:nvPr>
+        </p:nvSpPr>
+        <p:spPr>
+          <a:xfrm>
+            <a:off x="685800" y="4343400"/>
+            <a:ext cx="5486399" cy="4114800"/>
+          </a:xfrm>
+          <a:prstGeom prst="rect">
+            <a:avLst/>
+          </a:prstGeom>
+        </p:spPr>
+        <p:txBody>
+          <a:bodyPr lIns="91425" tIns="91425" rIns="91425" bIns="91425" anchor="t" anchorCtr="0">
+            <a:noAutofit/>
+          </a:bodyPr>
+          <a:lstStyle/>
+          <a:p>
+            <a:pPr>
+              <a:spcBef>
+                <a:spcPts val="0"/>
+              </a:spcBef>
+              <a:buNone/>
+            </a:pPr>
+            <a:endParaRPr dirty="0"/>
+          </a:p>
+        </p:txBody>
+      </p:sp>
+    </p:spTree>
+    <p:extLst>
+      <p:ext uri="{BB962C8B-B14F-4D97-AF65-F5344CB8AC3E}">
+        <p14:creationId xmlns:p14="http://schemas.microsoft.com/office/powerpoint/2010/main" val="1444898179"/>
       </p:ext>
     </p:extLst>
   </p:cSld>
@@ -6252,7 +6251,7 @@
     </p:spTree>
     <p:extLst>
       <p:ext uri="{BB962C8B-B14F-4D97-AF65-F5344CB8AC3E}">
-        <p14:creationId xmlns:p14="http://schemas.microsoft.com/office/powerpoint/2010/main" val="1444898179"/>
+        <p14:creationId xmlns:p14="http://schemas.microsoft.com/office/powerpoint/2010/main" val="1707559571"/>
       </p:ext>
     </p:extLst>
   </p:cSld>
@@ -6263,122 +6262,6 @@
 </file>
 
 <file path=ppt/notesSlides/notesSlide51.xml><?xml version="1.0" encoding="utf-8"?>
-<p:notes xmlns:a="http://schemas.openxmlformats.org/drawingml/2006/main" xmlns:r="http://schemas.openxmlformats.org/officeDocument/2006/relationships" xmlns:p="http://schemas.openxmlformats.org/presentationml/2006/main" showMasterSp="0" showMasterPhAnim="0">
-  <p:cSld>
-    <p:spTree>
-      <p:nvGrpSpPr>
-        <p:cNvPr id="1" name="Shape 55"/>
-        <p:cNvGrpSpPr/>
-        <p:nvPr/>
-      </p:nvGrpSpPr>
-      <p:grpSpPr>
-        <a:xfrm>
-          <a:off x="0" y="0"/>
-          <a:ext cx="0" cy="0"/>
-          <a:chOff x="0" y="0"/>
-          <a:chExt cx="0" cy="0"/>
-        </a:xfrm>
-      </p:grpSpPr>
-      <p:sp>
-        <p:nvSpPr>
-          <p:cNvPr id="56" name="Shape 56"/>
-          <p:cNvSpPr>
-            <a:spLocks noGrp="1" noRot="1" noChangeAspect="1"/>
-          </p:cNvSpPr>
-          <p:nvPr>
-            <p:ph type="sldImg" idx="2"/>
-          </p:nvPr>
-        </p:nvSpPr>
-        <p:spPr>
-          <a:xfrm>
-            <a:off x="381000" y="685800"/>
-            <a:ext cx="6096000" cy="3429000"/>
-          </a:xfrm>
-          <a:custGeom>
-            <a:avLst/>
-            <a:gdLst/>
-            <a:ahLst/>
-            <a:cxnLst/>
-            <a:rect l="0" t="0" r="0" b="0"/>
-            <a:pathLst>
-              <a:path w="120000" h="120000" extrusionOk="0">
-                <a:moveTo>
-                  <a:pt x="0" y="0"/>
-                </a:moveTo>
-                <a:lnTo>
-                  <a:pt x="120000" y="0"/>
-                </a:lnTo>
-                <a:lnTo>
-                  <a:pt x="120000" y="120000"/>
-                </a:lnTo>
-                <a:lnTo>
-                  <a:pt x="0" y="120000"/>
-                </a:lnTo>
-                <a:close/>
-              </a:path>
-            </a:pathLst>
-          </a:custGeom>
-          <a:noFill/>
-          <a:ln w="9525" cap="flat" cmpd="sng">
-            <a:solidFill>
-              <a:srgbClr val="000000"/>
-            </a:solidFill>
-            <a:prstDash val="solid"/>
-            <a:round/>
-            <a:headEnd type="none" w="med" len="med"/>
-            <a:tailEnd type="none" w="med" len="med"/>
-          </a:ln>
-        </p:spPr>
-      </p:sp>
-      <p:sp>
-        <p:nvSpPr>
-          <p:cNvPr id="57" name="Shape 57"/>
-          <p:cNvSpPr txBox="1">
-            <a:spLocks noGrp="1"/>
-          </p:cNvSpPr>
-          <p:nvPr>
-            <p:ph type="body" idx="1"/>
-          </p:nvPr>
-        </p:nvSpPr>
-        <p:spPr>
-          <a:xfrm>
-            <a:off x="685800" y="4343400"/>
-            <a:ext cx="5486399" cy="4114800"/>
-          </a:xfrm>
-          <a:prstGeom prst="rect">
-            <a:avLst/>
-          </a:prstGeom>
-        </p:spPr>
-        <p:txBody>
-          <a:bodyPr lIns="91425" tIns="91425" rIns="91425" bIns="91425" anchor="t" anchorCtr="0">
-            <a:noAutofit/>
-          </a:bodyPr>
-          <a:lstStyle/>
-          <a:p>
-            <a:pPr>
-              <a:spcBef>
-                <a:spcPts val="0"/>
-              </a:spcBef>
-              <a:buNone/>
-            </a:pPr>
-            <a:endParaRPr dirty="0"/>
-          </a:p>
-        </p:txBody>
-      </p:sp>
-    </p:spTree>
-    <p:extLst>
-      <p:ext uri="{BB962C8B-B14F-4D97-AF65-F5344CB8AC3E}">
-        <p14:creationId xmlns:p14="http://schemas.microsoft.com/office/powerpoint/2010/main" val="1707559571"/>
-      </p:ext>
-    </p:extLst>
-  </p:cSld>
-  <p:clrMapOvr>
-    <a:masterClrMapping/>
-  </p:clrMapOvr>
-</p:notes>
-</file>
-
-<file path=ppt/notesSlides/notesSlide52.xml><?xml version="1.0" encoding="utf-8"?>
 <p:notes xmlns:a="http://schemas.openxmlformats.org/drawingml/2006/main" xmlns:r="http://schemas.openxmlformats.org/officeDocument/2006/relationships" xmlns:p="http://schemas.openxmlformats.org/presentationml/2006/main" showMasterSp="0" showMasterPhAnim="0">
   <p:cSld>
     <p:spTree>
@@ -6494,7 +6377,7 @@
 </p:notes>
 </file>
 
-<file path=ppt/notesSlides/notesSlide53.xml><?xml version="1.0" encoding="utf-8"?>
+<file path=ppt/notesSlides/notesSlide52.xml><?xml version="1.0" encoding="utf-8"?>
 <p:notes xmlns:a="http://schemas.openxmlformats.org/drawingml/2006/main" xmlns:r="http://schemas.openxmlformats.org/officeDocument/2006/relationships" xmlns:p="http://schemas.openxmlformats.org/presentationml/2006/main" showMasterSp="0" showMasterPhAnim="0">
   <p:cSld>
     <p:spTree>
@@ -6610,7 +6493,7 @@
 </p:notes>
 </file>
 
-<file path=ppt/notesSlides/notesSlide54.xml><?xml version="1.0" encoding="utf-8"?>
+<file path=ppt/notesSlides/notesSlide53.xml><?xml version="1.0" encoding="utf-8"?>
 <p:notes xmlns:a="http://schemas.openxmlformats.org/drawingml/2006/main" xmlns:r="http://schemas.openxmlformats.org/officeDocument/2006/relationships" xmlns:p="http://schemas.openxmlformats.org/presentationml/2006/main" showMasterSp="0" showMasterPhAnim="0">
   <p:cSld>
     <p:spTree>
@@ -6726,7 +6609,7 @@
 </p:notes>
 </file>
 
-<file path=ppt/notesSlides/notesSlide55.xml><?xml version="1.0" encoding="utf-8"?>
+<file path=ppt/notesSlides/notesSlide54.xml><?xml version="1.0" encoding="utf-8"?>
 <p:notes xmlns:a="http://schemas.openxmlformats.org/drawingml/2006/main" xmlns:r="http://schemas.openxmlformats.org/officeDocument/2006/relationships" xmlns:p="http://schemas.openxmlformats.org/presentationml/2006/main" showMasterSp="0" showMasterPhAnim="0">
   <p:cSld>
     <p:spTree>
@@ -6941,7 +6824,71 @@
               </a:spcBef>
               <a:buNone/>
             </a:pPr>
-            <a:endParaRPr dirty="0"/>
+            <a:r>
+              <a:rPr lang="en-US" i="1" dirty="0" smtClean="0"/>
+              <a:t>Is</a:t>
+            </a:r>
+            <a:r>
+              <a:rPr lang="en-US" i="1" baseline="0" dirty="0" smtClean="0"/>
+              <a:t> it better?</a:t>
+            </a:r>
+          </a:p>
+          <a:p>
+            <a:pPr>
+              <a:spcBef>
+                <a:spcPts val="0"/>
+              </a:spcBef>
+              <a:buNone/>
+            </a:pPr>
+            <a:r>
+              <a:rPr lang="en-US" i="1" baseline="0" dirty="0" smtClean="0"/>
+              <a:t>This is  </a:t>
+            </a:r>
+            <a:r>
+              <a:rPr lang="en-US" sz="1100" b="0" i="0" kern="1200" dirty="0" smtClean="0">
+                <a:solidFill>
+                  <a:schemeClr val="tx1"/>
+                </a:solidFill>
+                <a:effectLst/>
+                <a:latin typeface="+mn-lt"/>
+                <a:ea typeface="+mn-ea"/>
+                <a:cs typeface="+mn-cs"/>
+              </a:rPr>
+              <a:t>imperative programming not object oriented programming.</a:t>
+            </a:r>
+          </a:p>
+          <a:p>
+            <a:pPr>
+              <a:spcBef>
+                <a:spcPts val="0"/>
+              </a:spcBef>
+              <a:buNone/>
+            </a:pPr>
+            <a:r>
+              <a:rPr lang="en-US" sz="1100" b="0" i="0" kern="1200" dirty="0" smtClean="0">
+                <a:solidFill>
+                  <a:schemeClr val="tx1"/>
+                </a:solidFill>
+                <a:effectLst/>
+                <a:latin typeface="+mn-lt"/>
+                <a:ea typeface="+mn-ea"/>
+                <a:cs typeface="+mn-cs"/>
+              </a:rPr>
+              <a:t>This class is doing too many things,</a:t>
+            </a:r>
+            <a:r>
+              <a:rPr lang="en-US" sz="1100" b="0" i="0" kern="1200" baseline="0" dirty="0" smtClean="0">
+                <a:solidFill>
+                  <a:schemeClr val="tx1"/>
+                </a:solidFill>
+                <a:effectLst/>
+                <a:latin typeface="+mn-lt"/>
+                <a:ea typeface="+mn-ea"/>
+                <a:cs typeface="+mn-cs"/>
+              </a:rPr>
+              <a:t> or its having too many responsibilities.</a:t>
+            </a:r>
+            <a:endParaRPr i="1" dirty="0"/>
           </a:p>
         </p:txBody>
       </p:sp>
@@ -7062,11 +7009,6 @@
         </p:txBody>
       </p:sp>
     </p:spTree>
-    <p:extLst>
-      <p:ext uri="{BB962C8B-B14F-4D97-AF65-F5344CB8AC3E}">
-        <p14:creationId xmlns:p14="http://schemas.microsoft.com/office/powerpoint/2010/main" val="381665532"/>
-      </p:ext>
-    </p:extLst>
   </p:cSld>
   <p:clrMapOvr>
     <a:masterClrMapping/>
@@ -7075,117 +7017,6 @@
 </file>
 
 <file path=ppt/notesSlides/notesSlide8.xml><?xml version="1.0" encoding="utf-8"?>
-<p:notes xmlns:a="http://schemas.openxmlformats.org/drawingml/2006/main" xmlns:r="http://schemas.openxmlformats.org/officeDocument/2006/relationships" xmlns:p="http://schemas.openxmlformats.org/presentationml/2006/main" showMasterSp="0" showMasterPhAnim="0">
-  <p:cSld>
-    <p:spTree>
-      <p:nvGrpSpPr>
-        <p:cNvPr id="1" name="Shape 55"/>
-        <p:cNvGrpSpPr/>
-        <p:nvPr/>
-      </p:nvGrpSpPr>
-      <p:grpSpPr>
-        <a:xfrm>
-          <a:off x="0" y="0"/>
-          <a:ext cx="0" cy="0"/>
-          <a:chOff x="0" y="0"/>
-          <a:chExt cx="0" cy="0"/>
-        </a:xfrm>
-      </p:grpSpPr>
-      <p:sp>
-        <p:nvSpPr>
-          <p:cNvPr id="56" name="Shape 56"/>
-          <p:cNvSpPr>
-            <a:spLocks noGrp="1" noRot="1" noChangeAspect="1"/>
-          </p:cNvSpPr>
-          <p:nvPr>
-            <p:ph type="sldImg" idx="2"/>
-          </p:nvPr>
-        </p:nvSpPr>
-        <p:spPr>
-          <a:xfrm>
-            <a:off x="381000" y="685800"/>
-            <a:ext cx="6096000" cy="3429000"/>
-          </a:xfrm>
-          <a:custGeom>
-            <a:avLst/>
-            <a:gdLst/>
-            <a:ahLst/>
-            <a:cxnLst/>
-            <a:rect l="0" t="0" r="0" b="0"/>
-            <a:pathLst>
-              <a:path w="120000" h="120000" extrusionOk="0">
-                <a:moveTo>
-                  <a:pt x="0" y="0"/>
-                </a:moveTo>
-                <a:lnTo>
-                  <a:pt x="120000" y="0"/>
-                </a:lnTo>
-                <a:lnTo>
-                  <a:pt x="120000" y="120000"/>
-                </a:lnTo>
-                <a:lnTo>
-                  <a:pt x="0" y="120000"/>
-                </a:lnTo>
-                <a:close/>
-              </a:path>
-            </a:pathLst>
-          </a:custGeom>
-          <a:noFill/>
-          <a:ln w="9525" cap="flat" cmpd="sng">
-            <a:solidFill>
-              <a:srgbClr val="000000"/>
-            </a:solidFill>
-            <a:prstDash val="solid"/>
-            <a:round/>
-            <a:headEnd type="none" w="med" len="med"/>
-            <a:tailEnd type="none" w="med" len="med"/>
-          </a:ln>
-        </p:spPr>
-      </p:sp>
-      <p:sp>
-        <p:nvSpPr>
-          <p:cNvPr id="57" name="Shape 57"/>
-          <p:cNvSpPr txBox="1">
-            <a:spLocks noGrp="1"/>
-          </p:cNvSpPr>
-          <p:nvPr>
-            <p:ph type="body" idx="1"/>
-          </p:nvPr>
-        </p:nvSpPr>
-        <p:spPr>
-          <a:xfrm>
-            <a:off x="685800" y="4343400"/>
-            <a:ext cx="5486399" cy="4114800"/>
-          </a:xfrm>
-          <a:prstGeom prst="rect">
-            <a:avLst/>
-          </a:prstGeom>
-        </p:spPr>
-        <p:txBody>
-          <a:bodyPr lIns="91425" tIns="91425" rIns="91425" bIns="91425" anchor="t" anchorCtr="0">
-            <a:noAutofit/>
-          </a:bodyPr>
-          <a:lstStyle/>
-          <a:p>
-            <a:pPr>
-              <a:spcBef>
-                <a:spcPts val="0"/>
-              </a:spcBef>
-              <a:buNone/>
-            </a:pPr>
-            <a:endParaRPr/>
-          </a:p>
-        </p:txBody>
-      </p:sp>
-    </p:spTree>
-  </p:cSld>
-  <p:clrMapOvr>
-    <a:masterClrMapping/>
-  </p:clrMapOvr>
-</p:notes>
-</file>
-
-<file path=ppt/notesSlides/notesSlide9.xml><?xml version="1.0" encoding="utf-8"?>
 <p:notes xmlns:a="http://schemas.openxmlformats.org/drawingml/2006/main" xmlns:r="http://schemas.openxmlformats.org/officeDocument/2006/relationships" xmlns:p="http://schemas.openxmlformats.org/presentationml/2006/main" showMasterSp="0" showMasterPhAnim="0">
   <p:cSld>
     <p:spTree>
@@ -7292,6 +7123,122 @@
     <p:extLst>
       <p:ext uri="{BB962C8B-B14F-4D97-AF65-F5344CB8AC3E}">
         <p14:creationId xmlns:p14="http://schemas.microsoft.com/office/powerpoint/2010/main" val="921465481"/>
+      </p:ext>
+    </p:extLst>
+  </p:cSld>
+  <p:clrMapOvr>
+    <a:masterClrMapping/>
+  </p:clrMapOvr>
+</p:notes>
+</file>
+
+<file path=ppt/notesSlides/notesSlide9.xml><?xml version="1.0" encoding="utf-8"?>
+<p:notes xmlns:a="http://schemas.openxmlformats.org/drawingml/2006/main" xmlns:r="http://schemas.openxmlformats.org/officeDocument/2006/relationships" xmlns:p="http://schemas.openxmlformats.org/presentationml/2006/main" showMasterSp="0" showMasterPhAnim="0">
+  <p:cSld>
+    <p:spTree>
+      <p:nvGrpSpPr>
+        <p:cNvPr id="1" name="Shape 55"/>
+        <p:cNvGrpSpPr/>
+        <p:nvPr/>
+      </p:nvGrpSpPr>
+      <p:grpSpPr>
+        <a:xfrm>
+          <a:off x="0" y="0"/>
+          <a:ext cx="0" cy="0"/>
+          <a:chOff x="0" y="0"/>
+          <a:chExt cx="0" cy="0"/>
+        </a:xfrm>
+      </p:grpSpPr>
+      <p:sp>
+        <p:nvSpPr>
+          <p:cNvPr id="56" name="Shape 56"/>
+          <p:cNvSpPr>
+            <a:spLocks noGrp="1" noRot="1" noChangeAspect="1"/>
+          </p:cNvSpPr>
+          <p:nvPr>
+            <p:ph type="sldImg" idx="2"/>
+          </p:nvPr>
+        </p:nvSpPr>
+        <p:spPr>
+          <a:xfrm>
+            <a:off x="381000" y="685800"/>
+            <a:ext cx="6096000" cy="3429000"/>
+          </a:xfrm>
+          <a:custGeom>
+            <a:avLst/>
+            <a:gdLst/>
+            <a:ahLst/>
+            <a:cxnLst/>
+            <a:rect l="0" t="0" r="0" b="0"/>
+            <a:pathLst>
+              <a:path w="120000" h="120000" extrusionOk="0">
+                <a:moveTo>
+                  <a:pt x="0" y="0"/>
+                </a:moveTo>
+                <a:lnTo>
+                  <a:pt x="120000" y="0"/>
+                </a:lnTo>
+                <a:lnTo>
+                  <a:pt x="120000" y="120000"/>
+                </a:lnTo>
+                <a:lnTo>
+                  <a:pt x="0" y="120000"/>
+                </a:lnTo>
+                <a:close/>
+              </a:path>
+            </a:pathLst>
+          </a:custGeom>
+          <a:noFill/>
+          <a:ln w="9525" cap="flat" cmpd="sng">
+            <a:solidFill>
+              <a:srgbClr val="000000"/>
+            </a:solidFill>
+            <a:prstDash val="solid"/>
+            <a:round/>
+            <a:headEnd type="none" w="med" len="med"/>
+            <a:tailEnd type="none" w="med" len="med"/>
+          </a:ln>
+        </p:spPr>
+      </p:sp>
+      <p:sp>
+        <p:nvSpPr>
+          <p:cNvPr id="57" name="Shape 57"/>
+          <p:cNvSpPr txBox="1">
+            <a:spLocks noGrp="1"/>
+          </p:cNvSpPr>
+          <p:nvPr>
+            <p:ph type="body" idx="1"/>
+          </p:nvPr>
+        </p:nvSpPr>
+        <p:spPr>
+          <a:xfrm>
+            <a:off x="685800" y="4343400"/>
+            <a:ext cx="5486399" cy="4114800"/>
+          </a:xfrm>
+          <a:prstGeom prst="rect">
+            <a:avLst/>
+          </a:prstGeom>
+        </p:spPr>
+        <p:txBody>
+          <a:bodyPr lIns="91425" tIns="91425" rIns="91425" bIns="91425" anchor="t" anchorCtr="0">
+            <a:noAutofit/>
+          </a:bodyPr>
+          <a:lstStyle/>
+          <a:p>
+            <a:pPr>
+              <a:spcBef>
+                <a:spcPts val="0"/>
+              </a:spcBef>
+              <a:buNone/>
+            </a:pPr>
+            <a:endParaRPr dirty="0"/>
+          </a:p>
+        </p:txBody>
+      </p:sp>
+    </p:spTree>
+    <p:extLst>
+      <p:ext uri="{BB962C8B-B14F-4D97-AF65-F5344CB8AC3E}">
+        <p14:creationId xmlns:p14="http://schemas.microsoft.com/office/powerpoint/2010/main" val="787562656"/>
       </p:ext>
     </p:extLst>
   </p:cSld>
@@ -10333,84 +10280,6 @@
       </p:grpSpPr>
       <p:pic>
         <p:nvPicPr>
-          <p:cNvPr id="3" name="Picture 2"/>
-          <p:cNvPicPr>
-            <a:picLocks noChangeAspect="1"/>
-          </p:cNvPicPr>
-          <p:nvPr/>
-        </p:nvPicPr>
-        <p:blipFill>
-          <a:blip r:embed="rId3">
-            <a:extLst>
-              <a:ext uri="{28A0092B-C50C-407E-A947-70E740481C1C}">
-                <a14:useLocalDpi xmlns:a14="http://schemas.microsoft.com/office/drawing/2010/main" val="0"/>
-              </a:ext>
-            </a:extLst>
-          </a:blip>
-          <a:stretch>
-            <a:fillRect/>
-          </a:stretch>
-        </p:blipFill>
-        <p:spPr>
-          <a:xfrm>
-            <a:off x="0" y="28103"/>
-            <a:ext cx="6163535" cy="3381847"/>
-          </a:xfrm>
-          <a:prstGeom prst="rect">
-            <a:avLst/>
-          </a:prstGeom>
-        </p:spPr>
-      </p:pic>
-    </p:spTree>
-    <p:extLst>
-      <p:ext uri="{BB962C8B-B14F-4D97-AF65-F5344CB8AC3E}">
-        <p14:creationId xmlns:p14="http://schemas.microsoft.com/office/powerpoint/2010/main" val="2280606087"/>
-      </p:ext>
-    </p:extLst>
-  </p:cSld>
-  <p:clrMapOvr>
-    <a:masterClrMapping/>
-  </p:clrMapOvr>
-  <p:transition spd="slow">
-    <p:cut/>
-  </p:transition>
-  <p:timing>
-    <p:tnLst>
-      <p:par>
-        <p:cTn id="1" dur="indefinite" restart="never" nodeType="tmRoot"/>
-      </p:par>
-    </p:tnLst>
-  </p:timing>
-</p:sld>
-</file>
-
-<file path=ppt/slides/slide11.xml><?xml version="1.0" encoding="utf-8"?>
-<p:sld xmlns:a="http://schemas.openxmlformats.org/drawingml/2006/main" xmlns:r="http://schemas.openxmlformats.org/officeDocument/2006/relationships" xmlns:p="http://schemas.openxmlformats.org/presentationml/2006/main">
-  <p:cSld>
-    <p:bg>
-      <p:bgPr>
-        <a:solidFill>
-          <a:srgbClr val="1E1E1E"/>
-        </a:solidFill>
-        <a:effectLst/>
-      </p:bgPr>
-    </p:bg>
-    <p:spTree>
-      <p:nvGrpSpPr>
-        <p:cNvPr id="1" name="Shape 47"/>
-        <p:cNvGrpSpPr/>
-        <p:nvPr/>
-      </p:nvGrpSpPr>
-      <p:grpSpPr>
-        <a:xfrm>
-          <a:off x="0" y="0"/>
-          <a:ext cx="0" cy="0"/>
-          <a:chOff x="0" y="0"/>
-          <a:chExt cx="0" cy="0"/>
-        </a:xfrm>
-      </p:grpSpPr>
-      <p:pic>
-        <p:nvPicPr>
           <p:cNvPr id="4" name="Picture 3"/>
           <p:cNvPicPr>
             <a:picLocks noChangeAspect="1"/>
@@ -10462,7 +10331,7 @@
 </p:sld>
 </file>
 
-<file path=ppt/slides/slide12.xml><?xml version="1.0" encoding="utf-8"?>
+<file path=ppt/slides/slide11.xml><?xml version="1.0" encoding="utf-8"?>
 <p:sld xmlns:a="http://schemas.openxmlformats.org/drawingml/2006/main" xmlns:r="http://schemas.openxmlformats.org/officeDocument/2006/relationships" xmlns:p="http://schemas.openxmlformats.org/presentationml/2006/main">
   <p:cSld>
     <p:bg>
@@ -10540,7 +10409,7 @@
 </p:sld>
 </file>
 
-<file path=ppt/slides/slide13.xml><?xml version="1.0" encoding="utf-8"?>
+<file path=ppt/slides/slide12.xml><?xml version="1.0" encoding="utf-8"?>
 <p:sld xmlns:a="http://schemas.openxmlformats.org/drawingml/2006/main" xmlns:r="http://schemas.openxmlformats.org/officeDocument/2006/relationships" xmlns:p="http://schemas.openxmlformats.org/presentationml/2006/main">
   <p:cSld>
     <p:bg>
@@ -10618,7 +10487,7 @@
 </p:sld>
 </file>
 
-<file path=ppt/slides/slide14.xml><?xml version="1.0" encoding="utf-8"?>
+<file path=ppt/slides/slide13.xml><?xml version="1.0" encoding="utf-8"?>
 <p:sld xmlns:a="http://schemas.openxmlformats.org/drawingml/2006/main" xmlns:r="http://schemas.openxmlformats.org/officeDocument/2006/relationships" xmlns:p="http://schemas.openxmlformats.org/presentationml/2006/main">
   <p:cSld>
     <p:bg>
@@ -10696,7 +10565,7 @@
 </p:sld>
 </file>
 
-<file path=ppt/slides/slide15.xml><?xml version="1.0" encoding="utf-8"?>
+<file path=ppt/slides/slide14.xml><?xml version="1.0" encoding="utf-8"?>
 <p:sld xmlns:a="http://schemas.openxmlformats.org/drawingml/2006/main" xmlns:r="http://schemas.openxmlformats.org/officeDocument/2006/relationships" xmlns:p="http://schemas.openxmlformats.org/presentationml/2006/main">
   <p:cSld>
     <p:spTree>
@@ -10783,7 +10652,7 @@
 </p:sld>
 </file>
 
-<file path=ppt/slides/slide16.xml><?xml version="1.0" encoding="utf-8"?>
+<file path=ppt/slides/slide15.xml><?xml version="1.0" encoding="utf-8"?>
 <p:sld xmlns:a="http://schemas.openxmlformats.org/drawingml/2006/main" xmlns:r="http://schemas.openxmlformats.org/officeDocument/2006/relationships" xmlns:p="http://schemas.openxmlformats.org/presentationml/2006/main">
   <p:cSld>
     <p:spTree>
@@ -12527,7 +12396,7 @@
 </p:sld>
 </file>
 
-<file path=ppt/slides/slide17.xml><?xml version="1.0" encoding="utf-8"?>
+<file path=ppt/slides/slide16.xml><?xml version="1.0" encoding="utf-8"?>
 <p:sld xmlns:a="http://schemas.openxmlformats.org/drawingml/2006/main" xmlns:r="http://schemas.openxmlformats.org/officeDocument/2006/relationships" xmlns:p="http://schemas.openxmlformats.org/presentationml/2006/main">
   <p:cSld>
     <p:spTree>
@@ -14742,7 +14611,7 @@
 </p:sld>
 </file>
 
-<file path=ppt/slides/slide18.xml><?xml version="1.0" encoding="utf-8"?>
+<file path=ppt/slides/slide17.xml><?xml version="1.0" encoding="utf-8"?>
 <p:sld xmlns:a="http://schemas.openxmlformats.org/drawingml/2006/main" xmlns:r="http://schemas.openxmlformats.org/officeDocument/2006/relationships" xmlns:p="http://schemas.openxmlformats.org/presentationml/2006/main">
   <p:cSld>
     <p:bg>
@@ -14820,7 +14689,7 @@
 </p:sld>
 </file>
 
-<file path=ppt/slides/slide19.xml><?xml version="1.0" encoding="utf-8"?>
+<file path=ppt/slides/slide18.xml><?xml version="1.0" encoding="utf-8"?>
 <p:sld xmlns:a="http://schemas.openxmlformats.org/drawingml/2006/main" xmlns:r="http://schemas.openxmlformats.org/officeDocument/2006/relationships" xmlns:p="http://schemas.openxmlformats.org/presentationml/2006/main">
   <p:cSld>
     <p:bg>
@@ -14879,6 +14748,84 @@
     <p:extLst>
       <p:ext uri="{BB962C8B-B14F-4D97-AF65-F5344CB8AC3E}">
         <p14:creationId xmlns:p14="http://schemas.microsoft.com/office/powerpoint/2010/main" val="640230701"/>
+      </p:ext>
+    </p:extLst>
+  </p:cSld>
+  <p:clrMapOvr>
+    <a:masterClrMapping/>
+  </p:clrMapOvr>
+  <p:transition spd="slow">
+    <p:cut/>
+  </p:transition>
+  <p:timing>
+    <p:tnLst>
+      <p:par>
+        <p:cTn id="1" dur="indefinite" restart="never" nodeType="tmRoot"/>
+      </p:par>
+    </p:tnLst>
+  </p:timing>
+</p:sld>
+</file>
+
+<file path=ppt/slides/slide19.xml><?xml version="1.0" encoding="utf-8"?>
+<p:sld xmlns:a="http://schemas.openxmlformats.org/drawingml/2006/main" xmlns:r="http://schemas.openxmlformats.org/officeDocument/2006/relationships" xmlns:p="http://schemas.openxmlformats.org/presentationml/2006/main">
+  <p:cSld>
+    <p:bg>
+      <p:bgPr>
+        <a:solidFill>
+          <a:srgbClr val="1E1E1E"/>
+        </a:solidFill>
+        <a:effectLst/>
+      </p:bgPr>
+    </p:bg>
+    <p:spTree>
+      <p:nvGrpSpPr>
+        <p:cNvPr id="1" name="Shape 47"/>
+        <p:cNvGrpSpPr/>
+        <p:nvPr/>
+      </p:nvGrpSpPr>
+      <p:grpSpPr>
+        <a:xfrm>
+          <a:off x="0" y="0"/>
+          <a:ext cx="0" cy="0"/>
+          <a:chOff x="0" y="0"/>
+          <a:chExt cx="0" cy="0"/>
+        </a:xfrm>
+      </p:grpSpPr>
+      <p:pic>
+        <p:nvPicPr>
+          <p:cNvPr id="3" name="Picture 2"/>
+          <p:cNvPicPr>
+            <a:picLocks noChangeAspect="1"/>
+          </p:cNvPicPr>
+          <p:nvPr/>
+        </p:nvPicPr>
+        <p:blipFill>
+          <a:blip r:embed="rId3">
+            <a:extLst>
+              <a:ext uri="{28A0092B-C50C-407E-A947-70E740481C1C}">
+                <a14:useLocalDpi xmlns:a14="http://schemas.microsoft.com/office/drawing/2010/main" val="0"/>
+              </a:ext>
+            </a:extLst>
+          </a:blip>
+          <a:stretch>
+            <a:fillRect/>
+          </a:stretch>
+        </p:blipFill>
+        <p:spPr>
+          <a:xfrm>
+            <a:off x="0" y="-263"/>
+            <a:ext cx="4972744" cy="1886213"/>
+          </a:xfrm>
+          <a:prstGeom prst="rect">
+            <a:avLst/>
+          </a:prstGeom>
+        </p:spPr>
+      </p:pic>
+    </p:spTree>
+    <p:extLst>
+      <p:ext uri="{BB962C8B-B14F-4D97-AF65-F5344CB8AC3E}">
+        <p14:creationId xmlns:p14="http://schemas.microsoft.com/office/powerpoint/2010/main" val="4282216939"/>
       </p:ext>
     </p:extLst>
   </p:cSld>
@@ -15012,84 +14959,6 @@
       </p:grpSpPr>
       <p:pic>
         <p:nvPicPr>
-          <p:cNvPr id="3" name="Picture 2"/>
-          <p:cNvPicPr>
-            <a:picLocks noChangeAspect="1"/>
-          </p:cNvPicPr>
-          <p:nvPr/>
-        </p:nvPicPr>
-        <p:blipFill>
-          <a:blip r:embed="rId3">
-            <a:extLst>
-              <a:ext uri="{28A0092B-C50C-407E-A947-70E740481C1C}">
-                <a14:useLocalDpi xmlns:a14="http://schemas.microsoft.com/office/drawing/2010/main" val="0"/>
-              </a:ext>
-            </a:extLst>
-          </a:blip>
-          <a:stretch>
-            <a:fillRect/>
-          </a:stretch>
-        </p:blipFill>
-        <p:spPr>
-          <a:xfrm>
-            <a:off x="0" y="-263"/>
-            <a:ext cx="4972744" cy="1886213"/>
-          </a:xfrm>
-          <a:prstGeom prst="rect">
-            <a:avLst/>
-          </a:prstGeom>
-        </p:spPr>
-      </p:pic>
-    </p:spTree>
-    <p:extLst>
-      <p:ext uri="{BB962C8B-B14F-4D97-AF65-F5344CB8AC3E}">
-        <p14:creationId xmlns:p14="http://schemas.microsoft.com/office/powerpoint/2010/main" val="4282216939"/>
-      </p:ext>
-    </p:extLst>
-  </p:cSld>
-  <p:clrMapOvr>
-    <a:masterClrMapping/>
-  </p:clrMapOvr>
-  <p:transition spd="slow">
-    <p:cut/>
-  </p:transition>
-  <p:timing>
-    <p:tnLst>
-      <p:par>
-        <p:cTn id="1" dur="indefinite" restart="never" nodeType="tmRoot"/>
-      </p:par>
-    </p:tnLst>
-  </p:timing>
-</p:sld>
-</file>
-
-<file path=ppt/slides/slide21.xml><?xml version="1.0" encoding="utf-8"?>
-<p:sld xmlns:a="http://schemas.openxmlformats.org/drawingml/2006/main" xmlns:r="http://schemas.openxmlformats.org/officeDocument/2006/relationships" xmlns:p="http://schemas.openxmlformats.org/presentationml/2006/main">
-  <p:cSld>
-    <p:bg>
-      <p:bgPr>
-        <a:solidFill>
-          <a:srgbClr val="1E1E1E"/>
-        </a:solidFill>
-        <a:effectLst/>
-      </p:bgPr>
-    </p:bg>
-    <p:spTree>
-      <p:nvGrpSpPr>
-        <p:cNvPr id="1" name="Shape 47"/>
-        <p:cNvGrpSpPr/>
-        <p:nvPr/>
-      </p:nvGrpSpPr>
-      <p:grpSpPr>
-        <a:xfrm>
-          <a:off x="0" y="0"/>
-          <a:ext cx="0" cy="0"/>
-          <a:chOff x="0" y="0"/>
-          <a:chExt cx="0" cy="0"/>
-        </a:xfrm>
-      </p:grpSpPr>
-      <p:pic>
-        <p:nvPicPr>
           <p:cNvPr id="2" name="Picture 1"/>
           <p:cNvPicPr>
             <a:picLocks noChangeAspect="1"/>
@@ -15141,7 +15010,7 @@
 </p:sld>
 </file>
 
-<file path=ppt/slides/slide22.xml><?xml version="1.0" encoding="utf-8"?>
+<file path=ppt/slides/slide21.xml><?xml version="1.0" encoding="utf-8"?>
 <p:sld xmlns:a="http://schemas.openxmlformats.org/drawingml/2006/main" xmlns:r="http://schemas.openxmlformats.org/officeDocument/2006/relationships" xmlns:p="http://schemas.openxmlformats.org/presentationml/2006/main">
   <p:cSld>
     <p:bg>
@@ -15219,7 +15088,7 @@
 </p:sld>
 </file>
 
-<file path=ppt/slides/slide23.xml><?xml version="1.0" encoding="utf-8"?>
+<file path=ppt/slides/slide22.xml><?xml version="1.0" encoding="utf-8"?>
 <p:sld xmlns:a="http://schemas.openxmlformats.org/drawingml/2006/main" xmlns:r="http://schemas.openxmlformats.org/officeDocument/2006/relationships" xmlns:p="http://schemas.openxmlformats.org/presentationml/2006/main">
   <p:cSld>
     <p:bg>
@@ -15297,7 +15166,7 @@
 </p:sld>
 </file>
 
-<file path=ppt/slides/slide24.xml><?xml version="1.0" encoding="utf-8"?>
+<file path=ppt/slides/slide23.xml><?xml version="1.0" encoding="utf-8"?>
 <p:sld xmlns:a="http://schemas.openxmlformats.org/drawingml/2006/main" xmlns:r="http://schemas.openxmlformats.org/officeDocument/2006/relationships" xmlns:p="http://schemas.openxmlformats.org/presentationml/2006/main">
   <p:cSld>
     <p:bg>
@@ -15375,7 +15244,7 @@
 </p:sld>
 </file>
 
-<file path=ppt/slides/slide25.xml><?xml version="1.0" encoding="utf-8"?>
+<file path=ppt/slides/slide24.xml><?xml version="1.0" encoding="utf-8"?>
 <p:sld xmlns:a="http://schemas.openxmlformats.org/drawingml/2006/main" xmlns:r="http://schemas.openxmlformats.org/officeDocument/2006/relationships" xmlns:p="http://schemas.openxmlformats.org/presentationml/2006/main">
   <p:cSld>
     <p:spTree>
@@ -15462,7 +15331,7 @@
 </p:sld>
 </file>
 
-<file path=ppt/slides/slide26.xml><?xml version="1.0" encoding="utf-8"?>
+<file path=ppt/slides/slide25.xml><?xml version="1.0" encoding="utf-8"?>
 <p:sld xmlns:a="http://schemas.openxmlformats.org/drawingml/2006/main" xmlns:r="http://schemas.openxmlformats.org/officeDocument/2006/relationships" xmlns:p="http://schemas.openxmlformats.org/presentationml/2006/main">
   <p:cSld>
     <p:spTree>
@@ -17206,7 +17075,7 @@
 </p:sld>
 </file>
 
-<file path=ppt/slides/slide27.xml><?xml version="1.0" encoding="utf-8"?>
+<file path=ppt/slides/slide26.xml><?xml version="1.0" encoding="utf-8"?>
 <p:sld xmlns:a="http://schemas.openxmlformats.org/drawingml/2006/main" xmlns:r="http://schemas.openxmlformats.org/officeDocument/2006/relationships" xmlns:p="http://schemas.openxmlformats.org/presentationml/2006/main" showMasterSp="0">
   <p:cSld>
     <p:spTree>
@@ -19505,7 +19374,7 @@
 </p:sld>
 </file>
 
-<file path=ppt/slides/slide28.xml><?xml version="1.0" encoding="utf-8"?>
+<file path=ppt/slides/slide27.xml><?xml version="1.0" encoding="utf-8"?>
 <p:sld xmlns:a="http://schemas.openxmlformats.org/drawingml/2006/main" xmlns:r="http://schemas.openxmlformats.org/officeDocument/2006/relationships" xmlns:p="http://schemas.openxmlformats.org/presentationml/2006/main">
   <p:cSld>
     <p:spTree>
@@ -21445,7 +21314,7 @@
 </p:sld>
 </file>
 
-<file path=ppt/slides/slide29.xml><?xml version="1.0" encoding="utf-8"?>
+<file path=ppt/slides/slide28.xml><?xml version="1.0" encoding="utf-8"?>
 <p:sld xmlns:a="http://schemas.openxmlformats.org/drawingml/2006/main" xmlns:r="http://schemas.openxmlformats.org/officeDocument/2006/relationships" xmlns:p="http://schemas.openxmlformats.org/presentationml/2006/main">
   <p:cSld>
     <p:bg>
@@ -21504,6 +21373,84 @@
     <p:extLst>
       <p:ext uri="{BB962C8B-B14F-4D97-AF65-F5344CB8AC3E}">
         <p14:creationId xmlns:p14="http://schemas.microsoft.com/office/powerpoint/2010/main" val="4072203850"/>
+      </p:ext>
+    </p:extLst>
+  </p:cSld>
+  <p:clrMapOvr>
+    <a:masterClrMapping/>
+  </p:clrMapOvr>
+  <p:transition spd="slow">
+    <p:cut/>
+  </p:transition>
+  <p:timing>
+    <p:tnLst>
+      <p:par>
+        <p:cTn id="1" dur="indefinite" restart="never" nodeType="tmRoot"/>
+      </p:par>
+    </p:tnLst>
+  </p:timing>
+</p:sld>
+</file>
+
+<file path=ppt/slides/slide29.xml><?xml version="1.0" encoding="utf-8"?>
+<p:sld xmlns:a="http://schemas.openxmlformats.org/drawingml/2006/main" xmlns:r="http://schemas.openxmlformats.org/officeDocument/2006/relationships" xmlns:p="http://schemas.openxmlformats.org/presentationml/2006/main">
+  <p:cSld>
+    <p:bg>
+      <p:bgPr>
+        <a:solidFill>
+          <a:srgbClr val="1E1E1E"/>
+        </a:solidFill>
+        <a:effectLst/>
+      </p:bgPr>
+    </p:bg>
+    <p:spTree>
+      <p:nvGrpSpPr>
+        <p:cNvPr id="1" name="Shape 47"/>
+        <p:cNvGrpSpPr/>
+        <p:nvPr/>
+      </p:nvGrpSpPr>
+      <p:grpSpPr>
+        <a:xfrm>
+          <a:off x="0" y="0"/>
+          <a:ext cx="0" cy="0"/>
+          <a:chOff x="0" y="0"/>
+          <a:chExt cx="0" cy="0"/>
+        </a:xfrm>
+      </p:grpSpPr>
+      <p:pic>
+        <p:nvPicPr>
+          <p:cNvPr id="2" name="Picture 1"/>
+          <p:cNvPicPr>
+            <a:picLocks noChangeAspect="1"/>
+          </p:cNvPicPr>
+          <p:nvPr/>
+        </p:nvPicPr>
+        <p:blipFill>
+          <a:blip r:embed="rId3">
+            <a:extLst>
+              <a:ext uri="{28A0092B-C50C-407E-A947-70E740481C1C}">
+                <a14:useLocalDpi xmlns:a14="http://schemas.microsoft.com/office/drawing/2010/main" val="0"/>
+              </a:ext>
+            </a:extLst>
+          </a:blip>
+          <a:stretch>
+            <a:fillRect/>
+          </a:stretch>
+        </p:blipFill>
+        <p:spPr>
+          <a:xfrm>
+            <a:off x="0" y="8838"/>
+            <a:ext cx="4582164" cy="4925112"/>
+          </a:xfrm>
+          <a:prstGeom prst="rect">
+            <a:avLst/>
+          </a:prstGeom>
+        </p:spPr>
+      </p:pic>
+    </p:spTree>
+    <p:extLst>
+      <p:ext uri="{BB962C8B-B14F-4D97-AF65-F5344CB8AC3E}">
+        <p14:creationId xmlns:p14="http://schemas.microsoft.com/office/powerpoint/2010/main" val="3850089552"/>
       </p:ext>
     </p:extLst>
   </p:cSld>
@@ -21628,84 +21575,6 @@
       </p:grpSpPr>
       <p:pic>
         <p:nvPicPr>
-          <p:cNvPr id="2" name="Picture 1"/>
-          <p:cNvPicPr>
-            <a:picLocks noChangeAspect="1"/>
-          </p:cNvPicPr>
-          <p:nvPr/>
-        </p:nvPicPr>
-        <p:blipFill>
-          <a:blip r:embed="rId3">
-            <a:extLst>
-              <a:ext uri="{28A0092B-C50C-407E-A947-70E740481C1C}">
-                <a14:useLocalDpi xmlns:a14="http://schemas.microsoft.com/office/drawing/2010/main" val="0"/>
-              </a:ext>
-            </a:extLst>
-          </a:blip>
-          <a:stretch>
-            <a:fillRect/>
-          </a:stretch>
-        </p:blipFill>
-        <p:spPr>
-          <a:xfrm>
-            <a:off x="0" y="8838"/>
-            <a:ext cx="4582164" cy="4925112"/>
-          </a:xfrm>
-          <a:prstGeom prst="rect">
-            <a:avLst/>
-          </a:prstGeom>
-        </p:spPr>
-      </p:pic>
-    </p:spTree>
-    <p:extLst>
-      <p:ext uri="{BB962C8B-B14F-4D97-AF65-F5344CB8AC3E}">
-        <p14:creationId xmlns:p14="http://schemas.microsoft.com/office/powerpoint/2010/main" val="3850089552"/>
-      </p:ext>
-    </p:extLst>
-  </p:cSld>
-  <p:clrMapOvr>
-    <a:masterClrMapping/>
-  </p:clrMapOvr>
-  <p:transition spd="slow">
-    <p:cut/>
-  </p:transition>
-  <p:timing>
-    <p:tnLst>
-      <p:par>
-        <p:cTn id="1" dur="indefinite" restart="never" nodeType="tmRoot"/>
-      </p:par>
-    </p:tnLst>
-  </p:timing>
-</p:sld>
-</file>
-
-<file path=ppt/slides/slide31.xml><?xml version="1.0" encoding="utf-8"?>
-<p:sld xmlns:a="http://schemas.openxmlformats.org/drawingml/2006/main" xmlns:r="http://schemas.openxmlformats.org/officeDocument/2006/relationships" xmlns:p="http://schemas.openxmlformats.org/presentationml/2006/main">
-  <p:cSld>
-    <p:bg>
-      <p:bgPr>
-        <a:solidFill>
-          <a:srgbClr val="1E1E1E"/>
-        </a:solidFill>
-        <a:effectLst/>
-      </p:bgPr>
-    </p:bg>
-    <p:spTree>
-      <p:nvGrpSpPr>
-        <p:cNvPr id="1" name="Shape 47"/>
-        <p:cNvGrpSpPr/>
-        <p:nvPr/>
-      </p:nvGrpSpPr>
-      <p:grpSpPr>
-        <a:xfrm>
-          <a:off x="0" y="0"/>
-          <a:ext cx="0" cy="0"/>
-          <a:chOff x="0" y="0"/>
-          <a:chExt cx="0" cy="0"/>
-        </a:xfrm>
-      </p:grpSpPr>
-      <p:pic>
-        <p:nvPicPr>
           <p:cNvPr id="3" name="Picture 2"/>
           <p:cNvPicPr>
             <a:picLocks noChangeAspect="1"/>
@@ -21757,7 +21626,7 @@
 </p:sld>
 </file>
 
-<file path=ppt/slides/slide32.xml><?xml version="1.0" encoding="utf-8"?>
+<file path=ppt/slides/slide31.xml><?xml version="1.0" encoding="utf-8"?>
 <p:sld xmlns:a="http://schemas.openxmlformats.org/drawingml/2006/main" xmlns:r="http://schemas.openxmlformats.org/officeDocument/2006/relationships" xmlns:p="http://schemas.openxmlformats.org/presentationml/2006/main">
   <p:cSld>
     <p:bg>
@@ -21835,7 +21704,7 @@
 </p:sld>
 </file>
 
-<file path=ppt/slides/slide33.xml><?xml version="1.0" encoding="utf-8"?>
+<file path=ppt/slides/slide32.xml><?xml version="1.0" encoding="utf-8"?>
 <p:sld xmlns:a="http://schemas.openxmlformats.org/drawingml/2006/main" xmlns:r="http://schemas.openxmlformats.org/officeDocument/2006/relationships" xmlns:p="http://schemas.openxmlformats.org/presentationml/2006/main">
   <p:cSld>
     <p:bg>
@@ -21913,7 +21782,7 @@
 </p:sld>
 </file>
 
-<file path=ppt/slides/slide34.xml><?xml version="1.0" encoding="utf-8"?>
+<file path=ppt/slides/slide33.xml><?xml version="1.0" encoding="utf-8"?>
 <p:sld xmlns:a="http://schemas.openxmlformats.org/drawingml/2006/main" xmlns:r="http://schemas.openxmlformats.org/officeDocument/2006/relationships" xmlns:p="http://schemas.openxmlformats.org/presentationml/2006/main">
   <p:cSld>
     <p:bg>
@@ -21991,7 +21860,7 @@
 </p:sld>
 </file>
 
-<file path=ppt/slides/slide35.xml><?xml version="1.0" encoding="utf-8"?>
+<file path=ppt/slides/slide34.xml><?xml version="1.0" encoding="utf-8"?>
 <p:sld xmlns:a="http://schemas.openxmlformats.org/drawingml/2006/main" xmlns:r="http://schemas.openxmlformats.org/officeDocument/2006/relationships" xmlns:p="http://schemas.openxmlformats.org/presentationml/2006/main">
   <p:cSld>
     <p:bg>
@@ -22069,7 +21938,7 @@
 </p:sld>
 </file>
 
-<file path=ppt/slides/slide36.xml><?xml version="1.0" encoding="utf-8"?>
+<file path=ppt/slides/slide35.xml><?xml version="1.0" encoding="utf-8"?>
 <p:sld xmlns:a="http://schemas.openxmlformats.org/drawingml/2006/main" xmlns:r="http://schemas.openxmlformats.org/officeDocument/2006/relationships" xmlns:p="http://schemas.openxmlformats.org/presentationml/2006/main">
   <p:cSld>
     <p:spTree>
@@ -22156,7 +22025,7 @@
 </p:sld>
 </file>
 
-<file path=ppt/slides/slide37.xml><?xml version="1.0" encoding="utf-8"?>
+<file path=ppt/slides/slide36.xml><?xml version="1.0" encoding="utf-8"?>
 <p:sld xmlns:a="http://schemas.openxmlformats.org/drawingml/2006/main" xmlns:r="http://schemas.openxmlformats.org/officeDocument/2006/relationships" xmlns:p="http://schemas.openxmlformats.org/presentationml/2006/main">
   <p:cSld>
     <p:spTree>
@@ -23900,7 +23769,7 @@
 </p:sld>
 </file>
 
-<file path=ppt/slides/slide38.xml><?xml version="1.0" encoding="utf-8"?>
+<file path=ppt/slides/slide37.xml><?xml version="1.0" encoding="utf-8"?>
 <p:sld xmlns:a="http://schemas.openxmlformats.org/drawingml/2006/main" xmlns:r="http://schemas.openxmlformats.org/officeDocument/2006/relationships" xmlns:p="http://schemas.openxmlformats.org/presentationml/2006/main">
   <p:cSld>
     <p:spTree>
@@ -25692,7 +25561,7 @@
 </p:sld>
 </file>
 
-<file path=ppt/slides/slide39.xml><?xml version="1.0" encoding="utf-8"?>
+<file path=ppt/slides/slide38.xml><?xml version="1.0" encoding="utf-8"?>
 <p:sld xmlns:a="http://schemas.openxmlformats.org/drawingml/2006/main" xmlns:r="http://schemas.openxmlformats.org/officeDocument/2006/relationships" xmlns:p="http://schemas.openxmlformats.org/presentationml/2006/main">
   <p:cSld>
     <p:bg>
@@ -25751,6 +25620,84 @@
     <p:extLst>
       <p:ext uri="{BB962C8B-B14F-4D97-AF65-F5344CB8AC3E}">
         <p14:creationId xmlns:p14="http://schemas.microsoft.com/office/powerpoint/2010/main" val="3753351270"/>
+      </p:ext>
+    </p:extLst>
+  </p:cSld>
+  <p:clrMapOvr>
+    <a:masterClrMapping/>
+  </p:clrMapOvr>
+  <p:transition spd="slow">
+    <p:cut/>
+  </p:transition>
+  <p:timing>
+    <p:tnLst>
+      <p:par>
+        <p:cTn id="1" dur="indefinite" restart="never" nodeType="tmRoot"/>
+      </p:par>
+    </p:tnLst>
+  </p:timing>
+</p:sld>
+</file>
+
+<file path=ppt/slides/slide39.xml><?xml version="1.0" encoding="utf-8"?>
+<p:sld xmlns:a="http://schemas.openxmlformats.org/drawingml/2006/main" xmlns:r="http://schemas.openxmlformats.org/officeDocument/2006/relationships" xmlns:p="http://schemas.openxmlformats.org/presentationml/2006/main">
+  <p:cSld>
+    <p:bg>
+      <p:bgPr>
+        <a:solidFill>
+          <a:srgbClr val="1E1E1E"/>
+        </a:solidFill>
+        <a:effectLst/>
+      </p:bgPr>
+    </p:bg>
+    <p:spTree>
+      <p:nvGrpSpPr>
+        <p:cNvPr id="1" name="Shape 47"/>
+        <p:cNvGrpSpPr/>
+        <p:nvPr/>
+      </p:nvGrpSpPr>
+      <p:grpSpPr>
+        <a:xfrm>
+          <a:off x="0" y="0"/>
+          <a:ext cx="0" cy="0"/>
+          <a:chOff x="0" y="0"/>
+          <a:chExt cx="0" cy="0"/>
+        </a:xfrm>
+      </p:grpSpPr>
+      <p:pic>
+        <p:nvPicPr>
+          <p:cNvPr id="2" name="Picture 1"/>
+          <p:cNvPicPr>
+            <a:picLocks noChangeAspect="1"/>
+          </p:cNvPicPr>
+          <p:nvPr/>
+        </p:nvPicPr>
+        <p:blipFill>
+          <a:blip r:embed="rId3">
+            <a:extLst>
+              <a:ext uri="{28A0092B-C50C-407E-A947-70E740481C1C}">
+                <a14:useLocalDpi xmlns:a14="http://schemas.microsoft.com/office/drawing/2010/main" val="0"/>
+              </a:ext>
+            </a:extLst>
+          </a:blip>
+          <a:stretch>
+            <a:fillRect/>
+          </a:stretch>
+        </p:blipFill>
+        <p:spPr>
+          <a:xfrm>
+            <a:off x="0" y="28390"/>
+            <a:ext cx="5191850" cy="1324160"/>
+          </a:xfrm>
+          <a:prstGeom prst="rect">
+            <a:avLst/>
+          </a:prstGeom>
+        </p:spPr>
+      </p:pic>
+    </p:spTree>
+    <p:extLst>
+      <p:ext uri="{BB962C8B-B14F-4D97-AF65-F5344CB8AC3E}">
+        <p14:creationId xmlns:p14="http://schemas.microsoft.com/office/powerpoint/2010/main" val="3798086161"/>
       </p:ext>
     </p:extLst>
   </p:cSld>
@@ -25875,84 +25822,6 @@
       </p:grpSpPr>
       <p:pic>
         <p:nvPicPr>
-          <p:cNvPr id="2" name="Picture 1"/>
-          <p:cNvPicPr>
-            <a:picLocks noChangeAspect="1"/>
-          </p:cNvPicPr>
-          <p:nvPr/>
-        </p:nvPicPr>
-        <p:blipFill>
-          <a:blip r:embed="rId3">
-            <a:extLst>
-              <a:ext uri="{28A0092B-C50C-407E-A947-70E740481C1C}">
-                <a14:useLocalDpi xmlns:a14="http://schemas.microsoft.com/office/drawing/2010/main" val="0"/>
-              </a:ext>
-            </a:extLst>
-          </a:blip>
-          <a:stretch>
-            <a:fillRect/>
-          </a:stretch>
-        </p:blipFill>
-        <p:spPr>
-          <a:xfrm>
-            <a:off x="0" y="28390"/>
-            <a:ext cx="5191850" cy="1324160"/>
-          </a:xfrm>
-          <a:prstGeom prst="rect">
-            <a:avLst/>
-          </a:prstGeom>
-        </p:spPr>
-      </p:pic>
-    </p:spTree>
-    <p:extLst>
-      <p:ext uri="{BB962C8B-B14F-4D97-AF65-F5344CB8AC3E}">
-        <p14:creationId xmlns:p14="http://schemas.microsoft.com/office/powerpoint/2010/main" val="3798086161"/>
-      </p:ext>
-    </p:extLst>
-  </p:cSld>
-  <p:clrMapOvr>
-    <a:masterClrMapping/>
-  </p:clrMapOvr>
-  <p:transition spd="slow">
-    <p:cut/>
-  </p:transition>
-  <p:timing>
-    <p:tnLst>
-      <p:par>
-        <p:cTn id="1" dur="indefinite" restart="never" nodeType="tmRoot"/>
-      </p:par>
-    </p:tnLst>
-  </p:timing>
-</p:sld>
-</file>
-
-<file path=ppt/slides/slide41.xml><?xml version="1.0" encoding="utf-8"?>
-<p:sld xmlns:a="http://schemas.openxmlformats.org/drawingml/2006/main" xmlns:r="http://schemas.openxmlformats.org/officeDocument/2006/relationships" xmlns:p="http://schemas.openxmlformats.org/presentationml/2006/main">
-  <p:cSld>
-    <p:bg>
-      <p:bgPr>
-        <a:solidFill>
-          <a:srgbClr val="1E1E1E"/>
-        </a:solidFill>
-        <a:effectLst/>
-      </p:bgPr>
-    </p:bg>
-    <p:spTree>
-      <p:nvGrpSpPr>
-        <p:cNvPr id="1" name="Shape 47"/>
-        <p:cNvGrpSpPr/>
-        <p:nvPr/>
-      </p:nvGrpSpPr>
-      <p:grpSpPr>
-        <a:xfrm>
-          <a:off x="0" y="0"/>
-          <a:ext cx="0" cy="0"/>
-          <a:chOff x="0" y="0"/>
-          <a:chExt cx="0" cy="0"/>
-        </a:xfrm>
-      </p:grpSpPr>
-      <p:pic>
-        <p:nvPicPr>
           <p:cNvPr id="3" name="Picture 2"/>
           <p:cNvPicPr>
             <a:picLocks noChangeAspect="1"/>
@@ -26004,7 +25873,7 @@
 </p:sld>
 </file>
 
-<file path=ppt/slides/slide42.xml><?xml version="1.0" encoding="utf-8"?>
+<file path=ppt/slides/slide41.xml><?xml version="1.0" encoding="utf-8"?>
 <p:sld xmlns:a="http://schemas.openxmlformats.org/drawingml/2006/main" xmlns:r="http://schemas.openxmlformats.org/officeDocument/2006/relationships" xmlns:p="http://schemas.openxmlformats.org/presentationml/2006/main">
   <p:cSld>
     <p:bg>
@@ -26082,7 +25951,7 @@
 </p:sld>
 </file>
 
-<file path=ppt/slides/slide43.xml><?xml version="1.0" encoding="utf-8"?>
+<file path=ppt/slides/slide42.xml><?xml version="1.0" encoding="utf-8"?>
 <p:sld xmlns:a="http://schemas.openxmlformats.org/drawingml/2006/main" xmlns:r="http://schemas.openxmlformats.org/officeDocument/2006/relationships" xmlns:p="http://schemas.openxmlformats.org/presentationml/2006/main">
   <p:cSld>
     <p:bg>
@@ -26160,7 +26029,7 @@
 </p:sld>
 </file>
 
-<file path=ppt/slides/slide44.xml><?xml version="1.0" encoding="utf-8"?>
+<file path=ppt/slides/slide43.xml><?xml version="1.0" encoding="utf-8"?>
 <p:sld xmlns:a="http://schemas.openxmlformats.org/drawingml/2006/main" xmlns:r="http://schemas.openxmlformats.org/officeDocument/2006/relationships" xmlns:p="http://schemas.openxmlformats.org/presentationml/2006/main">
   <p:cSld>
     <p:bg>
@@ -26238,7 +26107,7 @@
 </p:sld>
 </file>
 
-<file path=ppt/slides/slide45.xml><?xml version="1.0" encoding="utf-8"?>
+<file path=ppt/slides/slide44.xml><?xml version="1.0" encoding="utf-8"?>
 <p:sld xmlns:a="http://schemas.openxmlformats.org/drawingml/2006/main" xmlns:r="http://schemas.openxmlformats.org/officeDocument/2006/relationships" xmlns:p="http://schemas.openxmlformats.org/presentationml/2006/main">
   <p:cSld>
     <p:bg>
@@ -26316,7 +26185,7 @@
 </p:sld>
 </file>
 
-<file path=ppt/slides/slide46.xml><?xml version="1.0" encoding="utf-8"?>
+<file path=ppt/slides/slide45.xml><?xml version="1.0" encoding="utf-8"?>
 <p:sld xmlns:a="http://schemas.openxmlformats.org/drawingml/2006/main" xmlns:r="http://schemas.openxmlformats.org/officeDocument/2006/relationships" xmlns:p="http://schemas.openxmlformats.org/presentationml/2006/main">
   <p:cSld>
     <p:spTree>
@@ -26403,7 +26272,7 @@
 </p:sld>
 </file>
 
-<file path=ppt/slides/slide47.xml><?xml version="1.0" encoding="utf-8"?>
+<file path=ppt/slides/slide46.xml><?xml version="1.0" encoding="utf-8"?>
 <p:sld xmlns:a="http://schemas.openxmlformats.org/drawingml/2006/main" xmlns:r="http://schemas.openxmlformats.org/officeDocument/2006/relationships" xmlns:p="http://schemas.openxmlformats.org/presentationml/2006/main">
   <p:cSld>
     <p:spTree>
@@ -28147,7 +28016,7 @@
 </p:sld>
 </file>
 
-<file path=ppt/slides/slide48.xml><?xml version="1.0" encoding="utf-8"?>
+<file path=ppt/slides/slide47.xml><?xml version="1.0" encoding="utf-8"?>
 <p:sld xmlns:a="http://schemas.openxmlformats.org/drawingml/2006/main" xmlns:r="http://schemas.openxmlformats.org/officeDocument/2006/relationships" xmlns:p="http://schemas.openxmlformats.org/presentationml/2006/main">
   <p:cSld>
     <p:spTree>
@@ -28267,7 +28136,7 @@
 </p:sld>
 </file>
 
-<file path=ppt/slides/slide49.xml><?xml version="1.0" encoding="utf-8"?>
+<file path=ppt/slides/slide48.xml><?xml version="1.0" encoding="utf-8"?>
 <p:sld xmlns:a="http://schemas.openxmlformats.org/drawingml/2006/main" xmlns:r="http://schemas.openxmlformats.org/officeDocument/2006/relationships" xmlns:p="http://schemas.openxmlformats.org/presentationml/2006/main">
   <p:cSld>
     <p:spTree>
@@ -30506,6 +30375,84 @@
 </p:sld>
 </file>
 
+<file path=ppt/slides/slide49.xml><?xml version="1.0" encoding="utf-8"?>
+<p:sld xmlns:a="http://schemas.openxmlformats.org/drawingml/2006/main" xmlns:r="http://schemas.openxmlformats.org/officeDocument/2006/relationships" xmlns:p="http://schemas.openxmlformats.org/presentationml/2006/main">
+  <p:cSld>
+    <p:bg>
+      <p:bgPr>
+        <a:solidFill>
+          <a:srgbClr val="1E1E1E"/>
+        </a:solidFill>
+        <a:effectLst/>
+      </p:bgPr>
+    </p:bg>
+    <p:spTree>
+      <p:nvGrpSpPr>
+        <p:cNvPr id="1" name="Shape 47"/>
+        <p:cNvGrpSpPr/>
+        <p:nvPr/>
+      </p:nvGrpSpPr>
+      <p:grpSpPr>
+        <a:xfrm>
+          <a:off x="0" y="0"/>
+          <a:ext cx="0" cy="0"/>
+          <a:chOff x="0" y="0"/>
+          <a:chExt cx="0" cy="0"/>
+        </a:xfrm>
+      </p:grpSpPr>
+      <p:pic>
+        <p:nvPicPr>
+          <p:cNvPr id="2" name="Picture 1"/>
+          <p:cNvPicPr>
+            <a:picLocks noChangeAspect="1"/>
+          </p:cNvPicPr>
+          <p:nvPr/>
+        </p:nvPicPr>
+        <p:blipFill>
+          <a:blip r:embed="rId3">
+            <a:extLst>
+              <a:ext uri="{28A0092B-C50C-407E-A947-70E740481C1C}">
+                <a14:useLocalDpi xmlns:a14="http://schemas.microsoft.com/office/drawing/2010/main" val="0"/>
+              </a:ext>
+            </a:extLst>
+          </a:blip>
+          <a:stretch>
+            <a:fillRect/>
+          </a:stretch>
+        </p:blipFill>
+        <p:spPr>
+          <a:xfrm>
+            <a:off x="0" y="0"/>
+            <a:ext cx="5278500" cy="5143500"/>
+          </a:xfrm>
+          <a:prstGeom prst="rect">
+            <a:avLst/>
+          </a:prstGeom>
+        </p:spPr>
+      </p:pic>
+    </p:spTree>
+    <p:extLst>
+      <p:ext uri="{BB962C8B-B14F-4D97-AF65-F5344CB8AC3E}">
+        <p14:creationId xmlns:p14="http://schemas.microsoft.com/office/powerpoint/2010/main" val="2792133370"/>
+      </p:ext>
+    </p:extLst>
+  </p:cSld>
+  <p:clrMapOvr>
+    <a:masterClrMapping/>
+  </p:clrMapOvr>
+  <p:transition spd="slow">
+    <p:cut/>
+  </p:transition>
+  <p:timing>
+    <p:tnLst>
+      <p:par>
+        <p:cTn id="1" dur="indefinite" restart="never" nodeType="tmRoot"/>
+      </p:par>
+    </p:tnLst>
+  </p:timing>
+</p:sld>
+</file>
+
 <file path=ppt/slides/slide5.xml><?xml version="1.0" encoding="utf-8"?>
 <p:sld xmlns:a="http://schemas.openxmlformats.org/drawingml/2006/main" xmlns:r="http://schemas.openxmlformats.org/officeDocument/2006/relationships" xmlns:p="http://schemas.openxmlformats.org/presentationml/2006/main">
   <p:cSld>
@@ -30620,84 +30567,6 @@
       </p:grpSpPr>
       <p:pic>
         <p:nvPicPr>
-          <p:cNvPr id="2" name="Picture 1"/>
-          <p:cNvPicPr>
-            <a:picLocks noChangeAspect="1"/>
-          </p:cNvPicPr>
-          <p:nvPr/>
-        </p:nvPicPr>
-        <p:blipFill>
-          <a:blip r:embed="rId3">
-            <a:extLst>
-              <a:ext uri="{28A0092B-C50C-407E-A947-70E740481C1C}">
-                <a14:useLocalDpi xmlns:a14="http://schemas.microsoft.com/office/drawing/2010/main" val="0"/>
-              </a:ext>
-            </a:extLst>
-          </a:blip>
-          <a:stretch>
-            <a:fillRect/>
-          </a:stretch>
-        </p:blipFill>
-        <p:spPr>
-          <a:xfrm>
-            <a:off x="0" y="0"/>
-            <a:ext cx="5278500" cy="5143500"/>
-          </a:xfrm>
-          <a:prstGeom prst="rect">
-            <a:avLst/>
-          </a:prstGeom>
-        </p:spPr>
-      </p:pic>
-    </p:spTree>
-    <p:extLst>
-      <p:ext uri="{BB962C8B-B14F-4D97-AF65-F5344CB8AC3E}">
-        <p14:creationId xmlns:p14="http://schemas.microsoft.com/office/powerpoint/2010/main" val="2792133370"/>
-      </p:ext>
-    </p:extLst>
-  </p:cSld>
-  <p:clrMapOvr>
-    <a:masterClrMapping/>
-  </p:clrMapOvr>
-  <p:transition spd="slow">
-    <p:cut/>
-  </p:transition>
-  <p:timing>
-    <p:tnLst>
-      <p:par>
-        <p:cTn id="1" dur="indefinite" restart="never" nodeType="tmRoot"/>
-      </p:par>
-    </p:tnLst>
-  </p:timing>
-</p:sld>
-</file>
-
-<file path=ppt/slides/slide51.xml><?xml version="1.0" encoding="utf-8"?>
-<p:sld xmlns:a="http://schemas.openxmlformats.org/drawingml/2006/main" xmlns:r="http://schemas.openxmlformats.org/officeDocument/2006/relationships" xmlns:p="http://schemas.openxmlformats.org/presentationml/2006/main">
-  <p:cSld>
-    <p:bg>
-      <p:bgPr>
-        <a:solidFill>
-          <a:srgbClr val="1E1E1E"/>
-        </a:solidFill>
-        <a:effectLst/>
-      </p:bgPr>
-    </p:bg>
-    <p:spTree>
-      <p:nvGrpSpPr>
-        <p:cNvPr id="1" name="Shape 47"/>
-        <p:cNvGrpSpPr/>
-        <p:nvPr/>
-      </p:nvGrpSpPr>
-      <p:grpSpPr>
-        <a:xfrm>
-          <a:off x="0" y="0"/>
-          <a:ext cx="0" cy="0"/>
-          <a:chOff x="0" y="0"/>
-          <a:chExt cx="0" cy="0"/>
-        </a:xfrm>
-      </p:grpSpPr>
-      <p:pic>
-        <p:nvPicPr>
           <p:cNvPr id="3" name="Picture 2"/>
           <p:cNvPicPr>
             <a:picLocks noChangeAspect="1"/>
@@ -30749,7 +30618,7 @@
 </p:sld>
 </file>
 
-<file path=ppt/slides/slide52.xml><?xml version="1.0" encoding="utf-8"?>
+<file path=ppt/slides/slide51.xml><?xml version="1.0" encoding="utf-8"?>
 <p:sld xmlns:a="http://schemas.openxmlformats.org/drawingml/2006/main" xmlns:r="http://schemas.openxmlformats.org/officeDocument/2006/relationships" xmlns:p="http://schemas.openxmlformats.org/presentationml/2006/main">
   <p:cSld>
     <p:bg>
@@ -30827,7 +30696,7 @@
 </p:sld>
 </file>
 
-<file path=ppt/slides/slide53.xml><?xml version="1.0" encoding="utf-8"?>
+<file path=ppt/slides/slide52.xml><?xml version="1.0" encoding="utf-8"?>
 <p:sld xmlns:a="http://schemas.openxmlformats.org/drawingml/2006/main" xmlns:r="http://schemas.openxmlformats.org/officeDocument/2006/relationships" xmlns:p="http://schemas.openxmlformats.org/presentationml/2006/main">
   <p:cSld>
     <p:bg>
@@ -30905,7 +30774,7 @@
 </p:sld>
 </file>
 
-<file path=ppt/slides/slide54.xml><?xml version="1.0" encoding="utf-8"?>
+<file path=ppt/slides/slide53.xml><?xml version="1.0" encoding="utf-8"?>
 <p:sld xmlns:a="http://schemas.openxmlformats.org/drawingml/2006/main" xmlns:r="http://schemas.openxmlformats.org/officeDocument/2006/relationships" xmlns:p="http://schemas.openxmlformats.org/presentationml/2006/main">
   <p:cSld>
     <p:spTree>
@@ -30992,7 +30861,7 @@
 </p:sld>
 </file>
 
-<file path=ppt/slides/slide55.xml><?xml version="1.0" encoding="utf-8"?>
+<file path=ppt/slides/slide54.xml><?xml version="1.0" encoding="utf-8"?>
 <p:sld xmlns:a="http://schemas.openxmlformats.org/drawingml/2006/main" xmlns:r="http://schemas.openxmlformats.org/officeDocument/2006/relationships" xmlns:p="http://schemas.openxmlformats.org/presentationml/2006/main">
   <p:cSld>
     <p:spTree>
@@ -32506,93 +32375,6 @@
 </file>
 
 <file path=ppt/slides/slide7.xml><?xml version="1.0" encoding="utf-8"?>
-<p:sld xmlns:a="http://schemas.openxmlformats.org/drawingml/2006/main" xmlns:r="http://schemas.openxmlformats.org/officeDocument/2006/relationships" xmlns:p="http://schemas.openxmlformats.org/presentationml/2006/main">
-  <p:cSld>
-    <p:spTree>
-      <p:nvGrpSpPr>
-        <p:cNvPr id="1" name="Shape 47"/>
-        <p:cNvGrpSpPr/>
-        <p:nvPr/>
-      </p:nvGrpSpPr>
-      <p:grpSpPr>
-        <a:xfrm>
-          <a:off x="0" y="0"/>
-          <a:ext cx="0" cy="0"/>
-          <a:chOff x="0" y="0"/>
-          <a:chExt cx="0" cy="0"/>
-        </a:xfrm>
-      </p:grpSpPr>
-      <p:sp>
-        <p:nvSpPr>
-          <p:cNvPr id="48" name="Shape 48"/>
-          <p:cNvSpPr txBox="1">
-            <a:spLocks noGrp="1"/>
-          </p:cNvSpPr>
-          <p:nvPr>
-            <p:ph type="title"/>
-          </p:nvPr>
-        </p:nvSpPr>
-        <p:spPr>
-          <a:xfrm>
-            <a:off x="-6000" y="2143050"/>
-            <a:ext cx="9156000" cy="857400"/>
-          </a:xfrm>
-          <a:prstGeom prst="rect">
-            <a:avLst/>
-          </a:prstGeom>
-        </p:spPr>
-        <p:txBody>
-          <a:bodyPr lIns="91425" tIns="91425" rIns="91425" bIns="91425" anchor="ctr" anchorCtr="0">
-            <a:noAutofit/>
-          </a:bodyPr>
-          <a:lstStyle/>
-          <a:p>
-            <a:pPr lvl="0" rtl="0">
-              <a:spcBef>
-                <a:spcPts val="0"/>
-              </a:spcBef>
-              <a:buNone/>
-            </a:pPr>
-            <a:r>
-              <a:rPr lang="en" sz="4800" dirty="0" smtClean="0">
-                <a:solidFill>
-                  <a:schemeClr val="tx1"/>
-                </a:solidFill>
-              </a:rPr>
-              <a:t>Is it better?</a:t>
-            </a:r>
-            <a:endParaRPr lang="en" sz="4800" dirty="0">
-              <a:solidFill>
-                <a:schemeClr val="tx1"/>
-              </a:solidFill>
-            </a:endParaRPr>
-          </a:p>
-        </p:txBody>
-      </p:sp>
-    </p:spTree>
-    <p:extLst>
-      <p:ext uri="{BB962C8B-B14F-4D97-AF65-F5344CB8AC3E}">
-        <p14:creationId xmlns:p14="http://schemas.microsoft.com/office/powerpoint/2010/main" val="3160032874"/>
-      </p:ext>
-    </p:extLst>
-  </p:cSld>
-  <p:clrMapOvr>
-    <a:masterClrMapping/>
-  </p:clrMapOvr>
-  <p:transition spd="slow">
-    <p:cut/>
-  </p:transition>
-  <p:timing>
-    <p:tnLst>
-      <p:par>
-        <p:cTn id="1" dur="indefinite" restart="never" nodeType="tmRoot"/>
-      </p:par>
-    </p:tnLst>
-  </p:timing>
-</p:sld>
-</file>
-
-<file path=ppt/slides/slide8.xml><?xml version="1.0" encoding="utf-8"?>
 <p:sld xmlns:a="http://schemas.openxmlformats.org/drawingml/2006/main" xmlns:r="http://schemas.openxmlformats.org/officeDocument/2006/relationships" xmlns:p="http://schemas.openxmlformats.org/presentationml/2006/main" showMasterSp="0">
   <p:cSld>
     <p:spTree>
@@ -34331,7 +34113,7 @@
 </p:sld>
 </file>
 
-<file path=ppt/slides/slide9.xml><?xml version="1.0" encoding="utf-8"?>
+<file path=ppt/slides/slide8.xml><?xml version="1.0" encoding="utf-8"?>
 <p:sld xmlns:a="http://schemas.openxmlformats.org/drawingml/2006/main" xmlns:r="http://schemas.openxmlformats.org/officeDocument/2006/relationships" xmlns:p="http://schemas.openxmlformats.org/presentationml/2006/main">
   <p:cSld>
     <p:spTree>
@@ -36562,6 +36344,84 @@
 </p:sld>
 </file>
 
+<file path=ppt/slides/slide9.xml><?xml version="1.0" encoding="utf-8"?>
+<p:sld xmlns:a="http://schemas.openxmlformats.org/drawingml/2006/main" xmlns:r="http://schemas.openxmlformats.org/officeDocument/2006/relationships" xmlns:p="http://schemas.openxmlformats.org/presentationml/2006/main">
+  <p:cSld>
+    <p:bg>
+      <p:bgPr>
+        <a:solidFill>
+          <a:srgbClr val="1E1E1E"/>
+        </a:solidFill>
+        <a:effectLst/>
+      </p:bgPr>
+    </p:bg>
+    <p:spTree>
+      <p:nvGrpSpPr>
+        <p:cNvPr id="1" name="Shape 47"/>
+        <p:cNvGrpSpPr/>
+        <p:nvPr/>
+      </p:nvGrpSpPr>
+      <p:grpSpPr>
+        <a:xfrm>
+          <a:off x="0" y="0"/>
+          <a:ext cx="0" cy="0"/>
+          <a:chOff x="0" y="0"/>
+          <a:chExt cx="0" cy="0"/>
+        </a:xfrm>
+      </p:grpSpPr>
+      <p:pic>
+        <p:nvPicPr>
+          <p:cNvPr id="3" name="Picture 2"/>
+          <p:cNvPicPr>
+            <a:picLocks noChangeAspect="1"/>
+          </p:cNvPicPr>
+          <p:nvPr/>
+        </p:nvPicPr>
+        <p:blipFill>
+          <a:blip r:embed="rId3">
+            <a:extLst>
+              <a:ext uri="{28A0092B-C50C-407E-A947-70E740481C1C}">
+                <a14:useLocalDpi xmlns:a14="http://schemas.microsoft.com/office/drawing/2010/main" val="0"/>
+              </a:ext>
+            </a:extLst>
+          </a:blip>
+          <a:stretch>
+            <a:fillRect/>
+          </a:stretch>
+        </p:blipFill>
+        <p:spPr>
+          <a:xfrm>
+            <a:off x="0" y="28103"/>
+            <a:ext cx="6163535" cy="3381847"/>
+          </a:xfrm>
+          <a:prstGeom prst="rect">
+            <a:avLst/>
+          </a:prstGeom>
+        </p:spPr>
+      </p:pic>
+    </p:spTree>
+    <p:extLst>
+      <p:ext uri="{BB962C8B-B14F-4D97-AF65-F5344CB8AC3E}">
+        <p14:creationId xmlns:p14="http://schemas.microsoft.com/office/powerpoint/2010/main" val="2280606087"/>
+      </p:ext>
+    </p:extLst>
+  </p:cSld>
+  <p:clrMapOvr>
+    <a:masterClrMapping/>
+  </p:clrMapOvr>
+  <p:transition spd="slow">
+    <p:cut/>
+  </p:transition>
+  <p:timing>
+    <p:tnLst>
+      <p:par>
+        <p:cTn id="1" dur="indefinite" restart="never" nodeType="tmRoot"/>
+      </p:par>
+    </p:tnLst>
+  </p:timing>
+</p:sld>
+</file>
+
 <file path=ppt/theme/theme1.xml><?xml version="1.0" encoding="utf-8"?>
 <a:theme xmlns:a="http://schemas.openxmlformats.org/drawingml/2006/main" name="Ursula template">
   <a:themeElements>

</xml_diff>

<commit_message>
Changed the "Whats wrong with this picture?" slide to show the code so that the public can comment on this.
</commit_message>
<xml_diff>
--- a/Presentations/SOLID/SOLID.pptx
+++ b/Presentations/SOLID/SOLID.pptx
@@ -12,7 +12,7 @@
     <p:sldId id="335" r:id="rId3"/>
     <p:sldId id="286" r:id="rId4"/>
     <p:sldId id="308" r:id="rId5"/>
-    <p:sldId id="300" r:id="rId6"/>
+    <p:sldId id="337" r:id="rId6"/>
     <p:sldId id="302" r:id="rId7"/>
     <p:sldId id="257" r:id="rId8"/>
     <p:sldId id="284" r:id="rId9"/>
@@ -6128,14 +6128,22 @@
               </a:spcBef>
               <a:buNone/>
             </a:pPr>
-            <a:endParaRPr/>
+            <a:r>
+              <a:rPr lang="en" sz="1100" dirty="0" smtClean="0">
+                <a:solidFill>
+                  <a:schemeClr val="tx1"/>
+                </a:solidFill>
+              </a:rPr>
+              <a:t>What was wrong in this picture?</a:t>
+            </a:r>
+            <a:endParaRPr dirty="0"/>
           </a:p>
         </p:txBody>
       </p:sp>
     </p:spTree>
     <p:extLst>
       <p:ext uri="{BB962C8B-B14F-4D97-AF65-F5344CB8AC3E}">
-        <p14:creationId xmlns:p14="http://schemas.microsoft.com/office/powerpoint/2010/main" val="3979497879"/>
+        <p14:creationId xmlns:p14="http://schemas.microsoft.com/office/powerpoint/2010/main" val="4115636030"/>
       </p:ext>
     </p:extLst>
   </p:cSld>
@@ -30470,57 +30478,40 @@
           <a:chExt cx="0" cy="0"/>
         </a:xfrm>
       </p:grpSpPr>
-      <p:sp>
-        <p:nvSpPr>
-          <p:cNvPr id="48" name="Shape 48"/>
-          <p:cNvSpPr txBox="1">
-            <a:spLocks noGrp="1"/>
-          </p:cNvSpPr>
-          <p:nvPr>
-            <p:ph type="title"/>
-          </p:nvPr>
-        </p:nvSpPr>
+      <p:pic>
+        <p:nvPicPr>
+          <p:cNvPr id="3" name="Picture 2"/>
+          <p:cNvPicPr>
+            <a:picLocks noChangeAspect="1"/>
+          </p:cNvPicPr>
+          <p:nvPr/>
+        </p:nvPicPr>
+        <p:blipFill>
+          <a:blip r:embed="rId3">
+            <a:extLst>
+              <a:ext uri="{28A0092B-C50C-407E-A947-70E740481C1C}">
+                <a14:useLocalDpi xmlns:a14="http://schemas.microsoft.com/office/drawing/2010/main" val="0"/>
+              </a:ext>
+            </a:extLst>
+          </a:blip>
+          <a:stretch>
+            <a:fillRect/>
+          </a:stretch>
+        </p:blipFill>
         <p:spPr>
           <a:xfrm>
-            <a:off x="-6000" y="2143050"/>
-            <a:ext cx="9156000" cy="857400"/>
+            <a:off x="0" y="0"/>
+            <a:ext cx="5962529" cy="5143500"/>
           </a:xfrm>
           <a:prstGeom prst="rect">
             <a:avLst/>
           </a:prstGeom>
         </p:spPr>
-        <p:txBody>
-          <a:bodyPr lIns="91425" tIns="91425" rIns="91425" bIns="91425" anchor="ctr" anchorCtr="0">
-            <a:noAutofit/>
-          </a:bodyPr>
-          <a:lstStyle/>
-          <a:p>
-            <a:pPr lvl="0" rtl="0">
-              <a:spcBef>
-                <a:spcPts val="0"/>
-              </a:spcBef>
-              <a:buNone/>
-            </a:pPr>
-            <a:r>
-              <a:rPr lang="en" sz="4500" dirty="0" smtClean="0">
-                <a:solidFill>
-                  <a:schemeClr val="tx1"/>
-                </a:solidFill>
-              </a:rPr>
-              <a:t>What was wrong in this picture?</a:t>
-            </a:r>
-            <a:endParaRPr lang="en" sz="4500" dirty="0">
-              <a:solidFill>
-                <a:schemeClr val="tx1"/>
-              </a:solidFill>
-            </a:endParaRPr>
-          </a:p>
-        </p:txBody>
-      </p:sp>
+      </p:pic>
     </p:spTree>
     <p:extLst>
       <p:ext uri="{BB962C8B-B14F-4D97-AF65-F5344CB8AC3E}">
-        <p14:creationId xmlns:p14="http://schemas.microsoft.com/office/powerpoint/2010/main" val="114431950"/>
+        <p14:creationId xmlns:p14="http://schemas.microsoft.com/office/powerpoint/2010/main" val="556143550"/>
       </p:ext>
     </p:extLst>
   </p:cSld>

</xml_diff>